<commit_message>
thoughts and outline for pp
</commit_message>
<xml_diff>
--- a/AP_labMeeting_2.12.20.pptx
+++ b/AP_labMeeting_2.12.20.pptx
@@ -5,18 +5,22 @@
     <p:sldMasterId id="2147483648" r:id="rId1"/>
   </p:sldMasterIdLst>
   <p:notesMasterIdLst>
-    <p:notesMasterId r:id="rId11"/>
+    <p:notesMasterId r:id="rId15"/>
   </p:notesMasterIdLst>
   <p:sldIdLst>
     <p:sldId id="256" r:id="rId2"/>
     <p:sldId id="262" r:id="rId3"/>
-    <p:sldId id="263" r:id="rId4"/>
-    <p:sldId id="264" r:id="rId5"/>
-    <p:sldId id="265" r:id="rId6"/>
-    <p:sldId id="258" r:id="rId7"/>
+    <p:sldId id="267" r:id="rId4"/>
+    <p:sldId id="263" r:id="rId5"/>
+    <p:sldId id="264" r:id="rId6"/>
+    <p:sldId id="265" r:id="rId7"/>
     <p:sldId id="259" r:id="rId8"/>
     <p:sldId id="257" r:id="rId9"/>
     <p:sldId id="260" r:id="rId10"/>
+    <p:sldId id="269" r:id="rId11"/>
+    <p:sldId id="270" r:id="rId12"/>
+    <p:sldId id="266" r:id="rId13"/>
+    <p:sldId id="268" r:id="rId14"/>
   </p:sldIdLst>
   <p:sldSz cx="12192000" cy="6858000"/>
   <p:notesSz cx="6858000" cy="9144000"/>
@@ -115,6 +119,11 @@
       </a:defRPr>
     </a:lvl9pPr>
   </p:defaultTextStyle>
+  <p:extLst>
+    <p:ext uri="{EFAFB233-063F-42B5-8137-9DF3F51BA10A}">
+      <p15:sldGuideLst xmlns:p15="http://schemas.microsoft.com/office/powerpoint/2012/main"/>
+    </p:ext>
+  </p:extLst>
 </p:presentation>
 </file>
 
@@ -200,7 +209,7 @@
           <a:p>
             <a:fld id="{582DA5D2-0B3C-4799-B633-4F32A722274F}" type="datetimeFigureOut">
               <a:rPr lang="en-US" smtClean="0"/>
-              <a:t>1/30/2020</a:t>
+              <a:t>2/2/2020</a:t>
             </a:fld>
             <a:endParaRPr lang="en-US"/>
           </a:p>
@@ -514,12 +523,22 @@
           <a:p>
             <a:r>
               <a:rPr lang="en-US" dirty="0" smtClean="0"/>
-              <a:t>Themes</a:t>
+              <a:t>Goals for getting out of lab meeting:</a:t>
+            </a:r>
+          </a:p>
+          <a:p>
+            <a:endParaRPr lang="en-US" dirty="0" smtClean="0"/>
+          </a:p>
+          <a:p>
+            <a:r>
+              <a:rPr lang="en-US" dirty="0" smtClean="0"/>
+              <a:t>Feed back for  test</a:t>
             </a:r>
             <a:r>
               <a:rPr lang="en-US" baseline="0" dirty="0" smtClean="0"/>
-              <a:t> for intro</a:t>
-            </a:r>
+              <a:t> choices</a:t>
+            </a:r>
+            <a:endParaRPr lang="en-US" dirty="0" smtClean="0"/>
           </a:p>
           <a:p>
             <a:endParaRPr lang="en-US" baseline="0" dirty="0" smtClean="0"/>
@@ -527,8 +546,24 @@
           <a:p>
             <a:r>
               <a:rPr lang="en-US" baseline="0" dirty="0" smtClean="0"/>
-              <a:t>MM: finalizing </a:t>
-            </a:r>
+              <a:t>Push to write and distribute a draft of my results outline</a:t>
+            </a:r>
+          </a:p>
+          <a:p>
+            <a:endParaRPr lang="en-US" dirty="0" smtClean="0"/>
+          </a:p>
+          <a:p>
+            <a:r>
+              <a:rPr lang="en-US" dirty="0" smtClean="0"/>
+              <a:t>Practice summarizing</a:t>
+            </a:r>
+            <a:r>
+              <a:rPr lang="en-US" baseline="0" dirty="0" smtClean="0"/>
+              <a:t> results</a:t>
+            </a:r>
+            <a:endParaRPr lang="en-US" dirty="0" smtClean="0"/>
+          </a:p>
+          <a:p>
             <a:endParaRPr lang="en-US" dirty="0"/>
           </a:p>
         </p:txBody>
@@ -550,7 +585,7 @@
           <a:p>
             <a:fld id="{2788907E-C72E-4D7B-B8CA-F158589AC799}" type="slidenum">
               <a:rPr lang="en-US" smtClean="0"/>
-              <a:t>2</a:t>
+              <a:t>1</a:t>
             </a:fld>
             <a:endParaRPr lang="en-US"/>
           </a:p>
@@ -559,7 +594,161 @@
     </p:spTree>
     <p:extLst>
       <p:ext uri="{BB962C8B-B14F-4D97-AF65-F5344CB8AC3E}">
-        <p14:creationId xmlns:p14="http://schemas.microsoft.com/office/powerpoint/2010/main" val="865549874"/>
+        <p14:creationId xmlns:p14="http://schemas.microsoft.com/office/powerpoint/2010/main" val="953416662"/>
+      </p:ext>
+    </p:extLst>
+  </p:cSld>
+  <p:clrMapOvr>
+    <a:masterClrMapping/>
+  </p:clrMapOvr>
+</p:notes>
+</file>
+
+<file path=ppt/notesSlides/notesSlide10.xml><?xml version="1.0" encoding="utf-8"?>
+<p:notes xmlns:a="http://schemas.openxmlformats.org/drawingml/2006/main" xmlns:r="http://schemas.openxmlformats.org/officeDocument/2006/relationships" xmlns:p="http://schemas.openxmlformats.org/presentationml/2006/main">
+  <p:cSld>
+    <p:spTree>
+      <p:nvGrpSpPr>
+        <p:cNvPr id="1" name=""/>
+        <p:cNvGrpSpPr/>
+        <p:nvPr/>
+      </p:nvGrpSpPr>
+      <p:grpSpPr>
+        <a:xfrm>
+          <a:off x="0" y="0"/>
+          <a:ext cx="0" cy="0"/>
+          <a:chOff x="0" y="0"/>
+          <a:chExt cx="0" cy="0"/>
+        </a:xfrm>
+      </p:grpSpPr>
+      <p:sp>
+        <p:nvSpPr>
+          <p:cNvPr id="2" name="Slide Image Placeholder 1"/>
+          <p:cNvSpPr>
+            <a:spLocks noGrp="1" noRot="1" noChangeAspect="1"/>
+          </p:cNvSpPr>
+          <p:nvPr>
+            <p:ph type="sldImg"/>
+          </p:nvPr>
+        </p:nvSpPr>
+        <p:spPr/>
+      </p:sp>
+      <p:sp>
+        <p:nvSpPr>
+          <p:cNvPr id="3" name="Notes Placeholder 2"/>
+          <p:cNvSpPr>
+            <a:spLocks noGrp="1"/>
+          </p:cNvSpPr>
+          <p:nvPr>
+            <p:ph type="body" idx="1"/>
+          </p:nvPr>
+        </p:nvSpPr>
+        <p:spPr/>
+        <p:txBody>
+          <a:bodyPr/>
+          <a:lstStyle/>
+          <a:p>
+            <a:r>
+              <a:rPr lang="en-US" dirty="0" smtClean="0"/>
+              <a:t>1 way </a:t>
+            </a:r>
+            <a:r>
+              <a:rPr lang="en-US" dirty="0" err="1" smtClean="0"/>
+              <a:t>Anova</a:t>
+            </a:r>
+            <a:r>
+              <a:rPr lang="en-US" dirty="0" smtClean="0"/>
+              <a:t> – at least 1 of the group is different</a:t>
+            </a:r>
+          </a:p>
+          <a:p>
+            <a:r>
+              <a:rPr lang="en-US" dirty="0" smtClean="0"/>
+              <a:t>2. Pairwise </a:t>
+            </a:r>
+            <a:r>
+              <a:rPr lang="en-US" dirty="0" err="1" smtClean="0"/>
+              <a:t>t.tests</a:t>
+            </a:r>
+            <a:r>
+              <a:rPr lang="en-US" dirty="0" smtClean="0"/>
+              <a:t>, (maybe</a:t>
+            </a:r>
+            <a:r>
+              <a:rPr lang="en-US" baseline="0" dirty="0" smtClean="0"/>
+              <a:t> I was using the wrong correction)</a:t>
+            </a:r>
+            <a:endParaRPr lang="en-US" dirty="0" smtClean="0"/>
+          </a:p>
+          <a:p>
+            <a:endParaRPr lang="en-US" dirty="0" smtClean="0"/>
+          </a:p>
+          <a:p>
+            <a:endParaRPr lang="en-US" dirty="0" smtClean="0"/>
+          </a:p>
+          <a:p>
+            <a:r>
+              <a:rPr lang="en-US" dirty="0" smtClean="0"/>
+              <a:t>What</a:t>
+            </a:r>
+            <a:r>
+              <a:rPr lang="en-US" baseline="0" dirty="0" smtClean="0"/>
+              <a:t> would the point be to run these models? </a:t>
+            </a:r>
+          </a:p>
+          <a:p>
+            <a:endParaRPr lang="en-US" baseline="0" dirty="0" smtClean="0"/>
+          </a:p>
+          <a:p>
+            <a:r>
+              <a:rPr lang="en-US" baseline="0" dirty="0" smtClean="0"/>
+              <a:t>Distinguish the higher than ‘low’ (Dom) level strains</a:t>
+            </a:r>
+          </a:p>
+          <a:p>
+            <a:r>
+              <a:rPr lang="en-US" dirty="0" smtClean="0"/>
+              <a:t>Allows</a:t>
+            </a:r>
+            <a:r>
+              <a:rPr lang="en-US" baseline="0" dirty="0" smtClean="0"/>
+              <a:t> to add in additional strains not used for sexual </a:t>
+            </a:r>
+            <a:r>
+              <a:rPr lang="en-US" baseline="0" dirty="0" err="1" smtClean="0"/>
+              <a:t>differnces</a:t>
+            </a:r>
+            <a:endParaRPr lang="en-US" dirty="0"/>
+          </a:p>
+        </p:txBody>
+      </p:sp>
+      <p:sp>
+        <p:nvSpPr>
+          <p:cNvPr id="4" name="Slide Number Placeholder 3"/>
+          <p:cNvSpPr>
+            <a:spLocks noGrp="1"/>
+          </p:cNvSpPr>
+          <p:nvPr>
+            <p:ph type="sldNum" sz="quarter" idx="10"/>
+          </p:nvPr>
+        </p:nvSpPr>
+        <p:spPr/>
+        <p:txBody>
+          <a:bodyPr/>
+          <a:lstStyle/>
+          <a:p>
+            <a:fld id="{2788907E-C72E-4D7B-B8CA-F158589AC799}" type="slidenum">
+              <a:rPr lang="en-US" smtClean="0"/>
+              <a:t>12</a:t>
+            </a:fld>
+            <a:endParaRPr lang="en-US"/>
+          </a:p>
+        </p:txBody>
+      </p:sp>
+    </p:spTree>
+    <p:extLst>
+      <p:ext uri="{BB962C8B-B14F-4D97-AF65-F5344CB8AC3E}">
+        <p14:creationId xmlns:p14="http://schemas.microsoft.com/office/powerpoint/2010/main" val="39540735"/>
       </p:ext>
     </p:extLst>
   </p:cSld>
@@ -614,12 +803,305 @@
           <a:lstStyle/>
           <a:p>
             <a:r>
+              <a:rPr lang="en-US" dirty="0" smtClean="0"/>
+              <a:t>Themes</a:t>
+            </a:r>
+            <a:r>
+              <a:rPr lang="en-US" baseline="0" dirty="0" smtClean="0"/>
+              <a:t> for intro</a:t>
+            </a:r>
+          </a:p>
+          <a:p>
+            <a:endParaRPr lang="en-US" baseline="0" dirty="0" smtClean="0"/>
+          </a:p>
+          <a:p>
+            <a:r>
+              <a:rPr lang="en-US" baseline="0" dirty="0" smtClean="0"/>
+              <a:t>MM: finalizing </a:t>
+            </a:r>
+            <a:endParaRPr lang="en-US" dirty="0"/>
+          </a:p>
+        </p:txBody>
+      </p:sp>
+      <p:sp>
+        <p:nvSpPr>
+          <p:cNvPr id="4" name="Slide Number Placeholder 3"/>
+          <p:cNvSpPr>
+            <a:spLocks noGrp="1"/>
+          </p:cNvSpPr>
+          <p:nvPr>
+            <p:ph type="sldNum" sz="quarter" idx="10"/>
+          </p:nvPr>
+        </p:nvSpPr>
+        <p:spPr/>
+        <p:txBody>
+          <a:bodyPr/>
+          <a:lstStyle/>
+          <a:p>
+            <a:fld id="{2788907E-C72E-4D7B-B8CA-F158589AC799}" type="slidenum">
+              <a:rPr lang="en-US" smtClean="0"/>
+              <a:t>2</a:t>
+            </a:fld>
+            <a:endParaRPr lang="en-US"/>
+          </a:p>
+        </p:txBody>
+      </p:sp>
+    </p:spTree>
+    <p:extLst>
+      <p:ext uri="{BB962C8B-B14F-4D97-AF65-F5344CB8AC3E}">
+        <p14:creationId xmlns:p14="http://schemas.microsoft.com/office/powerpoint/2010/main" val="865549874"/>
+      </p:ext>
+    </p:extLst>
+  </p:cSld>
+  <p:clrMapOvr>
+    <a:masterClrMapping/>
+  </p:clrMapOvr>
+</p:notes>
+</file>
+
+<file path=ppt/notesSlides/notesSlide3.xml><?xml version="1.0" encoding="utf-8"?>
+<p:notes xmlns:a="http://schemas.openxmlformats.org/drawingml/2006/main" xmlns:r="http://schemas.openxmlformats.org/officeDocument/2006/relationships" xmlns:p="http://schemas.openxmlformats.org/presentationml/2006/main">
+  <p:cSld>
+    <p:spTree>
+      <p:nvGrpSpPr>
+        <p:cNvPr id="1" name=""/>
+        <p:cNvGrpSpPr/>
+        <p:nvPr/>
+      </p:nvGrpSpPr>
+      <p:grpSpPr>
+        <a:xfrm>
+          <a:off x="0" y="0"/>
+          <a:ext cx="0" cy="0"/>
+          <a:chOff x="0" y="0"/>
+          <a:chExt cx="0" cy="0"/>
+        </a:xfrm>
+      </p:grpSpPr>
+      <p:sp>
+        <p:nvSpPr>
+          <p:cNvPr id="2" name="Slide Image Placeholder 1"/>
+          <p:cNvSpPr>
+            <a:spLocks noGrp="1" noRot="1" noChangeAspect="1"/>
+          </p:cNvSpPr>
+          <p:nvPr>
+            <p:ph type="sldImg"/>
+          </p:nvPr>
+        </p:nvSpPr>
+        <p:spPr/>
+      </p:sp>
+      <p:sp>
+        <p:nvSpPr>
+          <p:cNvPr id="3" name="Notes Placeholder 2"/>
+          <p:cNvSpPr>
+            <a:spLocks noGrp="1"/>
+          </p:cNvSpPr>
+          <p:nvPr>
+            <p:ph type="body" idx="1"/>
+          </p:nvPr>
+        </p:nvSpPr>
+        <p:spPr/>
+        <p:txBody>
+          <a:bodyPr/>
+          <a:lstStyle/>
+          <a:p>
+            <a:endParaRPr lang="en-US" dirty="0"/>
+          </a:p>
+        </p:txBody>
+      </p:sp>
+      <p:sp>
+        <p:nvSpPr>
+          <p:cNvPr id="4" name="Slide Number Placeholder 3"/>
+          <p:cNvSpPr>
+            <a:spLocks noGrp="1"/>
+          </p:cNvSpPr>
+          <p:nvPr>
+            <p:ph type="sldNum" sz="quarter" idx="10"/>
+          </p:nvPr>
+        </p:nvSpPr>
+        <p:spPr/>
+        <p:txBody>
+          <a:bodyPr/>
+          <a:lstStyle/>
+          <a:p>
+            <a:fld id="{2788907E-C72E-4D7B-B8CA-F158589AC799}" type="slidenum">
+              <a:rPr lang="en-US" smtClean="0"/>
+              <a:t>3</a:t>
+            </a:fld>
+            <a:endParaRPr lang="en-US"/>
+          </a:p>
+        </p:txBody>
+      </p:sp>
+    </p:spTree>
+    <p:extLst>
+      <p:ext uri="{BB962C8B-B14F-4D97-AF65-F5344CB8AC3E}">
+        <p14:creationId xmlns:p14="http://schemas.microsoft.com/office/powerpoint/2010/main" val="920458809"/>
+      </p:ext>
+    </p:extLst>
+  </p:cSld>
+  <p:clrMapOvr>
+    <a:masterClrMapping/>
+  </p:clrMapOvr>
+</p:notes>
+</file>
+
+<file path=ppt/notesSlides/notesSlide4.xml><?xml version="1.0" encoding="utf-8"?>
+<p:notes xmlns:a="http://schemas.openxmlformats.org/drawingml/2006/main" xmlns:r="http://schemas.openxmlformats.org/officeDocument/2006/relationships" xmlns:p="http://schemas.openxmlformats.org/presentationml/2006/main">
+  <p:cSld>
+    <p:spTree>
+      <p:nvGrpSpPr>
+        <p:cNvPr id="1" name=""/>
+        <p:cNvGrpSpPr/>
+        <p:nvPr/>
+      </p:nvGrpSpPr>
+      <p:grpSpPr>
+        <a:xfrm>
+          <a:off x="0" y="0"/>
+          <a:ext cx="0" cy="0"/>
+          <a:chOff x="0" y="0"/>
+          <a:chExt cx="0" cy="0"/>
+        </a:xfrm>
+      </p:grpSpPr>
+      <p:sp>
+        <p:nvSpPr>
+          <p:cNvPr id="2" name="Slide Image Placeholder 1"/>
+          <p:cNvSpPr>
+            <a:spLocks noGrp="1" noRot="1" noChangeAspect="1"/>
+          </p:cNvSpPr>
+          <p:nvPr>
+            <p:ph type="sldImg"/>
+          </p:nvPr>
+        </p:nvSpPr>
+        <p:spPr/>
+      </p:sp>
+      <p:sp>
+        <p:nvSpPr>
+          <p:cNvPr id="3" name="Notes Placeholder 2"/>
+          <p:cNvSpPr>
+            <a:spLocks noGrp="1"/>
+          </p:cNvSpPr>
+          <p:nvPr>
+            <p:ph type="body" idx="1"/>
+          </p:nvPr>
+        </p:nvSpPr>
+        <p:spPr/>
+        <p:txBody>
+          <a:bodyPr/>
+          <a:lstStyle/>
+          <a:p>
+            <a:r>
+              <a:rPr lang="en-US" dirty="0" smtClean="0"/>
+              <a:t>Did</a:t>
+            </a:r>
+            <a:r>
+              <a:rPr lang="en-US" baseline="0" dirty="0" smtClean="0"/>
+              <a:t> several versions of models, -- but almost all confirm the qualitative pattern</a:t>
+            </a:r>
+          </a:p>
+          <a:p>
+            <a:r>
+              <a:rPr lang="en-US" baseline="0" dirty="0" smtClean="0"/>
+              <a:t>(why say almost all which ones are different)</a:t>
+            </a:r>
+          </a:p>
+          <a:p>
+            <a:endParaRPr lang="en-US" dirty="0"/>
+          </a:p>
+        </p:txBody>
+      </p:sp>
+      <p:sp>
+        <p:nvSpPr>
+          <p:cNvPr id="4" name="Slide Number Placeholder 3"/>
+          <p:cNvSpPr>
+            <a:spLocks noGrp="1"/>
+          </p:cNvSpPr>
+          <p:nvPr>
+            <p:ph type="sldNum" sz="quarter" idx="10"/>
+          </p:nvPr>
+        </p:nvSpPr>
+        <p:spPr/>
+        <p:txBody>
+          <a:bodyPr/>
+          <a:lstStyle/>
+          <a:p>
+            <a:fld id="{2788907E-C72E-4D7B-B8CA-F158589AC799}" type="slidenum">
+              <a:rPr lang="en-US" smtClean="0"/>
+              <a:t>4</a:t>
+            </a:fld>
+            <a:endParaRPr lang="en-US"/>
+          </a:p>
+        </p:txBody>
+      </p:sp>
+    </p:spTree>
+    <p:extLst>
+      <p:ext uri="{BB962C8B-B14F-4D97-AF65-F5344CB8AC3E}">
+        <p14:creationId xmlns:p14="http://schemas.microsoft.com/office/powerpoint/2010/main" val="3289202867"/>
+      </p:ext>
+    </p:extLst>
+  </p:cSld>
+  <p:clrMapOvr>
+    <a:masterClrMapping/>
+  </p:clrMapOvr>
+</p:notes>
+</file>
+
+<file path=ppt/notesSlides/notesSlide5.xml><?xml version="1.0" encoding="utf-8"?>
+<p:notes xmlns:a="http://schemas.openxmlformats.org/drawingml/2006/main" xmlns:r="http://schemas.openxmlformats.org/officeDocument/2006/relationships" xmlns:p="http://schemas.openxmlformats.org/presentationml/2006/main">
+  <p:cSld>
+    <p:spTree>
+      <p:nvGrpSpPr>
+        <p:cNvPr id="1" name=""/>
+        <p:cNvGrpSpPr/>
+        <p:nvPr/>
+      </p:nvGrpSpPr>
+      <p:grpSpPr>
+        <a:xfrm>
+          <a:off x="0" y="0"/>
+          <a:ext cx="0" cy="0"/>
+          <a:chOff x="0" y="0"/>
+          <a:chExt cx="0" cy="0"/>
+        </a:xfrm>
+      </p:grpSpPr>
+      <p:sp>
+        <p:nvSpPr>
+          <p:cNvPr id="2" name="Slide Image Placeholder 1"/>
+          <p:cNvSpPr>
+            <a:spLocks noGrp="1" noRot="1" noChangeAspect="1"/>
+          </p:cNvSpPr>
+          <p:nvPr>
+            <p:ph type="sldImg"/>
+          </p:nvPr>
+        </p:nvSpPr>
+        <p:spPr/>
+      </p:sp>
+      <p:sp>
+        <p:nvSpPr>
+          <p:cNvPr id="3" name="Notes Placeholder 2"/>
+          <p:cNvSpPr>
+            <a:spLocks noGrp="1"/>
+          </p:cNvSpPr>
+          <p:nvPr>
+            <p:ph type="body" idx="1"/>
+          </p:nvPr>
+        </p:nvSpPr>
+        <p:spPr/>
+        <p:txBody>
+          <a:bodyPr/>
+          <a:lstStyle/>
+          <a:p>
+            <a:r>
               <a:rPr lang="en-US" dirty="0" err="1" smtClean="0"/>
               <a:t>gwRR</a:t>
             </a:r>
             <a:r>
               <a:rPr lang="en-US" dirty="0" smtClean="0"/>
-              <a:t> averages are backed up with</a:t>
+              <a:t> </a:t>
+            </a:r>
+            <a:r>
+              <a:rPr lang="en-US" dirty="0" smtClean="0"/>
+              <a:t>averages </a:t>
+            </a:r>
+            <a:r>
+              <a:rPr lang="en-US" dirty="0" smtClean="0"/>
+              <a:t>are backed up with</a:t>
             </a:r>
             <a:r>
               <a:rPr lang="en-US" baseline="0" dirty="0" smtClean="0"/>
@@ -631,8 +1113,23 @@
             </a:r>
             <a:r>
               <a:rPr lang="en-US" baseline="0" dirty="0" smtClean="0"/>
-              <a:t> level</a:t>
-            </a:r>
+              <a:t> </a:t>
+            </a:r>
+            <a:r>
+              <a:rPr lang="en-US" baseline="0" dirty="0" smtClean="0"/>
+              <a:t>level</a:t>
+            </a:r>
+          </a:p>
+          <a:p>
+            <a:endParaRPr lang="en-US" baseline="0" dirty="0" smtClean="0"/>
+          </a:p>
+          <a:p>
+            <a:r>
+              <a:rPr lang="en-US" baseline="0" dirty="0" smtClean="0"/>
+              <a:t>Merge this with the genome wide model</a:t>
+            </a:r>
+          </a:p>
+          <a:p>
             <a:endParaRPr lang="en-US" dirty="0"/>
           </a:p>
         </p:txBody>
@@ -654,7 +1151,7 @@
           <a:p>
             <a:fld id="{2788907E-C72E-4D7B-B8CA-F158589AC799}" type="slidenum">
               <a:rPr lang="en-US" smtClean="0"/>
-              <a:t>4</a:t>
+              <a:t>5</a:t>
             </a:fld>
             <a:endParaRPr lang="en-US"/>
           </a:p>
@@ -664,6 +1161,611 @@
     <p:extLst>
       <p:ext uri="{BB962C8B-B14F-4D97-AF65-F5344CB8AC3E}">
         <p14:creationId xmlns:p14="http://schemas.microsoft.com/office/powerpoint/2010/main" val="231915105"/>
+      </p:ext>
+    </p:extLst>
+  </p:cSld>
+  <p:clrMapOvr>
+    <a:masterClrMapping/>
+  </p:clrMapOvr>
+</p:notes>
+</file>
+
+<file path=ppt/notesSlides/notesSlide6.xml><?xml version="1.0" encoding="utf-8"?>
+<p:notes xmlns:a="http://schemas.openxmlformats.org/drawingml/2006/main" xmlns:r="http://schemas.openxmlformats.org/officeDocument/2006/relationships" xmlns:p="http://schemas.openxmlformats.org/presentationml/2006/main">
+  <p:cSld>
+    <p:spTree>
+      <p:nvGrpSpPr>
+        <p:cNvPr id="1" name=""/>
+        <p:cNvGrpSpPr/>
+        <p:nvPr/>
+      </p:nvGrpSpPr>
+      <p:grpSpPr>
+        <a:xfrm>
+          <a:off x="0" y="0"/>
+          <a:ext cx="0" cy="0"/>
+          <a:chOff x="0" y="0"/>
+          <a:chExt cx="0" cy="0"/>
+        </a:xfrm>
+      </p:grpSpPr>
+      <p:sp>
+        <p:nvSpPr>
+          <p:cNvPr id="2" name="Slide Image Placeholder 1"/>
+          <p:cNvSpPr>
+            <a:spLocks noGrp="1" noRot="1" noChangeAspect="1"/>
+          </p:cNvSpPr>
+          <p:nvPr>
+            <p:ph type="sldImg"/>
+          </p:nvPr>
+        </p:nvSpPr>
+        <p:spPr/>
+      </p:sp>
+      <p:sp>
+        <p:nvSpPr>
+          <p:cNvPr id="3" name="Notes Placeholder 2"/>
+          <p:cNvSpPr>
+            <a:spLocks noGrp="1"/>
+          </p:cNvSpPr>
+          <p:nvPr>
+            <p:ph type="body" idx="1"/>
+          </p:nvPr>
+        </p:nvSpPr>
+        <p:spPr/>
+        <p:txBody>
+          <a:bodyPr/>
+          <a:lstStyle/>
+          <a:p>
+            <a:r>
+              <a:rPr lang="en-US" dirty="0" smtClean="0"/>
+              <a:t>(motivation)</a:t>
+            </a:r>
+          </a:p>
+          <a:p>
+            <a:r>
+              <a:rPr lang="en-US" dirty="0" smtClean="0"/>
+              <a:t>Given the findings</a:t>
+            </a:r>
+            <a:r>
+              <a:rPr lang="en-US" baseline="0" dirty="0" smtClean="0"/>
+              <a:t> with the </a:t>
+            </a:r>
+            <a:r>
+              <a:rPr lang="en-US" baseline="0" dirty="0" err="1" smtClean="0"/>
+              <a:t>gwRR</a:t>
+            </a:r>
+            <a:r>
+              <a:rPr lang="en-US" baseline="0" dirty="0" smtClean="0"/>
+              <a:t> -&gt; </a:t>
+            </a:r>
+            <a:r>
+              <a:rPr lang="en-US" baseline="0" dirty="0" err="1" smtClean="0"/>
+              <a:t>chrm</a:t>
+            </a:r>
+            <a:r>
+              <a:rPr lang="en-US" baseline="0" dirty="0" smtClean="0"/>
+              <a:t> proportions -&gt; look at single bivalent pattern</a:t>
+            </a:r>
+          </a:p>
+          <a:p>
+            <a:endParaRPr lang="en-US" baseline="0" dirty="0" smtClean="0"/>
+          </a:p>
+          <a:p>
+            <a:r>
+              <a:rPr lang="en-US" baseline="0" dirty="0" smtClean="0"/>
+              <a:t>(chromatin compaction, interference and known sex specific rec landscape features)</a:t>
+            </a:r>
+          </a:p>
+          <a:p>
+            <a:endParaRPr lang="en-US" baseline="0" dirty="0" smtClean="0"/>
+          </a:p>
+          <a:p>
+            <a:r>
+              <a:rPr lang="en-US" baseline="0" dirty="0" smtClean="0"/>
+              <a:t>(Brief summary for dataset)</a:t>
+            </a:r>
+          </a:p>
+          <a:p>
+            <a:endParaRPr lang="en-US" baseline="0" dirty="0" smtClean="0"/>
+          </a:p>
+          <a:p>
+            <a:r>
+              <a:rPr lang="en-US" baseline="0" dirty="0" smtClean="0"/>
+              <a:t>(Focus is on 2 main questions)</a:t>
+            </a:r>
+          </a:p>
+          <a:p>
+            <a:endParaRPr lang="en-US" baseline="0" dirty="0" smtClean="0"/>
+          </a:p>
+          <a:p>
+            <a:r>
+              <a:rPr lang="en-US" baseline="0" dirty="0" smtClean="0"/>
+              <a:t>Animate so that they appear sequentially, then ii) fades</a:t>
+            </a:r>
+          </a:p>
+          <a:p>
+            <a:endParaRPr lang="en-US" baseline="0" dirty="0" smtClean="0"/>
+          </a:p>
+          <a:p>
+            <a:r>
+              <a:rPr lang="en-US" dirty="0" smtClean="0"/>
+              <a:t>Example questions</a:t>
+            </a:r>
+            <a:endParaRPr lang="en-US" dirty="0"/>
+          </a:p>
+        </p:txBody>
+      </p:sp>
+      <p:sp>
+        <p:nvSpPr>
+          <p:cNvPr id="4" name="Slide Number Placeholder 3"/>
+          <p:cNvSpPr>
+            <a:spLocks noGrp="1"/>
+          </p:cNvSpPr>
+          <p:nvPr>
+            <p:ph type="sldNum" sz="quarter" idx="10"/>
+          </p:nvPr>
+        </p:nvSpPr>
+        <p:spPr/>
+        <p:txBody>
+          <a:bodyPr/>
+          <a:lstStyle/>
+          <a:p>
+            <a:fld id="{2788907E-C72E-4D7B-B8CA-F158589AC799}" type="slidenum">
+              <a:rPr lang="en-US" smtClean="0"/>
+              <a:t>6</a:t>
+            </a:fld>
+            <a:endParaRPr lang="en-US"/>
+          </a:p>
+        </p:txBody>
+      </p:sp>
+    </p:spTree>
+    <p:extLst>
+      <p:ext uri="{BB962C8B-B14F-4D97-AF65-F5344CB8AC3E}">
+        <p14:creationId xmlns:p14="http://schemas.microsoft.com/office/powerpoint/2010/main" val="2620983905"/>
+      </p:ext>
+    </p:extLst>
+  </p:cSld>
+  <p:clrMapOvr>
+    <a:masterClrMapping/>
+  </p:clrMapOvr>
+</p:notes>
+</file>
+
+<file path=ppt/notesSlides/notesSlide7.xml><?xml version="1.0" encoding="utf-8"?>
+<p:notes xmlns:a="http://schemas.openxmlformats.org/drawingml/2006/main" xmlns:r="http://schemas.openxmlformats.org/officeDocument/2006/relationships" xmlns:p="http://schemas.openxmlformats.org/presentationml/2006/main">
+  <p:cSld>
+    <p:spTree>
+      <p:nvGrpSpPr>
+        <p:cNvPr id="1" name=""/>
+        <p:cNvGrpSpPr/>
+        <p:nvPr/>
+      </p:nvGrpSpPr>
+      <p:grpSpPr>
+        <a:xfrm>
+          <a:off x="0" y="0"/>
+          <a:ext cx="0" cy="0"/>
+          <a:chOff x="0" y="0"/>
+          <a:chExt cx="0" cy="0"/>
+        </a:xfrm>
+      </p:grpSpPr>
+      <p:sp>
+        <p:nvSpPr>
+          <p:cNvPr id="2" name="Slide Image Placeholder 1"/>
+          <p:cNvSpPr>
+            <a:spLocks noGrp="1" noRot="1" noChangeAspect="1"/>
+          </p:cNvSpPr>
+          <p:nvPr>
+            <p:ph type="sldImg"/>
+          </p:nvPr>
+        </p:nvSpPr>
+        <p:spPr/>
+      </p:sp>
+      <p:sp>
+        <p:nvSpPr>
+          <p:cNvPr id="3" name="Notes Placeholder 2"/>
+          <p:cNvSpPr>
+            <a:spLocks noGrp="1"/>
+          </p:cNvSpPr>
+          <p:nvPr>
+            <p:ph type="body" idx="1"/>
+          </p:nvPr>
+        </p:nvSpPr>
+        <p:spPr/>
+        <p:txBody>
+          <a:bodyPr/>
+          <a:lstStyle/>
+          <a:p>
+            <a:endParaRPr lang="en-US" dirty="0" smtClean="0"/>
+          </a:p>
+          <a:p>
+            <a:r>
+              <a:rPr lang="en-US" dirty="0" smtClean="0"/>
+              <a:t>The</a:t>
+            </a:r>
+            <a:r>
+              <a:rPr lang="en-US" baseline="0" dirty="0" smtClean="0"/>
+              <a:t> overall narrative I’m trying to weave – more variance in females</a:t>
+            </a:r>
+          </a:p>
+          <a:p>
+            <a:r>
+              <a:rPr lang="en-US" baseline="0" dirty="0" smtClean="0"/>
+              <a:t>-Between cells (MLH1 counts)</a:t>
+            </a:r>
+          </a:p>
+          <a:p>
+            <a:r>
+              <a:rPr lang="en-US" baseline="0" dirty="0" smtClean="0"/>
+              <a:t>- Uniform spacing (the 1CO position is not regulated)  (F1 variance is probably larger (F1nrm))</a:t>
+            </a:r>
+          </a:p>
+          <a:p>
+            <a:r>
+              <a:rPr lang="en-US" baseline="0" dirty="0" smtClean="0"/>
+              <a:t>- IFD spacing / interference strength</a:t>
+            </a:r>
+          </a:p>
+          <a:p>
+            <a:endParaRPr lang="en-US" dirty="0" smtClean="0"/>
+          </a:p>
+          <a:p>
+            <a:r>
+              <a:rPr lang="en-US" dirty="0" smtClean="0"/>
+              <a:t>- Lack of distinction between</a:t>
+            </a:r>
+            <a:r>
+              <a:rPr lang="en-US" baseline="0" dirty="0" smtClean="0"/>
+              <a:t> 1CO and 2CO lengths</a:t>
+            </a:r>
+            <a:endParaRPr lang="en-US" dirty="0" smtClean="0"/>
+          </a:p>
+          <a:p>
+            <a:endParaRPr lang="en-US" dirty="0" smtClean="0"/>
+          </a:p>
+          <a:p>
+            <a:r>
+              <a:rPr lang="en-US" dirty="0" smtClean="0"/>
+              <a:t>(longer</a:t>
+            </a:r>
+            <a:r>
+              <a:rPr lang="en-US" baseline="0" dirty="0" smtClean="0"/>
+              <a:t> SC lengths (variance in SC length / I’m not sure this makes sense)</a:t>
+            </a:r>
+            <a:r>
+              <a:rPr lang="en-US" dirty="0" smtClean="0"/>
+              <a:t>)</a:t>
+            </a:r>
+            <a:endParaRPr lang="en-US" dirty="0"/>
+          </a:p>
+        </p:txBody>
+      </p:sp>
+      <p:sp>
+        <p:nvSpPr>
+          <p:cNvPr id="4" name="Slide Number Placeholder 3"/>
+          <p:cNvSpPr>
+            <a:spLocks noGrp="1"/>
+          </p:cNvSpPr>
+          <p:nvPr>
+            <p:ph type="sldNum" sz="quarter" idx="10"/>
+          </p:nvPr>
+        </p:nvSpPr>
+        <p:spPr/>
+        <p:txBody>
+          <a:bodyPr/>
+          <a:lstStyle/>
+          <a:p>
+            <a:fld id="{2788907E-C72E-4D7B-B8CA-F158589AC799}" type="slidenum">
+              <a:rPr lang="en-US" smtClean="0"/>
+              <a:t>9</a:t>
+            </a:fld>
+            <a:endParaRPr lang="en-US"/>
+          </a:p>
+        </p:txBody>
+      </p:sp>
+    </p:spTree>
+    <p:extLst>
+      <p:ext uri="{BB962C8B-B14F-4D97-AF65-F5344CB8AC3E}">
+        <p14:creationId xmlns:p14="http://schemas.microsoft.com/office/powerpoint/2010/main" val="1496181675"/>
+      </p:ext>
+    </p:extLst>
+  </p:cSld>
+  <p:clrMapOvr>
+    <a:masterClrMapping/>
+  </p:clrMapOvr>
+</p:notes>
+</file>
+
+<file path=ppt/notesSlides/notesSlide8.xml><?xml version="1.0" encoding="utf-8"?>
+<p:notes xmlns:a="http://schemas.openxmlformats.org/drawingml/2006/main" xmlns:r="http://schemas.openxmlformats.org/officeDocument/2006/relationships" xmlns:p="http://schemas.openxmlformats.org/presentationml/2006/main">
+  <p:cSld>
+    <p:spTree>
+      <p:nvGrpSpPr>
+        <p:cNvPr id="1" name=""/>
+        <p:cNvGrpSpPr/>
+        <p:nvPr/>
+      </p:nvGrpSpPr>
+      <p:grpSpPr>
+        <a:xfrm>
+          <a:off x="0" y="0"/>
+          <a:ext cx="0" cy="0"/>
+          <a:chOff x="0" y="0"/>
+          <a:chExt cx="0" cy="0"/>
+        </a:xfrm>
+      </p:grpSpPr>
+      <p:sp>
+        <p:nvSpPr>
+          <p:cNvPr id="2" name="Slide Image Placeholder 1"/>
+          <p:cNvSpPr>
+            <a:spLocks noGrp="1" noRot="1" noChangeAspect="1"/>
+          </p:cNvSpPr>
+          <p:nvPr>
+            <p:ph type="sldImg"/>
+          </p:nvPr>
+        </p:nvSpPr>
+        <p:spPr/>
+      </p:sp>
+      <p:sp>
+        <p:nvSpPr>
+          <p:cNvPr id="3" name="Notes Placeholder 2"/>
+          <p:cNvSpPr>
+            <a:spLocks noGrp="1"/>
+          </p:cNvSpPr>
+          <p:nvPr>
+            <p:ph type="body" idx="1"/>
+          </p:nvPr>
+        </p:nvSpPr>
+        <p:spPr/>
+        <p:txBody>
+          <a:bodyPr/>
+          <a:lstStyle/>
+          <a:p>
+            <a:r>
+              <a:rPr lang="en-US" dirty="0" smtClean="0"/>
+              <a:t>The</a:t>
+            </a:r>
+            <a:r>
+              <a:rPr lang="en-US" baseline="0" dirty="0" smtClean="0"/>
+              <a:t> overall narrative I’m trying to weave – more variance in females</a:t>
+            </a:r>
+          </a:p>
+          <a:p>
+            <a:r>
+              <a:rPr lang="en-US" baseline="0" dirty="0" smtClean="0"/>
+              <a:t>-Between cells (MLH1 counts)</a:t>
+            </a:r>
+          </a:p>
+          <a:p>
+            <a:r>
+              <a:rPr lang="en-US" baseline="0" dirty="0" smtClean="0"/>
+              <a:t>- Uniform spacing (the 1CO position is not regulated)  (F1 variance is probably larger (F1nrm))</a:t>
+            </a:r>
+          </a:p>
+          <a:p>
+            <a:r>
+              <a:rPr lang="en-US" baseline="0" dirty="0" smtClean="0"/>
+              <a:t>- IFD spacing / interference strength</a:t>
+            </a:r>
+          </a:p>
+          <a:p>
+            <a:endParaRPr lang="en-US" dirty="0" smtClean="0"/>
+          </a:p>
+          <a:p>
+            <a:r>
+              <a:rPr lang="en-US" dirty="0" smtClean="0"/>
+              <a:t>- Lack of distinction between</a:t>
+            </a:r>
+            <a:r>
+              <a:rPr lang="en-US" baseline="0" dirty="0" smtClean="0"/>
+              <a:t> 1CO and 2CO lengths</a:t>
+            </a:r>
+            <a:endParaRPr lang="en-US" dirty="0" smtClean="0"/>
+          </a:p>
+          <a:p>
+            <a:endParaRPr lang="en-US" dirty="0" smtClean="0"/>
+          </a:p>
+          <a:p>
+            <a:r>
+              <a:rPr lang="en-US" dirty="0" smtClean="0"/>
+              <a:t>(longer</a:t>
+            </a:r>
+            <a:r>
+              <a:rPr lang="en-US" baseline="0" dirty="0" smtClean="0"/>
+              <a:t> SC lengths (variance in SC length / I’m not sure this makes sense)</a:t>
+            </a:r>
+            <a:r>
+              <a:rPr lang="en-US" dirty="0" smtClean="0"/>
+              <a:t>)</a:t>
+            </a:r>
+          </a:p>
+          <a:p>
+            <a:endParaRPr lang="en-US" dirty="0"/>
+          </a:p>
+        </p:txBody>
+      </p:sp>
+      <p:sp>
+        <p:nvSpPr>
+          <p:cNvPr id="4" name="Slide Number Placeholder 3"/>
+          <p:cNvSpPr>
+            <a:spLocks noGrp="1"/>
+          </p:cNvSpPr>
+          <p:nvPr>
+            <p:ph type="sldNum" sz="quarter" idx="10"/>
+          </p:nvPr>
+        </p:nvSpPr>
+        <p:spPr/>
+        <p:txBody>
+          <a:bodyPr/>
+          <a:lstStyle/>
+          <a:p>
+            <a:fld id="{2788907E-C72E-4D7B-B8CA-F158589AC799}" type="slidenum">
+              <a:rPr lang="en-US" smtClean="0"/>
+              <a:t>10</a:t>
+            </a:fld>
+            <a:endParaRPr lang="en-US"/>
+          </a:p>
+        </p:txBody>
+      </p:sp>
+    </p:spTree>
+    <p:extLst>
+      <p:ext uri="{BB962C8B-B14F-4D97-AF65-F5344CB8AC3E}">
+        <p14:creationId xmlns:p14="http://schemas.microsoft.com/office/powerpoint/2010/main" val="3243097393"/>
+      </p:ext>
+    </p:extLst>
+  </p:cSld>
+  <p:clrMapOvr>
+    <a:masterClrMapping/>
+  </p:clrMapOvr>
+</p:notes>
+</file>
+
+<file path=ppt/notesSlides/notesSlide9.xml><?xml version="1.0" encoding="utf-8"?>
+<p:notes xmlns:a="http://schemas.openxmlformats.org/drawingml/2006/main" xmlns:r="http://schemas.openxmlformats.org/officeDocument/2006/relationships" xmlns:p="http://schemas.openxmlformats.org/presentationml/2006/main">
+  <p:cSld>
+    <p:spTree>
+      <p:nvGrpSpPr>
+        <p:cNvPr id="1" name=""/>
+        <p:cNvGrpSpPr/>
+        <p:nvPr/>
+      </p:nvGrpSpPr>
+      <p:grpSpPr>
+        <a:xfrm>
+          <a:off x="0" y="0"/>
+          <a:ext cx="0" cy="0"/>
+          <a:chOff x="0" y="0"/>
+          <a:chExt cx="0" cy="0"/>
+        </a:xfrm>
+      </p:grpSpPr>
+      <p:sp>
+        <p:nvSpPr>
+          <p:cNvPr id="2" name="Slide Image Placeholder 1"/>
+          <p:cNvSpPr>
+            <a:spLocks noGrp="1" noRot="1" noChangeAspect="1"/>
+          </p:cNvSpPr>
+          <p:nvPr>
+            <p:ph type="sldImg"/>
+          </p:nvPr>
+        </p:nvSpPr>
+        <p:spPr/>
+      </p:sp>
+      <p:sp>
+        <p:nvSpPr>
+          <p:cNvPr id="3" name="Notes Placeholder 2"/>
+          <p:cNvSpPr>
+            <a:spLocks noGrp="1"/>
+          </p:cNvSpPr>
+          <p:nvPr>
+            <p:ph type="body" idx="1"/>
+          </p:nvPr>
+        </p:nvSpPr>
+        <p:spPr/>
+        <p:txBody>
+          <a:bodyPr/>
+          <a:lstStyle/>
+          <a:p>
+            <a:r>
+              <a:rPr lang="en-US" dirty="0" smtClean="0"/>
+              <a:t>(motivation)</a:t>
+            </a:r>
+          </a:p>
+          <a:p>
+            <a:r>
+              <a:rPr lang="en-US" dirty="0" smtClean="0"/>
+              <a:t>Given the findings</a:t>
+            </a:r>
+            <a:r>
+              <a:rPr lang="en-US" baseline="0" dirty="0" smtClean="0"/>
+              <a:t> with the </a:t>
+            </a:r>
+            <a:r>
+              <a:rPr lang="en-US" baseline="0" dirty="0" err="1" smtClean="0"/>
+              <a:t>gwRR</a:t>
+            </a:r>
+            <a:r>
+              <a:rPr lang="en-US" baseline="0" dirty="0" smtClean="0"/>
+              <a:t> -&gt; </a:t>
+            </a:r>
+            <a:r>
+              <a:rPr lang="en-US" baseline="0" dirty="0" err="1" smtClean="0"/>
+              <a:t>chrm</a:t>
+            </a:r>
+            <a:r>
+              <a:rPr lang="en-US" baseline="0" dirty="0" smtClean="0"/>
+              <a:t> proportions -&gt; look at single bivalent pattern</a:t>
+            </a:r>
+          </a:p>
+          <a:p>
+            <a:endParaRPr lang="en-US" baseline="0" dirty="0" smtClean="0"/>
+          </a:p>
+          <a:p>
+            <a:r>
+              <a:rPr lang="en-US" baseline="0" dirty="0" smtClean="0"/>
+              <a:t>(chromatin compaction, interference and known sex specific rec landscape features)</a:t>
+            </a:r>
+          </a:p>
+          <a:p>
+            <a:endParaRPr lang="en-US" baseline="0" dirty="0" smtClean="0"/>
+          </a:p>
+          <a:p>
+            <a:r>
+              <a:rPr lang="en-US" baseline="0" dirty="0" smtClean="0"/>
+              <a:t>(Brief summary for dataset)</a:t>
+            </a:r>
+          </a:p>
+          <a:p>
+            <a:endParaRPr lang="en-US" baseline="0" dirty="0" smtClean="0"/>
+          </a:p>
+          <a:p>
+            <a:r>
+              <a:rPr lang="en-US" baseline="0" dirty="0" smtClean="0"/>
+              <a:t>(Focus is on 2 main questions)</a:t>
+            </a:r>
+          </a:p>
+          <a:p>
+            <a:endParaRPr lang="en-US" baseline="0" dirty="0" smtClean="0"/>
+          </a:p>
+          <a:p>
+            <a:r>
+              <a:rPr lang="en-US" baseline="0" dirty="0" smtClean="0"/>
+              <a:t>Animate so that they appear sequentially, then ii) fades</a:t>
+            </a:r>
+          </a:p>
+          <a:p>
+            <a:endParaRPr lang="en-US" baseline="0" dirty="0" smtClean="0"/>
+          </a:p>
+          <a:p>
+            <a:r>
+              <a:rPr lang="en-US" dirty="0" smtClean="0"/>
+              <a:t>Example questions</a:t>
+            </a:r>
+            <a:endParaRPr lang="en-US" dirty="0"/>
+          </a:p>
+        </p:txBody>
+      </p:sp>
+      <p:sp>
+        <p:nvSpPr>
+          <p:cNvPr id="4" name="Slide Number Placeholder 3"/>
+          <p:cNvSpPr>
+            <a:spLocks noGrp="1"/>
+          </p:cNvSpPr>
+          <p:nvPr>
+            <p:ph type="sldNum" sz="quarter" idx="10"/>
+          </p:nvPr>
+        </p:nvSpPr>
+        <p:spPr/>
+        <p:txBody>
+          <a:bodyPr/>
+          <a:lstStyle/>
+          <a:p>
+            <a:fld id="{2788907E-C72E-4D7B-B8CA-F158589AC799}" type="slidenum">
+              <a:rPr lang="en-US" smtClean="0"/>
+              <a:t>11</a:t>
+            </a:fld>
+            <a:endParaRPr lang="en-US"/>
+          </a:p>
+        </p:txBody>
+      </p:sp>
+    </p:spTree>
+    <p:extLst>
+      <p:ext uri="{BB962C8B-B14F-4D97-AF65-F5344CB8AC3E}">
+        <p14:creationId xmlns:p14="http://schemas.microsoft.com/office/powerpoint/2010/main" val="3575860465"/>
       </p:ext>
     </p:extLst>
   </p:cSld>
@@ -804,7 +1906,7 @@
           <a:p>
             <a:fld id="{BA11E091-050C-4DAB-ABC8-34B3B7B173DA}" type="datetimeFigureOut">
               <a:rPr lang="en-US" smtClean="0"/>
-              <a:t>1/30/2020</a:t>
+              <a:t>2/2/2020</a:t>
             </a:fld>
             <a:endParaRPr lang="en-US"/>
           </a:p>
@@ -974,7 +2076,7 @@
           <a:p>
             <a:fld id="{BA11E091-050C-4DAB-ABC8-34B3B7B173DA}" type="datetimeFigureOut">
               <a:rPr lang="en-US" smtClean="0"/>
-              <a:t>1/30/2020</a:t>
+              <a:t>2/2/2020</a:t>
             </a:fld>
             <a:endParaRPr lang="en-US"/>
           </a:p>
@@ -1154,7 +2256,7 @@
           <a:p>
             <a:fld id="{BA11E091-050C-4DAB-ABC8-34B3B7B173DA}" type="datetimeFigureOut">
               <a:rPr lang="en-US" smtClean="0"/>
-              <a:t>1/30/2020</a:t>
+              <a:t>2/2/2020</a:t>
             </a:fld>
             <a:endParaRPr lang="en-US"/>
           </a:p>
@@ -1324,7 +2426,7 @@
           <a:p>
             <a:fld id="{BA11E091-050C-4DAB-ABC8-34B3B7B173DA}" type="datetimeFigureOut">
               <a:rPr lang="en-US" smtClean="0"/>
-              <a:t>1/30/2020</a:t>
+              <a:t>2/2/2020</a:t>
             </a:fld>
             <a:endParaRPr lang="en-US"/>
           </a:p>
@@ -1570,7 +2672,7 @@
           <a:p>
             <a:fld id="{BA11E091-050C-4DAB-ABC8-34B3B7B173DA}" type="datetimeFigureOut">
               <a:rPr lang="en-US" smtClean="0"/>
-              <a:t>1/30/2020</a:t>
+              <a:t>2/2/2020</a:t>
             </a:fld>
             <a:endParaRPr lang="en-US"/>
           </a:p>
@@ -1802,7 +2904,7 @@
           <a:p>
             <a:fld id="{BA11E091-050C-4DAB-ABC8-34B3B7B173DA}" type="datetimeFigureOut">
               <a:rPr lang="en-US" smtClean="0"/>
-              <a:t>1/30/2020</a:t>
+              <a:t>2/2/2020</a:t>
             </a:fld>
             <a:endParaRPr lang="en-US"/>
           </a:p>
@@ -2169,7 +3271,7 @@
           <a:p>
             <a:fld id="{BA11E091-050C-4DAB-ABC8-34B3B7B173DA}" type="datetimeFigureOut">
               <a:rPr lang="en-US" smtClean="0"/>
-              <a:t>1/30/2020</a:t>
+              <a:t>2/2/2020</a:t>
             </a:fld>
             <a:endParaRPr lang="en-US"/>
           </a:p>
@@ -2287,7 +3389,7 @@
           <a:p>
             <a:fld id="{BA11E091-050C-4DAB-ABC8-34B3B7B173DA}" type="datetimeFigureOut">
               <a:rPr lang="en-US" smtClean="0"/>
-              <a:t>1/30/2020</a:t>
+              <a:t>2/2/2020</a:t>
             </a:fld>
             <a:endParaRPr lang="en-US"/>
           </a:p>
@@ -2382,7 +3484,7 @@
           <a:p>
             <a:fld id="{BA11E091-050C-4DAB-ABC8-34B3B7B173DA}" type="datetimeFigureOut">
               <a:rPr lang="en-US" smtClean="0"/>
-              <a:t>1/30/2020</a:t>
+              <a:t>2/2/2020</a:t>
             </a:fld>
             <a:endParaRPr lang="en-US"/>
           </a:p>
@@ -2659,7 +3761,7 @@
           <a:p>
             <a:fld id="{BA11E091-050C-4DAB-ABC8-34B3B7B173DA}" type="datetimeFigureOut">
               <a:rPr lang="en-US" smtClean="0"/>
-              <a:t>1/30/2020</a:t>
+              <a:t>2/2/2020</a:t>
             </a:fld>
             <a:endParaRPr lang="en-US"/>
           </a:p>
@@ -2912,7 +4014,7 @@
           <a:p>
             <a:fld id="{BA11E091-050C-4DAB-ABC8-34B3B7B173DA}" type="datetimeFigureOut">
               <a:rPr lang="en-US" smtClean="0"/>
-              <a:t>1/30/2020</a:t>
+              <a:t>2/2/2020</a:t>
             </a:fld>
             <a:endParaRPr lang="en-US"/>
           </a:p>
@@ -3125,7 +4227,7 @@
           <a:p>
             <a:fld id="{BA11E091-050C-4DAB-ABC8-34B3B7B173DA}" type="datetimeFigureOut">
               <a:rPr lang="en-US" smtClean="0"/>
-              <a:t>1/30/2020</a:t>
+              <a:t>2/2/2020</a:t>
             </a:fld>
             <a:endParaRPr lang="en-US"/>
           </a:p>
@@ -3545,7 +4647,11 @@
           <a:bodyPr/>
           <a:lstStyle/>
           <a:p>
-            <a:endParaRPr lang="en-US"/>
+            <a:r>
+              <a:rPr lang="en-US" dirty="0" smtClean="0"/>
+              <a:t>MS results/outline</a:t>
+            </a:r>
+            <a:endParaRPr lang="en-US" dirty="0"/>
           </a:p>
         </p:txBody>
       </p:sp>
@@ -3578,6 +4684,1102 @@
   <p:clrMapOvr>
     <a:masterClrMapping/>
   </p:clrMapOvr>
+</p:sld>
+</file>
+
+<file path=ppt/slides/slide10.xml><?xml version="1.0" encoding="utf-8"?>
+<p:sld xmlns:a="http://schemas.openxmlformats.org/drawingml/2006/main" xmlns:r="http://schemas.openxmlformats.org/officeDocument/2006/relationships" xmlns:p="http://schemas.openxmlformats.org/presentationml/2006/main">
+  <p:cSld>
+    <p:spTree>
+      <p:nvGrpSpPr>
+        <p:cNvPr id="1" name=""/>
+        <p:cNvGrpSpPr/>
+        <p:nvPr/>
+      </p:nvGrpSpPr>
+      <p:grpSpPr>
+        <a:xfrm>
+          <a:off x="0" y="0"/>
+          <a:ext cx="0" cy="0"/>
+          <a:chOff x="0" y="0"/>
+          <a:chExt cx="0" cy="0"/>
+        </a:xfrm>
+      </p:grpSpPr>
+      <p:sp>
+        <p:nvSpPr>
+          <p:cNvPr id="2" name="Title 1"/>
+          <p:cNvSpPr>
+            <a:spLocks noGrp="1"/>
+          </p:cNvSpPr>
+          <p:nvPr>
+            <p:ph type="title"/>
+          </p:nvPr>
+        </p:nvSpPr>
+        <p:spPr/>
+        <p:txBody>
+          <a:bodyPr/>
+          <a:lstStyle/>
+          <a:p>
+            <a:r>
+              <a:rPr lang="en-US" dirty="0" smtClean="0"/>
+              <a:t>Summarize sex specific bivalent patterns</a:t>
+            </a:r>
+            <a:endParaRPr lang="en-US" dirty="0"/>
+          </a:p>
+        </p:txBody>
+      </p:sp>
+      <p:sp>
+        <p:nvSpPr>
+          <p:cNvPr id="3" name="Content Placeholder 2"/>
+          <p:cNvSpPr>
+            <a:spLocks noGrp="1"/>
+          </p:cNvSpPr>
+          <p:nvPr>
+            <p:ph idx="1"/>
+          </p:nvPr>
+        </p:nvSpPr>
+        <p:spPr/>
+        <p:txBody>
+          <a:bodyPr>
+            <a:normAutofit fontScale="92500" lnSpcReduction="10000"/>
+          </a:bodyPr>
+          <a:lstStyle/>
+          <a:p>
+            <a:r>
+              <a:rPr lang="en-US" dirty="0" smtClean="0"/>
+              <a:t>(figure ideas?)</a:t>
+            </a:r>
+          </a:p>
+          <a:p>
+            <a:r>
+              <a:rPr lang="en-US" dirty="0" smtClean="0"/>
+              <a:t>Main data / tables</a:t>
+            </a:r>
+          </a:p>
+          <a:p>
+            <a:pPr marL="0" indent="0">
+              <a:buNone/>
+            </a:pPr>
+            <a:r>
+              <a:rPr lang="en-US" dirty="0" smtClean="0"/>
+              <a:t>Conserved sex specific metrics for single bivalents during meiosis</a:t>
+            </a:r>
+          </a:p>
+          <a:p>
+            <a:pPr marL="0" indent="0">
+              <a:buNone/>
+            </a:pPr>
+            <a:r>
+              <a:rPr lang="en-US" dirty="0"/>
+              <a:t>	</a:t>
+            </a:r>
+            <a:r>
+              <a:rPr lang="en-US" dirty="0" smtClean="0"/>
+              <a:t>- SC compaction</a:t>
+            </a:r>
+          </a:p>
+          <a:p>
+            <a:pPr marL="0" indent="0">
+              <a:buNone/>
+            </a:pPr>
+            <a:r>
+              <a:rPr lang="en-US" dirty="0"/>
+              <a:t>	</a:t>
+            </a:r>
+            <a:r>
+              <a:rPr lang="en-US" dirty="0" smtClean="0"/>
+              <a:t>- uniform CO placement</a:t>
+            </a:r>
+          </a:p>
+          <a:p>
+            <a:pPr marL="0" indent="0">
+              <a:buNone/>
+            </a:pPr>
+            <a:r>
+              <a:rPr lang="en-US" dirty="0" smtClean="0"/>
+              <a:t>Surprise, interference is not conserved… (raw value long in females, normalized versions females have sub class of close together </a:t>
+            </a:r>
+          </a:p>
+          <a:p>
+            <a:pPr marL="0" indent="0">
+              <a:buNone/>
+            </a:pPr>
+            <a:endParaRPr lang="en-US" dirty="0"/>
+          </a:p>
+          <a:p>
+            <a:r>
+              <a:rPr lang="en-US" dirty="0" smtClean="0"/>
+              <a:t>General pattern – for revisiting in discussion</a:t>
+            </a:r>
+          </a:p>
+          <a:p>
+            <a:pPr marL="0" indent="0">
+              <a:buNone/>
+            </a:pPr>
+            <a:r>
+              <a:rPr lang="en-US" dirty="0" smtClean="0"/>
+              <a:t>Female meiotic pathway is less controlled/regulated </a:t>
+            </a:r>
+            <a:endParaRPr lang="en-US" dirty="0"/>
+          </a:p>
+        </p:txBody>
+      </p:sp>
+    </p:spTree>
+    <p:extLst>
+      <p:ext uri="{BB962C8B-B14F-4D97-AF65-F5344CB8AC3E}">
+        <p14:creationId xmlns:p14="http://schemas.microsoft.com/office/powerpoint/2010/main" val="2138578714"/>
+      </p:ext>
+    </p:extLst>
+  </p:cSld>
+  <p:clrMapOvr>
+    <a:masterClrMapping/>
+  </p:clrMapOvr>
+  <p:timing>
+    <p:tnLst>
+      <p:par>
+        <p:cTn id="1" dur="indefinite" restart="never" nodeType="tmRoot"/>
+      </p:par>
+    </p:tnLst>
+  </p:timing>
+</p:sld>
+</file>
+
+<file path=ppt/slides/slide11.xml><?xml version="1.0" encoding="utf-8"?>
+<p:sld xmlns:a="http://schemas.openxmlformats.org/drawingml/2006/main" xmlns:r="http://schemas.openxmlformats.org/officeDocument/2006/relationships" xmlns:p="http://schemas.openxmlformats.org/presentationml/2006/main">
+  <p:cSld>
+    <p:spTree>
+      <p:nvGrpSpPr>
+        <p:cNvPr id="1" name=""/>
+        <p:cNvGrpSpPr/>
+        <p:nvPr/>
+      </p:nvGrpSpPr>
+      <p:grpSpPr>
+        <a:xfrm>
+          <a:off x="0" y="0"/>
+          <a:ext cx="0" cy="0"/>
+          <a:chOff x="0" y="0"/>
+          <a:chExt cx="0" cy="0"/>
+        </a:xfrm>
+      </p:grpSpPr>
+      <p:sp>
+        <p:nvSpPr>
+          <p:cNvPr id="2" name="Title 1"/>
+          <p:cNvSpPr>
+            <a:spLocks noGrp="1"/>
+          </p:cNvSpPr>
+          <p:nvPr>
+            <p:ph type="title"/>
+          </p:nvPr>
+        </p:nvSpPr>
+        <p:spPr/>
+        <p:txBody>
+          <a:bodyPr/>
+          <a:lstStyle/>
+          <a:p>
+            <a:r>
+              <a:rPr lang="en-US" dirty="0" smtClean="0"/>
+              <a:t>Single </a:t>
+            </a:r>
+            <a:r>
+              <a:rPr lang="en-US" dirty="0" smtClean="0"/>
+              <a:t>Bivalent patterns</a:t>
+            </a:r>
+            <a:endParaRPr lang="en-US" dirty="0"/>
+          </a:p>
+        </p:txBody>
+      </p:sp>
+      <p:sp>
+        <p:nvSpPr>
+          <p:cNvPr id="3" name="Content Placeholder 2"/>
+          <p:cNvSpPr>
+            <a:spLocks noGrp="1"/>
+          </p:cNvSpPr>
+          <p:nvPr>
+            <p:ph idx="1"/>
+          </p:nvPr>
+        </p:nvSpPr>
+        <p:spPr/>
+        <p:txBody>
+          <a:bodyPr>
+            <a:normAutofit fontScale="92500" lnSpcReduction="20000"/>
+          </a:bodyPr>
+          <a:lstStyle/>
+          <a:p>
+            <a:pPr marL="0" indent="0">
+              <a:buNone/>
+            </a:pPr>
+            <a:r>
+              <a:rPr lang="en-US" dirty="0" smtClean="0"/>
+              <a:t>(example of segmented cell)</a:t>
+            </a:r>
+          </a:p>
+          <a:p>
+            <a:pPr marL="0" indent="0">
+              <a:buNone/>
+            </a:pPr>
+            <a:r>
+              <a:rPr lang="en-US" dirty="0" smtClean="0"/>
+              <a:t>-</a:t>
+            </a:r>
+            <a:r>
+              <a:rPr lang="en-US" dirty="0" smtClean="0"/>
+              <a:t>BRIEF, description of </a:t>
+            </a:r>
+            <a:r>
+              <a:rPr lang="en-US" dirty="0" smtClean="0"/>
+              <a:t>data,  ()</a:t>
+            </a:r>
+            <a:endParaRPr lang="en-US" dirty="0" smtClean="0"/>
+          </a:p>
+          <a:p>
+            <a:pPr marL="0" indent="0">
+              <a:buNone/>
+            </a:pPr>
+            <a:endParaRPr lang="en-US" dirty="0" smtClean="0"/>
+          </a:p>
+          <a:p>
+            <a:pPr marL="0" indent="0">
+              <a:buNone/>
+            </a:pPr>
+            <a:r>
+              <a:rPr lang="en-US" dirty="0" smtClean="0"/>
+              <a:t>Driving questions</a:t>
+            </a:r>
+            <a:endParaRPr lang="en-US" dirty="0"/>
+          </a:p>
+          <a:p>
+            <a:r>
+              <a:rPr lang="en-US" dirty="0" err="1" smtClean="0"/>
+              <a:t>i</a:t>
+            </a:r>
+            <a:r>
+              <a:rPr lang="en-US" dirty="0"/>
+              <a:t>) What are the main differences between males and </a:t>
+            </a:r>
+            <a:r>
+              <a:rPr lang="en-US" dirty="0" smtClean="0"/>
+              <a:t>females?</a:t>
+            </a:r>
+            <a:endParaRPr lang="en-US" dirty="0" smtClean="0">
+              <a:effectLst/>
+            </a:endParaRPr>
+          </a:p>
+          <a:p>
+            <a:r>
+              <a:rPr lang="en-US" dirty="0"/>
+              <a:t>ii) </a:t>
+            </a:r>
+            <a:r>
+              <a:rPr lang="en-US" dirty="0" smtClean="0"/>
+              <a:t>What </a:t>
+            </a:r>
+            <a:r>
+              <a:rPr lang="en-US" dirty="0"/>
+              <a:t>are the differences between high </a:t>
+            </a:r>
+            <a:r>
+              <a:rPr lang="en-US" dirty="0" err="1"/>
+              <a:t>musc</a:t>
+            </a:r>
+            <a:r>
+              <a:rPr lang="en-US" dirty="0"/>
+              <a:t> and low </a:t>
+            </a:r>
+            <a:r>
+              <a:rPr lang="en-US" dirty="0" err="1"/>
+              <a:t>musc</a:t>
+            </a:r>
+            <a:r>
+              <a:rPr lang="en-US" dirty="0"/>
+              <a:t> </a:t>
+            </a:r>
+            <a:r>
+              <a:rPr lang="en-US" dirty="0" smtClean="0"/>
+              <a:t>strain</a:t>
+            </a:r>
+            <a:r>
+              <a:rPr lang="en-US" dirty="0" smtClean="0"/>
+              <a:t>?</a:t>
+            </a:r>
+          </a:p>
+          <a:p>
+            <a:endParaRPr lang="en-US" dirty="0">
+              <a:effectLst/>
+            </a:endParaRPr>
+          </a:p>
+          <a:p>
+            <a:r>
+              <a:rPr lang="en-US" dirty="0"/>
+              <a:t>3 types of metrics</a:t>
+            </a:r>
+          </a:p>
+          <a:p>
+            <a:pPr lvl="1"/>
+            <a:r>
+              <a:rPr lang="en-US" dirty="0"/>
+              <a:t>1. Length of individual bivalents (SC signal) </a:t>
+            </a:r>
+          </a:p>
+          <a:p>
+            <a:pPr lvl="1"/>
+            <a:r>
+              <a:rPr lang="en-US" dirty="0"/>
+              <a:t>2. Position of single CO on a bivalent</a:t>
+            </a:r>
+          </a:p>
+          <a:p>
+            <a:pPr lvl="1"/>
+            <a:r>
+              <a:rPr lang="en-US" dirty="0"/>
+              <a:t>3. Interference strength (</a:t>
+            </a:r>
+            <a:r>
+              <a:rPr lang="en-US" dirty="0" err="1"/>
+              <a:t>interfocal</a:t>
+            </a:r>
+            <a:r>
+              <a:rPr lang="en-US" dirty="0"/>
+              <a:t> distance</a:t>
+            </a:r>
+            <a:r>
+              <a:rPr lang="en-US" dirty="0" smtClean="0"/>
+              <a:t>)</a:t>
+            </a:r>
+            <a:endParaRPr lang="en-US" dirty="0"/>
+          </a:p>
+        </p:txBody>
+      </p:sp>
+    </p:spTree>
+    <p:extLst>
+      <p:ext uri="{BB962C8B-B14F-4D97-AF65-F5344CB8AC3E}">
+        <p14:creationId xmlns:p14="http://schemas.microsoft.com/office/powerpoint/2010/main" val="2070970484"/>
+      </p:ext>
+    </p:extLst>
+  </p:cSld>
+  <p:clrMapOvr>
+    <a:masterClrMapping/>
+  </p:clrMapOvr>
+  <p:timing>
+    <p:tnLst>
+      <p:par>
+        <p:cTn id="1" dur="indefinite" restart="never" nodeType="tmRoot">
+          <p:childTnLst>
+            <p:seq concurrent="1" nextAc="seek">
+              <p:cTn id="2" dur="indefinite" nodeType="mainSeq">
+                <p:childTnLst>
+                  <p:par>
+                    <p:cTn id="3" fill="hold">
+                      <p:stCondLst>
+                        <p:cond delay="indefinite"/>
+                      </p:stCondLst>
+                      <p:childTnLst>
+                        <p:par>
+                          <p:cTn id="4" fill="hold">
+                            <p:stCondLst>
+                              <p:cond delay="0"/>
+                            </p:stCondLst>
+                            <p:childTnLst>
+                              <p:par>
+                                <p:cTn id="5" presetID="1" presetClass="entr" presetSubtype="0" fill="hold" nodeType="clickEffect">
+                                  <p:stCondLst>
+                                    <p:cond delay="0"/>
+                                  </p:stCondLst>
+                                  <p:childTnLst>
+                                    <p:set>
+                                      <p:cBhvr>
+                                        <p:cTn id="6" dur="1" fill="hold">
+                                          <p:stCondLst>
+                                            <p:cond delay="0"/>
+                                          </p:stCondLst>
+                                        </p:cTn>
+                                        <p:tgtEl>
+                                          <p:spTgt spid="3">
+                                            <p:txEl>
+                                              <p:pRg st="3" end="3"/>
+                                            </p:txEl>
+                                          </p:spTgt>
+                                        </p:tgtEl>
+                                        <p:attrNameLst>
+                                          <p:attrName>style.visibility</p:attrName>
+                                        </p:attrNameLst>
+                                      </p:cBhvr>
+                                      <p:to>
+                                        <p:strVal val="visible"/>
+                                      </p:to>
+                                    </p:set>
+                                  </p:childTnLst>
+                                </p:cTn>
+                              </p:par>
+                            </p:childTnLst>
+                          </p:cTn>
+                        </p:par>
+                      </p:childTnLst>
+                    </p:cTn>
+                  </p:par>
+                  <p:par>
+                    <p:cTn id="7" fill="hold">
+                      <p:stCondLst>
+                        <p:cond delay="indefinite"/>
+                      </p:stCondLst>
+                      <p:childTnLst>
+                        <p:par>
+                          <p:cTn id="8" fill="hold">
+                            <p:stCondLst>
+                              <p:cond delay="0"/>
+                            </p:stCondLst>
+                            <p:childTnLst>
+                              <p:par>
+                                <p:cTn id="9" presetID="1" presetClass="entr" presetSubtype="0" fill="hold" nodeType="clickEffect">
+                                  <p:stCondLst>
+                                    <p:cond delay="0"/>
+                                  </p:stCondLst>
+                                  <p:iterate type="lt">
+                                    <p:tmAbs val="0"/>
+                                  </p:iterate>
+                                  <p:childTnLst>
+                                    <p:set>
+                                      <p:cBhvr>
+                                        <p:cTn id="10" dur="1" fill="hold">
+                                          <p:stCondLst>
+                                            <p:cond delay="0"/>
+                                          </p:stCondLst>
+                                        </p:cTn>
+                                        <p:tgtEl>
+                                          <p:spTgt spid="3">
+                                            <p:txEl>
+                                              <p:pRg st="4" end="4"/>
+                                            </p:txEl>
+                                          </p:spTgt>
+                                        </p:tgtEl>
+                                        <p:attrNameLst>
+                                          <p:attrName>style.visibility</p:attrName>
+                                        </p:attrNameLst>
+                                      </p:cBhvr>
+                                      <p:to>
+                                        <p:strVal val="visible"/>
+                                      </p:to>
+                                    </p:set>
+                                  </p:childTnLst>
+                                </p:cTn>
+                              </p:par>
+                            </p:childTnLst>
+                          </p:cTn>
+                        </p:par>
+                      </p:childTnLst>
+                    </p:cTn>
+                  </p:par>
+                  <p:par>
+                    <p:cTn id="11" fill="hold">
+                      <p:stCondLst>
+                        <p:cond delay="indefinite"/>
+                      </p:stCondLst>
+                      <p:childTnLst>
+                        <p:par>
+                          <p:cTn id="12" fill="hold">
+                            <p:stCondLst>
+                              <p:cond delay="0"/>
+                            </p:stCondLst>
+                            <p:childTnLst>
+                              <p:par>
+                                <p:cTn id="13" presetID="1" presetClass="entr" presetSubtype="0" fill="hold" nodeType="clickEffect">
+                                  <p:stCondLst>
+                                    <p:cond delay="0"/>
+                                  </p:stCondLst>
+                                  <p:childTnLst>
+                                    <p:set>
+                                      <p:cBhvr>
+                                        <p:cTn id="14" dur="1" fill="hold">
+                                          <p:stCondLst>
+                                            <p:cond delay="0"/>
+                                          </p:stCondLst>
+                                        </p:cTn>
+                                        <p:tgtEl>
+                                          <p:spTgt spid="3">
+                                            <p:txEl>
+                                              <p:pRg st="5" end="5"/>
+                                            </p:txEl>
+                                          </p:spTgt>
+                                        </p:tgtEl>
+                                        <p:attrNameLst>
+                                          <p:attrName>style.visibility</p:attrName>
+                                        </p:attrNameLst>
+                                      </p:cBhvr>
+                                      <p:to>
+                                        <p:strVal val="visible"/>
+                                      </p:to>
+                                    </p:set>
+                                  </p:childTnLst>
+                                </p:cTn>
+                              </p:par>
+                            </p:childTnLst>
+                          </p:cTn>
+                        </p:par>
+                      </p:childTnLst>
+                    </p:cTn>
+                  </p:par>
+                  <p:par>
+                    <p:cTn id="15" fill="hold">
+                      <p:stCondLst>
+                        <p:cond delay="indefinite"/>
+                      </p:stCondLst>
+                      <p:childTnLst>
+                        <p:par>
+                          <p:cTn id="16" fill="hold">
+                            <p:stCondLst>
+                              <p:cond delay="0"/>
+                            </p:stCondLst>
+                            <p:childTnLst>
+                              <p:par>
+                                <p:cTn id="17" presetID="1" presetClass="entr" presetSubtype="0" fill="hold" nodeType="clickEffect">
+                                  <p:stCondLst>
+                                    <p:cond delay="0"/>
+                                  </p:stCondLst>
+                                  <p:childTnLst>
+                                    <p:set>
+                                      <p:cBhvr>
+                                        <p:cTn id="18" dur="1" fill="hold">
+                                          <p:stCondLst>
+                                            <p:cond delay="0"/>
+                                          </p:stCondLst>
+                                        </p:cTn>
+                                        <p:tgtEl>
+                                          <p:spTgt spid="3">
+                                            <p:txEl>
+                                              <p:pRg st="7" end="7"/>
+                                            </p:txEl>
+                                          </p:spTgt>
+                                        </p:tgtEl>
+                                        <p:attrNameLst>
+                                          <p:attrName>style.visibility</p:attrName>
+                                        </p:attrNameLst>
+                                      </p:cBhvr>
+                                      <p:to>
+                                        <p:strVal val="visible"/>
+                                      </p:to>
+                                    </p:set>
+                                  </p:childTnLst>
+                                </p:cTn>
+                              </p:par>
+                            </p:childTnLst>
+                          </p:cTn>
+                        </p:par>
+                      </p:childTnLst>
+                    </p:cTn>
+                  </p:par>
+                  <p:par>
+                    <p:cTn id="19" fill="hold">
+                      <p:stCondLst>
+                        <p:cond delay="indefinite"/>
+                      </p:stCondLst>
+                      <p:childTnLst>
+                        <p:par>
+                          <p:cTn id="20" fill="hold">
+                            <p:stCondLst>
+                              <p:cond delay="0"/>
+                            </p:stCondLst>
+                            <p:childTnLst>
+                              <p:par>
+                                <p:cTn id="21" presetID="1" presetClass="entr" presetSubtype="0" fill="hold" nodeType="clickEffect">
+                                  <p:stCondLst>
+                                    <p:cond delay="0"/>
+                                  </p:stCondLst>
+                                  <p:childTnLst>
+                                    <p:set>
+                                      <p:cBhvr>
+                                        <p:cTn id="22" dur="1" fill="hold">
+                                          <p:stCondLst>
+                                            <p:cond delay="0"/>
+                                          </p:stCondLst>
+                                        </p:cTn>
+                                        <p:tgtEl>
+                                          <p:spTgt spid="3">
+                                            <p:txEl>
+                                              <p:pRg st="8" end="8"/>
+                                            </p:txEl>
+                                          </p:spTgt>
+                                        </p:tgtEl>
+                                        <p:attrNameLst>
+                                          <p:attrName>style.visibility</p:attrName>
+                                        </p:attrNameLst>
+                                      </p:cBhvr>
+                                      <p:to>
+                                        <p:strVal val="visible"/>
+                                      </p:to>
+                                    </p:set>
+                                  </p:childTnLst>
+                                </p:cTn>
+                              </p:par>
+                            </p:childTnLst>
+                          </p:cTn>
+                        </p:par>
+                      </p:childTnLst>
+                    </p:cTn>
+                  </p:par>
+                  <p:par>
+                    <p:cTn id="23" fill="hold">
+                      <p:stCondLst>
+                        <p:cond delay="indefinite"/>
+                      </p:stCondLst>
+                      <p:childTnLst>
+                        <p:par>
+                          <p:cTn id="24" fill="hold">
+                            <p:stCondLst>
+                              <p:cond delay="0"/>
+                            </p:stCondLst>
+                            <p:childTnLst>
+                              <p:par>
+                                <p:cTn id="25" presetID="1" presetClass="entr" presetSubtype="0" fill="hold" nodeType="clickEffect">
+                                  <p:stCondLst>
+                                    <p:cond delay="0"/>
+                                  </p:stCondLst>
+                                  <p:childTnLst>
+                                    <p:set>
+                                      <p:cBhvr>
+                                        <p:cTn id="26" dur="1" fill="hold">
+                                          <p:stCondLst>
+                                            <p:cond delay="0"/>
+                                          </p:stCondLst>
+                                        </p:cTn>
+                                        <p:tgtEl>
+                                          <p:spTgt spid="3">
+                                            <p:txEl>
+                                              <p:pRg st="9" end="9"/>
+                                            </p:txEl>
+                                          </p:spTgt>
+                                        </p:tgtEl>
+                                        <p:attrNameLst>
+                                          <p:attrName>style.visibility</p:attrName>
+                                        </p:attrNameLst>
+                                      </p:cBhvr>
+                                      <p:to>
+                                        <p:strVal val="visible"/>
+                                      </p:to>
+                                    </p:set>
+                                  </p:childTnLst>
+                                </p:cTn>
+                              </p:par>
+                            </p:childTnLst>
+                          </p:cTn>
+                        </p:par>
+                      </p:childTnLst>
+                    </p:cTn>
+                  </p:par>
+                  <p:par>
+                    <p:cTn id="27" fill="hold">
+                      <p:stCondLst>
+                        <p:cond delay="indefinite"/>
+                      </p:stCondLst>
+                      <p:childTnLst>
+                        <p:par>
+                          <p:cTn id="28" fill="hold">
+                            <p:stCondLst>
+                              <p:cond delay="0"/>
+                            </p:stCondLst>
+                            <p:childTnLst>
+                              <p:par>
+                                <p:cTn id="29" presetID="1" presetClass="entr" presetSubtype="0" fill="hold" nodeType="clickEffect">
+                                  <p:stCondLst>
+                                    <p:cond delay="0"/>
+                                  </p:stCondLst>
+                                  <p:childTnLst>
+                                    <p:set>
+                                      <p:cBhvr>
+                                        <p:cTn id="30" dur="1" fill="hold">
+                                          <p:stCondLst>
+                                            <p:cond delay="0"/>
+                                          </p:stCondLst>
+                                        </p:cTn>
+                                        <p:tgtEl>
+                                          <p:spTgt spid="3">
+                                            <p:txEl>
+                                              <p:pRg st="10" end="10"/>
+                                            </p:txEl>
+                                          </p:spTgt>
+                                        </p:tgtEl>
+                                        <p:attrNameLst>
+                                          <p:attrName>style.visibility</p:attrName>
+                                        </p:attrNameLst>
+                                      </p:cBhvr>
+                                      <p:to>
+                                        <p:strVal val="visible"/>
+                                      </p:to>
+                                    </p:set>
+                                  </p:childTnLst>
+                                </p:cTn>
+                              </p:par>
+                            </p:childTnLst>
+                          </p:cTn>
+                        </p:par>
+                      </p:childTnLst>
+                    </p:cTn>
+                  </p:par>
+                  <p:par>
+                    <p:cTn id="31" fill="hold">
+                      <p:stCondLst>
+                        <p:cond delay="indefinite"/>
+                      </p:stCondLst>
+                      <p:childTnLst>
+                        <p:par>
+                          <p:cTn id="32" fill="hold">
+                            <p:stCondLst>
+                              <p:cond delay="0"/>
+                            </p:stCondLst>
+                            <p:childTnLst>
+                              <p:par>
+                                <p:cTn id="33" presetID="18" presetClass="emph" presetSubtype="0" fill="hold" nodeType="clickEffect">
+                                  <p:stCondLst>
+                                    <p:cond delay="0"/>
+                                  </p:stCondLst>
+                                  <p:iterate type="lt">
+                                    <p:tmPct val="4000"/>
+                                  </p:iterate>
+                                  <p:childTnLst>
+                                    <p:set>
+                                      <p:cBhvr override="childStyle">
+                                        <p:cTn id="34" dur="500" fill="hold"/>
+                                        <p:tgtEl>
+                                          <p:spTgt spid="3">
+                                            <p:txEl>
+                                              <p:pRg st="4" end="4"/>
+                                            </p:txEl>
+                                          </p:spTgt>
+                                        </p:tgtEl>
+                                        <p:attrNameLst>
+                                          <p:attrName>style.textDecorationUnderline</p:attrName>
+                                        </p:attrNameLst>
+                                      </p:cBhvr>
+                                      <p:to>
+                                        <p:strVal val="true"/>
+                                      </p:to>
+                                    </p:set>
+                                  </p:childTnLst>
+                                </p:cTn>
+                              </p:par>
+                            </p:childTnLst>
+                          </p:cTn>
+                        </p:par>
+                      </p:childTnLst>
+                    </p:cTn>
+                  </p:par>
+                </p:childTnLst>
+              </p:cTn>
+              <p:prevCondLst>
+                <p:cond evt="onPrev" delay="0">
+                  <p:tgtEl>
+                    <p:sldTgt/>
+                  </p:tgtEl>
+                </p:cond>
+              </p:prevCondLst>
+              <p:nextCondLst>
+                <p:cond evt="onNext" delay="0">
+                  <p:tgtEl>
+                    <p:sldTgt/>
+                  </p:tgtEl>
+                </p:cond>
+              </p:nextCondLst>
+            </p:seq>
+          </p:childTnLst>
+        </p:cTn>
+      </p:par>
+    </p:tnLst>
+  </p:timing>
+</p:sld>
+</file>
+
+<file path=ppt/slides/slide12.xml><?xml version="1.0" encoding="utf-8"?>
+<p:sld xmlns:a="http://schemas.openxmlformats.org/drawingml/2006/main" xmlns:r="http://schemas.openxmlformats.org/officeDocument/2006/relationships" xmlns:p="http://schemas.openxmlformats.org/presentationml/2006/main">
+  <p:cSld>
+    <p:spTree>
+      <p:nvGrpSpPr>
+        <p:cNvPr id="1" name=""/>
+        <p:cNvGrpSpPr/>
+        <p:nvPr/>
+      </p:nvGrpSpPr>
+      <p:grpSpPr>
+        <a:xfrm>
+          <a:off x="0" y="0"/>
+          <a:ext cx="0" cy="0"/>
+          <a:chOff x="0" y="0"/>
+          <a:chExt cx="0" cy="0"/>
+        </a:xfrm>
+      </p:grpSpPr>
+      <p:sp>
+        <p:nvSpPr>
+          <p:cNvPr id="2" name="Title 1"/>
+          <p:cNvSpPr>
+            <a:spLocks noGrp="1"/>
+          </p:cNvSpPr>
+          <p:nvPr>
+            <p:ph type="title"/>
+          </p:nvPr>
+        </p:nvSpPr>
+        <p:spPr/>
+        <p:txBody>
+          <a:bodyPr/>
+          <a:lstStyle/>
+          <a:p>
+            <a:r>
+              <a:rPr lang="en-US" dirty="0" smtClean="0"/>
+              <a:t>Model for investigating variation in males</a:t>
+            </a:r>
+            <a:endParaRPr lang="en-US" dirty="0"/>
+          </a:p>
+        </p:txBody>
+      </p:sp>
+      <p:sp>
+        <p:nvSpPr>
+          <p:cNvPr id="3" name="Content Placeholder 2"/>
+          <p:cNvSpPr>
+            <a:spLocks noGrp="1"/>
+          </p:cNvSpPr>
+          <p:nvPr>
+            <p:ph idx="1"/>
+          </p:nvPr>
+        </p:nvSpPr>
+        <p:spPr>
+          <a:xfrm>
+            <a:off x="804334" y="1825625"/>
+            <a:ext cx="10515600" cy="4351338"/>
+          </a:xfrm>
+        </p:spPr>
+        <p:txBody>
+          <a:bodyPr>
+            <a:normAutofit lnSpcReduction="10000"/>
+          </a:bodyPr>
+          <a:lstStyle/>
+          <a:p>
+            <a:pPr marL="0" indent="0">
+              <a:buNone/>
+            </a:pPr>
+            <a:endParaRPr lang="en-US" dirty="0" smtClean="0"/>
+          </a:p>
+          <a:p>
+            <a:pPr marL="0" indent="0">
+              <a:buNone/>
+            </a:pPr>
+            <a:r>
+              <a:rPr lang="en-US" dirty="0" smtClean="0"/>
+              <a:t>If </a:t>
+            </a:r>
+            <a:r>
+              <a:rPr lang="en-US" dirty="0" err="1" smtClean="0"/>
+              <a:t>gwRR</a:t>
+            </a:r>
+            <a:r>
+              <a:rPr lang="en-US" dirty="0" smtClean="0"/>
+              <a:t> variation is reflected by bivalent levels traits)… for each metric</a:t>
+            </a:r>
+          </a:p>
+          <a:p>
+            <a:pPr marL="0" indent="0">
+              <a:buNone/>
+            </a:pPr>
+            <a:r>
+              <a:rPr lang="en-US" dirty="0" smtClean="0"/>
+              <a:t>1. Dom strains will not be different</a:t>
+            </a:r>
+          </a:p>
+          <a:p>
+            <a:pPr marL="0" indent="0">
+              <a:buNone/>
+            </a:pPr>
+            <a:r>
+              <a:rPr lang="en-US" dirty="0" smtClean="0"/>
+              <a:t>2. In </a:t>
+            </a:r>
+            <a:r>
+              <a:rPr lang="en-US" dirty="0" err="1" smtClean="0"/>
+              <a:t>Musc</a:t>
+            </a:r>
+            <a:r>
+              <a:rPr lang="en-US" dirty="0" smtClean="0"/>
+              <a:t>, PWD and SKIVE will be different from others</a:t>
+            </a:r>
+          </a:p>
+          <a:p>
+            <a:pPr marL="0" indent="0">
+              <a:buNone/>
+            </a:pPr>
+            <a:r>
+              <a:rPr lang="en-US" dirty="0" smtClean="0"/>
+              <a:t>3. MSM will be different from MOLF</a:t>
+            </a:r>
+          </a:p>
+          <a:p>
+            <a:pPr marL="0" indent="0">
+              <a:buNone/>
+            </a:pPr>
+            <a:endParaRPr lang="en-US" dirty="0" smtClean="0"/>
+          </a:p>
+          <a:p>
+            <a:pPr marL="0" indent="0">
+              <a:buNone/>
+            </a:pPr>
+            <a:endParaRPr lang="en-US" dirty="0"/>
+          </a:p>
+          <a:p>
+            <a:pPr marL="0" indent="0">
+              <a:buNone/>
+            </a:pPr>
+            <a:r>
+              <a:rPr lang="en-US" dirty="0" smtClean="0"/>
+              <a:t>1. </a:t>
+            </a:r>
+            <a:r>
+              <a:rPr lang="en-US" dirty="0" err="1" smtClean="0"/>
+              <a:t>Mouse.av</a:t>
+            </a:r>
+            <a:r>
+              <a:rPr lang="en-US" dirty="0" smtClean="0"/>
+              <a:t> ~ (mouse | strain)   2. </a:t>
+            </a:r>
+            <a:r>
+              <a:rPr lang="en-US" dirty="0" err="1" smtClean="0"/>
+              <a:t>mouse.av</a:t>
+            </a:r>
+            <a:r>
+              <a:rPr lang="en-US" dirty="0" smtClean="0"/>
+              <a:t> ~ strain</a:t>
+            </a:r>
+            <a:endParaRPr lang="en-US" dirty="0"/>
+          </a:p>
+          <a:p>
+            <a:pPr marL="0" indent="0">
+              <a:buNone/>
+            </a:pPr>
+            <a:r>
+              <a:rPr lang="en-US" dirty="0" smtClean="0"/>
+              <a:t>(should I run this type of model for all (sex * </a:t>
+            </a:r>
+            <a:r>
+              <a:rPr lang="en-US" dirty="0" err="1" smtClean="0"/>
+              <a:t>subsp</a:t>
+            </a:r>
+            <a:r>
+              <a:rPr lang="en-US" dirty="0" smtClean="0"/>
+              <a:t> combos?)</a:t>
+            </a:r>
+            <a:endParaRPr lang="en-US" dirty="0"/>
+          </a:p>
+        </p:txBody>
+      </p:sp>
+    </p:spTree>
+    <p:extLst>
+      <p:ext uri="{BB962C8B-B14F-4D97-AF65-F5344CB8AC3E}">
+        <p14:creationId xmlns:p14="http://schemas.microsoft.com/office/powerpoint/2010/main" val="503701707"/>
+      </p:ext>
+    </p:extLst>
+  </p:cSld>
+  <p:clrMapOvr>
+    <a:masterClrMapping/>
+  </p:clrMapOvr>
+  <p:timing>
+    <p:tnLst>
+      <p:par>
+        <p:cTn id="1" dur="indefinite" restart="never" nodeType="tmRoot"/>
+      </p:par>
+    </p:tnLst>
+  </p:timing>
+</p:sld>
+</file>
+
+<file path=ppt/slides/slide13.xml><?xml version="1.0" encoding="utf-8"?>
+<p:sld xmlns:a="http://schemas.openxmlformats.org/drawingml/2006/main" xmlns:r="http://schemas.openxmlformats.org/officeDocument/2006/relationships" xmlns:p="http://schemas.openxmlformats.org/presentationml/2006/main">
+  <p:cSld>
+    <p:spTree>
+      <p:nvGrpSpPr>
+        <p:cNvPr id="1" name=""/>
+        <p:cNvGrpSpPr/>
+        <p:nvPr/>
+      </p:nvGrpSpPr>
+      <p:grpSpPr>
+        <a:xfrm>
+          <a:off x="0" y="0"/>
+          <a:ext cx="0" cy="0"/>
+          <a:chOff x="0" y="0"/>
+          <a:chExt cx="0" cy="0"/>
+        </a:xfrm>
+      </p:grpSpPr>
+      <p:sp>
+        <p:nvSpPr>
+          <p:cNvPr id="2" name="Title 1"/>
+          <p:cNvSpPr>
+            <a:spLocks noGrp="1"/>
+          </p:cNvSpPr>
+          <p:nvPr>
+            <p:ph type="title"/>
+          </p:nvPr>
+        </p:nvSpPr>
+        <p:spPr/>
+        <p:txBody>
+          <a:bodyPr/>
+          <a:lstStyle/>
+          <a:p>
+            <a:endParaRPr lang="en-US"/>
+          </a:p>
+        </p:txBody>
+      </p:sp>
+      <p:sp>
+        <p:nvSpPr>
+          <p:cNvPr id="3" name="Content Placeholder 2"/>
+          <p:cNvSpPr>
+            <a:spLocks noGrp="1"/>
+          </p:cNvSpPr>
+          <p:nvPr>
+            <p:ph idx="1"/>
+          </p:nvPr>
+        </p:nvSpPr>
+        <p:spPr/>
+        <p:txBody>
+          <a:bodyPr/>
+          <a:lstStyle/>
+          <a:p>
+            <a:r>
+              <a:rPr lang="en-US" dirty="0" smtClean="0"/>
+              <a:t>SC Length</a:t>
+            </a:r>
+          </a:p>
+          <a:p>
+            <a:pPr lvl="1"/>
+            <a:r>
+              <a:rPr lang="en-US" dirty="0" smtClean="0"/>
+              <a:t>1. Dom are different</a:t>
+            </a:r>
+          </a:p>
+          <a:p>
+            <a:pPr lvl="1"/>
+            <a:r>
+              <a:rPr lang="en-US" dirty="0" smtClean="0"/>
+              <a:t>2. </a:t>
+            </a:r>
+            <a:r>
+              <a:rPr lang="en-US" dirty="0" err="1" smtClean="0"/>
+              <a:t>Musc</a:t>
+            </a:r>
+            <a:r>
+              <a:rPr lang="en-US" dirty="0" smtClean="0"/>
+              <a:t> strains? (PWD and SKIVE most different)</a:t>
+            </a:r>
+            <a:endParaRPr lang="en-US" dirty="0"/>
+          </a:p>
+        </p:txBody>
+      </p:sp>
+    </p:spTree>
+    <p:extLst>
+      <p:ext uri="{BB962C8B-B14F-4D97-AF65-F5344CB8AC3E}">
+        <p14:creationId xmlns:p14="http://schemas.microsoft.com/office/powerpoint/2010/main" val="1810967030"/>
+      </p:ext>
+    </p:extLst>
+  </p:cSld>
+  <p:clrMapOvr>
+    <a:masterClrMapping/>
+  </p:clrMapOvr>
+  <p:timing>
+    <p:tnLst>
+      <p:par>
+        <p:cTn id="1" dur="indefinite" restart="never" nodeType="tmRoot"/>
+      </p:par>
+    </p:tnLst>
+  </p:timing>
 </p:sld>
 </file>
 
@@ -3651,12 +5853,12 @@
           </a:p>
           <a:p>
             <a:r>
-              <a:rPr lang="en-US" dirty="0" err="1" smtClean="0"/>
-              <a:t>Bacis</a:t>
-            </a:r>
-            <a:r>
-              <a:rPr lang="en-US" dirty="0" smtClean="0"/>
-              <a:t> frame work – to investigate the patterns of variation and evolution – use Mixed model;</a:t>
+              <a:rPr lang="en-US" dirty="0" smtClean="0"/>
+              <a:t>Basic frame </a:t>
+            </a:r>
+            <a:r>
+              <a:rPr lang="en-US" dirty="0" smtClean="0"/>
+              <a:t>work – to investigate the patterns of variation and evolution – use Mixed model;</a:t>
             </a:r>
           </a:p>
           <a:p>
@@ -3745,6 +5947,145 @@
 </file>
 
 <file path=ppt/slides/slide3.xml><?xml version="1.0" encoding="utf-8"?>
+<p:sld xmlns:a="http://schemas.openxmlformats.org/drawingml/2006/main" xmlns:r="http://schemas.openxmlformats.org/officeDocument/2006/relationships" xmlns:p="http://schemas.openxmlformats.org/presentationml/2006/main">
+  <p:cSld>
+    <p:spTree>
+      <p:nvGrpSpPr>
+        <p:cNvPr id="1" name=""/>
+        <p:cNvGrpSpPr/>
+        <p:nvPr/>
+      </p:nvGrpSpPr>
+      <p:grpSpPr>
+        <a:xfrm>
+          <a:off x="0" y="0"/>
+          <a:ext cx="0" cy="0"/>
+          <a:chOff x="0" y="0"/>
+          <a:chExt cx="0" cy="0"/>
+        </a:xfrm>
+      </p:grpSpPr>
+      <p:sp>
+        <p:nvSpPr>
+          <p:cNvPr id="2" name="Title 1"/>
+          <p:cNvSpPr>
+            <a:spLocks noGrp="1"/>
+          </p:cNvSpPr>
+          <p:nvPr>
+            <p:ph type="title"/>
+          </p:nvPr>
+        </p:nvSpPr>
+        <p:spPr/>
+        <p:txBody>
+          <a:bodyPr/>
+          <a:lstStyle/>
+          <a:p>
+            <a:r>
+              <a:rPr lang="en-US" dirty="0" smtClean="0"/>
+              <a:t>Main models</a:t>
+            </a:r>
+            <a:endParaRPr lang="en-US" dirty="0"/>
+          </a:p>
+        </p:txBody>
+      </p:sp>
+      <p:sp>
+        <p:nvSpPr>
+          <p:cNvPr id="3" name="Content Placeholder 2"/>
+          <p:cNvSpPr>
+            <a:spLocks noGrp="1"/>
+          </p:cNvSpPr>
+          <p:nvPr>
+            <p:ph idx="1"/>
+          </p:nvPr>
+        </p:nvSpPr>
+        <p:spPr/>
+        <p:txBody>
+          <a:bodyPr/>
+          <a:lstStyle/>
+          <a:p>
+            <a:pPr marL="514350" indent="-514350">
+              <a:buAutoNum type="arabicPeriod"/>
+            </a:pPr>
+            <a:r>
+              <a:rPr lang="en-US" dirty="0" smtClean="0"/>
+              <a:t>MLH1 count averages (sex specific effects)</a:t>
+            </a:r>
+          </a:p>
+          <a:p>
+            <a:pPr marL="514350" indent="-514350">
+              <a:buAutoNum type="arabicPeriod"/>
+            </a:pPr>
+            <a:r>
+              <a:rPr lang="en-US" dirty="0" smtClean="0"/>
+              <a:t>MLH1 count variance</a:t>
+            </a:r>
+          </a:p>
+          <a:p>
+            <a:pPr marL="514350" indent="-514350">
+              <a:buAutoNum type="arabicPeriod"/>
+            </a:pPr>
+            <a:r>
+              <a:rPr lang="en-US" dirty="0" err="1" smtClean="0"/>
+              <a:t>Musc</a:t>
+            </a:r>
+            <a:r>
+              <a:rPr lang="en-US" dirty="0" smtClean="0"/>
+              <a:t> male MLH1.av– strain differences?  (post hoc)</a:t>
+            </a:r>
+          </a:p>
+          <a:p>
+            <a:pPr marL="457200" lvl="1" indent="0">
+              <a:buNone/>
+            </a:pPr>
+            <a:r>
+              <a:rPr lang="en-US" dirty="0" smtClean="0"/>
+              <a:t>- Can SKIVE be classified as intermediate to PWD vs others,</a:t>
+            </a:r>
+          </a:p>
+          <a:p>
+            <a:pPr lvl="1">
+              <a:buFontTx/>
+              <a:buChar char="-"/>
+            </a:pPr>
+            <a:r>
+              <a:rPr lang="en-US" dirty="0" smtClean="0"/>
+              <a:t>Which are diff from a ‘low’ level (all) –HOW DO these compare to other DOM</a:t>
+            </a:r>
+          </a:p>
+          <a:p>
+            <a:pPr lvl="1">
+              <a:buFontTx/>
+              <a:buChar char="-"/>
+            </a:pPr>
+            <a:r>
+              <a:rPr lang="en-US" dirty="0" smtClean="0"/>
+              <a:t>Which strains are most different from others</a:t>
+            </a:r>
+            <a:endParaRPr lang="en-US" dirty="0"/>
+          </a:p>
+          <a:p>
+            <a:pPr marL="457200" lvl="1" indent="0">
+              <a:buNone/>
+            </a:pPr>
+            <a:r>
+              <a:rPr lang="en-US" dirty="0" smtClean="0"/>
+              <a:t>-Do these predictions hold for MSM – MOLF comparison?</a:t>
+            </a:r>
+          </a:p>
+        </p:txBody>
+      </p:sp>
+    </p:spTree>
+    <p:extLst>
+      <p:ext uri="{BB962C8B-B14F-4D97-AF65-F5344CB8AC3E}">
+        <p14:creationId xmlns:p14="http://schemas.microsoft.com/office/powerpoint/2010/main" val="3968559363"/>
+      </p:ext>
+    </p:extLst>
+  </p:cSld>
+  <p:clrMapOvr>
+    <a:masterClrMapping/>
+  </p:clrMapOvr>
+</p:sld>
+</file>
+
+<file path=ppt/slides/slide4.xml><?xml version="1.0" encoding="utf-8"?>
 <p:sld xmlns:a="http://schemas.openxmlformats.org/drawingml/2006/main" xmlns:r="http://schemas.openxmlformats.org/officeDocument/2006/relationships" xmlns:p="http://schemas.openxmlformats.org/presentationml/2006/main">
   <p:cSld>
     <p:spTree>
@@ -4051,93 +6392,6 @@
 </p:sld>
 </file>
 
-<file path=ppt/slides/slide4.xml><?xml version="1.0" encoding="utf-8"?>
-<p:sld xmlns:a="http://schemas.openxmlformats.org/drawingml/2006/main" xmlns:r="http://schemas.openxmlformats.org/officeDocument/2006/relationships" xmlns:p="http://schemas.openxmlformats.org/presentationml/2006/main">
-  <p:cSld>
-    <p:spTree>
-      <p:nvGrpSpPr>
-        <p:cNvPr id="1" name=""/>
-        <p:cNvGrpSpPr/>
-        <p:nvPr/>
-      </p:nvGrpSpPr>
-      <p:grpSpPr>
-        <a:xfrm>
-          <a:off x="0" y="0"/>
-          <a:ext cx="0" cy="0"/>
-          <a:chOff x="0" y="0"/>
-          <a:chExt cx="0" cy="0"/>
-        </a:xfrm>
-      </p:grpSpPr>
-      <p:sp>
-        <p:nvSpPr>
-          <p:cNvPr id="2" name="Title 1"/>
-          <p:cNvSpPr>
-            <a:spLocks noGrp="1"/>
-          </p:cNvSpPr>
-          <p:nvPr>
-            <p:ph type="title"/>
-          </p:nvPr>
-        </p:nvSpPr>
-        <p:spPr/>
-        <p:txBody>
-          <a:bodyPr/>
-          <a:lstStyle/>
-          <a:p>
-            <a:r>
-              <a:rPr lang="en-US" dirty="0" smtClean="0"/>
-              <a:t>Chromosome proportions</a:t>
-            </a:r>
-            <a:endParaRPr lang="en-US" dirty="0"/>
-          </a:p>
-        </p:txBody>
-      </p:sp>
-      <p:sp>
-        <p:nvSpPr>
-          <p:cNvPr id="3" name="Content Placeholder 2"/>
-          <p:cNvSpPr>
-            <a:spLocks noGrp="1"/>
-          </p:cNvSpPr>
-          <p:nvPr>
-            <p:ph idx="1"/>
-          </p:nvPr>
-        </p:nvSpPr>
-        <p:spPr/>
-        <p:txBody>
-          <a:bodyPr/>
-          <a:lstStyle/>
-          <a:p>
-            <a:r>
-              <a:rPr lang="en-US" dirty="0" smtClean="0"/>
-              <a:t>(genome wide rate supported by chromosome level observations)</a:t>
-            </a:r>
-          </a:p>
-          <a:p>
-            <a:r>
-              <a:rPr lang="en-US" dirty="0" smtClean="0"/>
-              <a:t>(test?)</a:t>
-            </a:r>
-          </a:p>
-          <a:p>
-            <a:endParaRPr lang="en-US" dirty="0"/>
-          </a:p>
-          <a:p>
-            <a:endParaRPr lang="en-US" dirty="0"/>
-          </a:p>
-        </p:txBody>
-      </p:sp>
-    </p:spTree>
-    <p:extLst>
-      <p:ext uri="{BB962C8B-B14F-4D97-AF65-F5344CB8AC3E}">
-        <p14:creationId xmlns:p14="http://schemas.microsoft.com/office/powerpoint/2010/main" val="3788419076"/>
-      </p:ext>
-    </p:extLst>
-  </p:cSld>
-  <p:clrMapOvr>
-    <a:masterClrMapping/>
-  </p:clrMapOvr>
-</p:sld>
-</file>
-
 <file path=ppt/slides/slide5.xml><?xml version="1.0" encoding="utf-8"?>
 <p:sld xmlns:a="http://schemas.openxmlformats.org/drawingml/2006/main" xmlns:r="http://schemas.openxmlformats.org/officeDocument/2006/relationships" xmlns:p="http://schemas.openxmlformats.org/presentationml/2006/main">
   <p:cSld>
@@ -4172,15 +6426,7 @@
           <a:p>
             <a:r>
               <a:rPr lang="en-US" dirty="0" smtClean="0"/>
-              <a:t>Single </a:t>
-            </a:r>
-            <a:r>
-              <a:rPr lang="en-US" dirty="0" err="1" smtClean="0"/>
-              <a:t>Biv</a:t>
-            </a:r>
-            <a:r>
-              <a:rPr lang="en-US" dirty="0" smtClean="0"/>
-              <a:t> (background?)</a:t>
+              <a:t>Chromosome proportions</a:t>
             </a:r>
             <a:endParaRPr lang="en-US" dirty="0"/>
           </a:p>
@@ -4198,93 +6444,45 @@
         </p:nvSpPr>
         <p:spPr/>
         <p:txBody>
-          <a:bodyPr>
-            <a:normAutofit/>
-          </a:bodyPr>
-          <a:lstStyle/>
-          <a:p>
-            <a:pPr marL="0" indent="0">
-              <a:buNone/>
-            </a:pPr>
-            <a:r>
-              <a:rPr lang="en-US" dirty="0" smtClean="0"/>
-              <a:t>-BRIEF, description of data</a:t>
-            </a:r>
-          </a:p>
-          <a:p>
-            <a:pPr marL="0" indent="0">
-              <a:buNone/>
-            </a:pPr>
+          <a:bodyPr/>
+          <a:lstStyle/>
+          <a:p>
+            <a:r>
+              <a:rPr lang="en-US" dirty="0" smtClean="0"/>
+              <a:t>(genome wide rate supported by chromosome level observations)</a:t>
+            </a:r>
+          </a:p>
+          <a:p>
+            <a:r>
+              <a:rPr lang="en-US" dirty="0" smtClean="0"/>
+              <a:t>(test?)</a:t>
+            </a:r>
+          </a:p>
+          <a:p>
             <a:endParaRPr lang="en-US" dirty="0"/>
           </a:p>
           <a:p>
-            <a:pPr marL="0" indent="0">
-              <a:buNone/>
-            </a:pPr>
-            <a:r>
-              <a:rPr lang="en-US" dirty="0" smtClean="0"/>
-              <a:t>2 main questions</a:t>
-            </a:r>
             <a:endParaRPr lang="en-US" dirty="0"/>
-          </a:p>
-          <a:p>
-            <a:r>
-              <a:rPr lang="en-US" dirty="0" err="1"/>
-              <a:t>i</a:t>
-            </a:r>
-            <a:r>
-              <a:rPr lang="en-US" dirty="0"/>
-              <a:t>) What are the main differences between males and </a:t>
-            </a:r>
-            <a:r>
-              <a:rPr lang="en-US" dirty="0" smtClean="0"/>
-              <a:t>females?</a:t>
-            </a:r>
-            <a:endParaRPr lang="en-US" b="0" dirty="0" smtClean="0">
-              <a:effectLst/>
-            </a:endParaRPr>
-          </a:p>
-          <a:p>
-            <a:r>
-              <a:rPr lang="en-US" dirty="0"/>
-              <a:t>ii) what are the differences between high </a:t>
-            </a:r>
-            <a:r>
-              <a:rPr lang="en-US" dirty="0" err="1"/>
-              <a:t>musc</a:t>
-            </a:r>
-            <a:r>
-              <a:rPr lang="en-US" dirty="0"/>
-              <a:t> and low </a:t>
-            </a:r>
-            <a:r>
-              <a:rPr lang="en-US" dirty="0" err="1"/>
-              <a:t>musc</a:t>
-            </a:r>
-            <a:r>
-              <a:rPr lang="en-US" dirty="0"/>
-              <a:t> </a:t>
-            </a:r>
-            <a:r>
-              <a:rPr lang="en-US" dirty="0" smtClean="0"/>
-              <a:t>strain?</a:t>
-            </a:r>
-            <a:endParaRPr lang="en-US" b="0" dirty="0" smtClean="0">
-              <a:effectLst/>
-            </a:endParaRPr>
           </a:p>
         </p:txBody>
       </p:sp>
     </p:spTree>
     <p:extLst>
       <p:ext uri="{BB962C8B-B14F-4D97-AF65-F5344CB8AC3E}">
-        <p14:creationId xmlns:p14="http://schemas.microsoft.com/office/powerpoint/2010/main" val="2833730430"/>
+        <p14:creationId xmlns:p14="http://schemas.microsoft.com/office/powerpoint/2010/main" val="3788419076"/>
       </p:ext>
     </p:extLst>
   </p:cSld>
   <p:clrMapOvr>
     <a:masterClrMapping/>
   </p:clrMapOvr>
+  <p:timing>
+    <p:tnLst>
+      <p:par>
+        <p:cTn id="1" dur="indefinite" restart="never" nodeType="tmRoot"/>
+      </p:par>
+    </p:tnLst>
+  </p:timing>
 </p:sld>
 </file>
 
@@ -4322,7 +6520,11 @@
           <a:p>
             <a:r>
               <a:rPr lang="en-US" dirty="0" smtClean="0"/>
-              <a:t>Predictions for Q1, differences between sexes</a:t>
+              <a:t>Single </a:t>
+            </a:r>
+            <a:r>
+              <a:rPr lang="en-US" dirty="0" smtClean="0"/>
+              <a:t>Bivalent patterns</a:t>
             </a:r>
             <a:endParaRPr lang="en-US" dirty="0"/>
           </a:p>
@@ -4340,64 +6542,151 @@
         </p:nvSpPr>
         <p:spPr/>
         <p:txBody>
-          <a:bodyPr/>
-          <a:lstStyle/>
-          <a:p>
-            <a:r>
-              <a:rPr lang="en-US" dirty="0" smtClean="0"/>
-              <a:t>3 flavors of traits</a:t>
+          <a:bodyPr>
+            <a:normAutofit fontScale="92500" lnSpcReduction="20000"/>
+          </a:bodyPr>
+          <a:lstStyle/>
+          <a:p>
+            <a:pPr marL="0" indent="0">
+              <a:buNone/>
+            </a:pPr>
+            <a:r>
+              <a:rPr lang="en-US" dirty="0" smtClean="0"/>
+              <a:t>(example of segmented cell)</a:t>
+            </a:r>
+          </a:p>
+          <a:p>
+            <a:pPr marL="0" indent="0">
+              <a:buNone/>
+            </a:pPr>
+            <a:r>
+              <a:rPr lang="en-US" dirty="0" smtClean="0"/>
+              <a:t>-</a:t>
+            </a:r>
+            <a:r>
+              <a:rPr lang="en-US" dirty="0" smtClean="0"/>
+              <a:t>BRIEF, description of </a:t>
+            </a:r>
+            <a:r>
+              <a:rPr lang="en-US" dirty="0" smtClean="0"/>
+              <a:t>data,  ()</a:t>
+            </a:r>
+            <a:endParaRPr lang="en-US" dirty="0" smtClean="0"/>
+          </a:p>
+          <a:p>
+            <a:pPr marL="0" indent="0">
+              <a:buNone/>
+            </a:pPr>
+            <a:endParaRPr lang="en-US" dirty="0" smtClean="0"/>
+          </a:p>
+          <a:p>
+            <a:pPr marL="0" indent="0">
+              <a:buNone/>
+            </a:pPr>
+            <a:r>
+              <a:rPr lang="en-US" dirty="0" smtClean="0"/>
+              <a:t>Driving questions</a:t>
+            </a:r>
+            <a:endParaRPr lang="en-US" dirty="0"/>
+          </a:p>
+          <a:p>
+            <a:r>
+              <a:rPr lang="en-US" dirty="0" err="1" smtClean="0"/>
+              <a:t>i</a:t>
+            </a:r>
+            <a:r>
+              <a:rPr lang="en-US" dirty="0"/>
+              <a:t>) What are the main differences between males and </a:t>
+            </a:r>
+            <a:r>
+              <a:rPr lang="en-US" dirty="0" smtClean="0"/>
+              <a:t>females?</a:t>
+            </a:r>
+            <a:endParaRPr lang="en-US" dirty="0" smtClean="0">
+              <a:effectLst/>
+            </a:endParaRPr>
+          </a:p>
+          <a:p>
+            <a:r>
+              <a:rPr lang="en-US" dirty="0"/>
+              <a:t>ii) </a:t>
+            </a:r>
+            <a:r>
+              <a:rPr lang="en-US" dirty="0" smtClean="0"/>
+              <a:t>What </a:t>
+            </a:r>
+            <a:r>
+              <a:rPr lang="en-US" dirty="0"/>
+              <a:t>are the differences between high </a:t>
+            </a:r>
+            <a:r>
+              <a:rPr lang="en-US" dirty="0" err="1"/>
+              <a:t>musc</a:t>
+            </a:r>
+            <a:r>
+              <a:rPr lang="en-US" dirty="0"/>
+              <a:t> and low </a:t>
+            </a:r>
+            <a:r>
+              <a:rPr lang="en-US" dirty="0" err="1"/>
+              <a:t>musc</a:t>
+            </a:r>
+            <a:r>
+              <a:rPr lang="en-US" dirty="0"/>
+              <a:t> </a:t>
+            </a:r>
+            <a:r>
+              <a:rPr lang="en-US" dirty="0" smtClean="0"/>
+              <a:t>strain</a:t>
+            </a:r>
+            <a:r>
+              <a:rPr lang="en-US" dirty="0" smtClean="0"/>
+              <a:t>?</a:t>
+            </a:r>
+          </a:p>
+          <a:p>
+            <a:endParaRPr lang="en-US" dirty="0">
+              <a:effectLst/>
+            </a:endParaRPr>
+          </a:p>
+          <a:p>
+            <a:r>
+              <a:rPr lang="en-US" dirty="0"/>
+              <a:t>3 types of metrics</a:t>
             </a:r>
           </a:p>
           <a:p>
             <a:pPr lvl="1"/>
             <a:r>
-              <a:rPr lang="en-US" dirty="0" smtClean="0"/>
+              <a:rPr lang="en-US" dirty="0"/>
               <a:t>1. Length of individual bivalents (SC signal) </a:t>
             </a:r>
           </a:p>
           <a:p>
             <a:pPr lvl="1"/>
             <a:r>
-              <a:rPr lang="en-US" dirty="0" smtClean="0"/>
-              <a:t>2. Position of single CO on a </a:t>
-            </a:r>
-            <a:r>
-              <a:rPr lang="en-US" dirty="0" err="1" smtClean="0"/>
-              <a:t>biv</a:t>
-            </a:r>
-            <a:r>
-              <a:rPr lang="en-US" dirty="0" smtClean="0"/>
-              <a:t> </a:t>
+              <a:rPr lang="en-US" dirty="0"/>
+              <a:t>2. Position of single CO on a bivalent</a:t>
             </a:r>
           </a:p>
           <a:p>
             <a:pPr lvl="1"/>
             <a:r>
-              <a:rPr lang="en-US" dirty="0" smtClean="0"/>
-              <a:t>3. </a:t>
-            </a:r>
-            <a:r>
-              <a:rPr lang="en-US" dirty="0" smtClean="0"/>
-              <a:t>Interference strength (interfocal distance)</a:t>
-            </a:r>
-            <a:endParaRPr lang="en-US" dirty="0"/>
-          </a:p>
-          <a:p>
-            <a:r>
-              <a:rPr lang="en-US" dirty="0" smtClean="0"/>
-              <a:t>Summarize and condense any of the connected predictions</a:t>
-            </a:r>
-          </a:p>
-          <a:p>
-            <a:endParaRPr lang="en-US" dirty="0"/>
-          </a:p>
-          <a:p>
-            <a:r>
-              <a:rPr lang="en-US" dirty="0" smtClean="0"/>
-              <a:t>(mixed model (just like MLH1) – test if fixed effect is significant</a:t>
-            </a:r>
-          </a:p>
-          <a:p>
+              <a:rPr lang="en-US" dirty="0"/>
+              <a:t>3. Interference strength (</a:t>
+            </a:r>
+            <a:r>
+              <a:rPr lang="en-US" dirty="0" err="1"/>
+              <a:t>interfocal</a:t>
+            </a:r>
+            <a:r>
+              <a:rPr lang="en-US" dirty="0"/>
+              <a:t> distance</a:t>
+            </a:r>
+            <a:r>
+              <a:rPr lang="en-US" dirty="0" smtClean="0"/>
+              <a:t>)</a:t>
+            </a:r>
             <a:endParaRPr lang="en-US" dirty="0"/>
           </a:p>
         </p:txBody>
@@ -4405,13 +6694,437 @@
     </p:spTree>
     <p:extLst>
       <p:ext uri="{BB962C8B-B14F-4D97-AF65-F5344CB8AC3E}">
-        <p14:creationId xmlns:p14="http://schemas.microsoft.com/office/powerpoint/2010/main" val="845236884"/>
+        <p14:creationId xmlns:p14="http://schemas.microsoft.com/office/powerpoint/2010/main" val="2833730430"/>
       </p:ext>
     </p:extLst>
   </p:cSld>
   <p:clrMapOvr>
     <a:masterClrMapping/>
   </p:clrMapOvr>
+  <p:timing>
+    <p:tnLst>
+      <p:par>
+        <p:cTn id="1" dur="indefinite" restart="never" nodeType="tmRoot">
+          <p:childTnLst>
+            <p:seq concurrent="1" nextAc="seek">
+              <p:cTn id="2" dur="indefinite" nodeType="mainSeq">
+                <p:childTnLst>
+                  <p:par>
+                    <p:cTn id="3" fill="hold">
+                      <p:stCondLst>
+                        <p:cond delay="indefinite"/>
+                      </p:stCondLst>
+                      <p:childTnLst>
+                        <p:par>
+                          <p:cTn id="4" fill="hold">
+                            <p:stCondLst>
+                              <p:cond delay="0"/>
+                            </p:stCondLst>
+                            <p:childTnLst>
+                              <p:par>
+                                <p:cTn id="5" presetID="1" presetClass="entr" presetSubtype="0" fill="hold" nodeType="clickEffect">
+                                  <p:stCondLst>
+                                    <p:cond delay="0"/>
+                                  </p:stCondLst>
+                                  <p:childTnLst>
+                                    <p:set>
+                                      <p:cBhvr>
+                                        <p:cTn id="6" dur="1" fill="hold">
+                                          <p:stCondLst>
+                                            <p:cond delay="0"/>
+                                          </p:stCondLst>
+                                        </p:cTn>
+                                        <p:tgtEl>
+                                          <p:spTgt spid="3">
+                                            <p:txEl>
+                                              <p:pRg st="3" end="3"/>
+                                            </p:txEl>
+                                          </p:spTgt>
+                                        </p:tgtEl>
+                                        <p:attrNameLst>
+                                          <p:attrName>style.visibility</p:attrName>
+                                        </p:attrNameLst>
+                                      </p:cBhvr>
+                                      <p:to>
+                                        <p:strVal val="visible"/>
+                                      </p:to>
+                                    </p:set>
+                                  </p:childTnLst>
+                                </p:cTn>
+                              </p:par>
+                            </p:childTnLst>
+                          </p:cTn>
+                        </p:par>
+                      </p:childTnLst>
+                    </p:cTn>
+                  </p:par>
+                  <p:par>
+                    <p:cTn id="7" fill="hold">
+                      <p:stCondLst>
+                        <p:cond delay="indefinite"/>
+                      </p:stCondLst>
+                      <p:childTnLst>
+                        <p:par>
+                          <p:cTn id="8" fill="hold">
+                            <p:stCondLst>
+                              <p:cond delay="0"/>
+                            </p:stCondLst>
+                            <p:childTnLst>
+                              <p:par>
+                                <p:cTn id="9" presetID="1" presetClass="entr" presetSubtype="0" fill="hold" nodeType="clickEffect">
+                                  <p:stCondLst>
+                                    <p:cond delay="0"/>
+                                  </p:stCondLst>
+                                  <p:iterate type="lt">
+                                    <p:tmAbs val="0"/>
+                                  </p:iterate>
+                                  <p:childTnLst>
+                                    <p:set>
+                                      <p:cBhvr>
+                                        <p:cTn id="10" dur="1" fill="hold">
+                                          <p:stCondLst>
+                                            <p:cond delay="0"/>
+                                          </p:stCondLst>
+                                        </p:cTn>
+                                        <p:tgtEl>
+                                          <p:spTgt spid="3">
+                                            <p:txEl>
+                                              <p:pRg st="4" end="4"/>
+                                            </p:txEl>
+                                          </p:spTgt>
+                                        </p:tgtEl>
+                                        <p:attrNameLst>
+                                          <p:attrName>style.visibility</p:attrName>
+                                        </p:attrNameLst>
+                                      </p:cBhvr>
+                                      <p:to>
+                                        <p:strVal val="visible"/>
+                                      </p:to>
+                                    </p:set>
+                                  </p:childTnLst>
+                                </p:cTn>
+                              </p:par>
+                            </p:childTnLst>
+                          </p:cTn>
+                        </p:par>
+                      </p:childTnLst>
+                    </p:cTn>
+                  </p:par>
+                  <p:par>
+                    <p:cTn id="11" fill="hold">
+                      <p:stCondLst>
+                        <p:cond delay="indefinite"/>
+                      </p:stCondLst>
+                      <p:childTnLst>
+                        <p:par>
+                          <p:cTn id="12" fill="hold">
+                            <p:stCondLst>
+                              <p:cond delay="0"/>
+                            </p:stCondLst>
+                            <p:childTnLst>
+                              <p:par>
+                                <p:cTn id="13" presetID="1" presetClass="entr" presetSubtype="0" fill="hold" nodeType="clickEffect">
+                                  <p:stCondLst>
+                                    <p:cond delay="0"/>
+                                  </p:stCondLst>
+                                  <p:childTnLst>
+                                    <p:set>
+                                      <p:cBhvr>
+                                        <p:cTn id="14" dur="1" fill="hold">
+                                          <p:stCondLst>
+                                            <p:cond delay="0"/>
+                                          </p:stCondLst>
+                                        </p:cTn>
+                                        <p:tgtEl>
+                                          <p:spTgt spid="3">
+                                            <p:txEl>
+                                              <p:pRg st="5" end="5"/>
+                                            </p:txEl>
+                                          </p:spTgt>
+                                        </p:tgtEl>
+                                        <p:attrNameLst>
+                                          <p:attrName>style.visibility</p:attrName>
+                                        </p:attrNameLst>
+                                      </p:cBhvr>
+                                      <p:to>
+                                        <p:strVal val="visible"/>
+                                      </p:to>
+                                    </p:set>
+                                  </p:childTnLst>
+                                </p:cTn>
+                              </p:par>
+                            </p:childTnLst>
+                          </p:cTn>
+                        </p:par>
+                      </p:childTnLst>
+                    </p:cTn>
+                  </p:par>
+                  <p:par>
+                    <p:cTn id="15" fill="hold">
+                      <p:stCondLst>
+                        <p:cond delay="indefinite"/>
+                      </p:stCondLst>
+                      <p:childTnLst>
+                        <p:par>
+                          <p:cTn id="16" fill="hold">
+                            <p:stCondLst>
+                              <p:cond delay="0"/>
+                            </p:stCondLst>
+                            <p:childTnLst>
+                              <p:par>
+                                <p:cTn id="17" presetID="1" presetClass="entr" presetSubtype="0" fill="hold" nodeType="clickEffect">
+                                  <p:stCondLst>
+                                    <p:cond delay="0"/>
+                                  </p:stCondLst>
+                                  <p:childTnLst>
+                                    <p:set>
+                                      <p:cBhvr>
+                                        <p:cTn id="18" dur="1" fill="hold">
+                                          <p:stCondLst>
+                                            <p:cond delay="0"/>
+                                          </p:stCondLst>
+                                        </p:cTn>
+                                        <p:tgtEl>
+                                          <p:spTgt spid="3">
+                                            <p:txEl>
+                                              <p:pRg st="7" end="7"/>
+                                            </p:txEl>
+                                          </p:spTgt>
+                                        </p:tgtEl>
+                                        <p:attrNameLst>
+                                          <p:attrName>style.visibility</p:attrName>
+                                        </p:attrNameLst>
+                                      </p:cBhvr>
+                                      <p:to>
+                                        <p:strVal val="visible"/>
+                                      </p:to>
+                                    </p:set>
+                                  </p:childTnLst>
+                                </p:cTn>
+                              </p:par>
+                            </p:childTnLst>
+                          </p:cTn>
+                        </p:par>
+                      </p:childTnLst>
+                    </p:cTn>
+                  </p:par>
+                  <p:par>
+                    <p:cTn id="19" fill="hold">
+                      <p:stCondLst>
+                        <p:cond delay="indefinite"/>
+                      </p:stCondLst>
+                      <p:childTnLst>
+                        <p:par>
+                          <p:cTn id="20" fill="hold">
+                            <p:stCondLst>
+                              <p:cond delay="0"/>
+                            </p:stCondLst>
+                            <p:childTnLst>
+                              <p:par>
+                                <p:cTn id="21" presetID="1" presetClass="entr" presetSubtype="0" fill="hold" nodeType="clickEffect">
+                                  <p:stCondLst>
+                                    <p:cond delay="0"/>
+                                  </p:stCondLst>
+                                  <p:childTnLst>
+                                    <p:set>
+                                      <p:cBhvr>
+                                        <p:cTn id="22" dur="1" fill="hold">
+                                          <p:stCondLst>
+                                            <p:cond delay="0"/>
+                                          </p:stCondLst>
+                                        </p:cTn>
+                                        <p:tgtEl>
+                                          <p:spTgt spid="3">
+                                            <p:txEl>
+                                              <p:pRg st="8" end="8"/>
+                                            </p:txEl>
+                                          </p:spTgt>
+                                        </p:tgtEl>
+                                        <p:attrNameLst>
+                                          <p:attrName>style.visibility</p:attrName>
+                                        </p:attrNameLst>
+                                      </p:cBhvr>
+                                      <p:to>
+                                        <p:strVal val="visible"/>
+                                      </p:to>
+                                    </p:set>
+                                  </p:childTnLst>
+                                </p:cTn>
+                              </p:par>
+                            </p:childTnLst>
+                          </p:cTn>
+                        </p:par>
+                      </p:childTnLst>
+                    </p:cTn>
+                  </p:par>
+                  <p:par>
+                    <p:cTn id="23" fill="hold">
+                      <p:stCondLst>
+                        <p:cond delay="indefinite"/>
+                      </p:stCondLst>
+                      <p:childTnLst>
+                        <p:par>
+                          <p:cTn id="24" fill="hold">
+                            <p:stCondLst>
+                              <p:cond delay="0"/>
+                            </p:stCondLst>
+                            <p:childTnLst>
+                              <p:par>
+                                <p:cTn id="25" presetID="1" presetClass="entr" presetSubtype="0" fill="hold" nodeType="clickEffect">
+                                  <p:stCondLst>
+                                    <p:cond delay="0"/>
+                                  </p:stCondLst>
+                                  <p:childTnLst>
+                                    <p:set>
+                                      <p:cBhvr>
+                                        <p:cTn id="26" dur="1" fill="hold">
+                                          <p:stCondLst>
+                                            <p:cond delay="0"/>
+                                          </p:stCondLst>
+                                        </p:cTn>
+                                        <p:tgtEl>
+                                          <p:spTgt spid="3">
+                                            <p:txEl>
+                                              <p:pRg st="9" end="9"/>
+                                            </p:txEl>
+                                          </p:spTgt>
+                                        </p:tgtEl>
+                                        <p:attrNameLst>
+                                          <p:attrName>style.visibility</p:attrName>
+                                        </p:attrNameLst>
+                                      </p:cBhvr>
+                                      <p:to>
+                                        <p:strVal val="visible"/>
+                                      </p:to>
+                                    </p:set>
+                                  </p:childTnLst>
+                                </p:cTn>
+                              </p:par>
+                            </p:childTnLst>
+                          </p:cTn>
+                        </p:par>
+                      </p:childTnLst>
+                    </p:cTn>
+                  </p:par>
+                  <p:par>
+                    <p:cTn id="27" fill="hold">
+                      <p:stCondLst>
+                        <p:cond delay="indefinite"/>
+                      </p:stCondLst>
+                      <p:childTnLst>
+                        <p:par>
+                          <p:cTn id="28" fill="hold">
+                            <p:stCondLst>
+                              <p:cond delay="0"/>
+                            </p:stCondLst>
+                            <p:childTnLst>
+                              <p:par>
+                                <p:cTn id="29" presetID="1" presetClass="entr" presetSubtype="0" fill="hold" nodeType="clickEffect">
+                                  <p:stCondLst>
+                                    <p:cond delay="0"/>
+                                  </p:stCondLst>
+                                  <p:childTnLst>
+                                    <p:set>
+                                      <p:cBhvr>
+                                        <p:cTn id="30" dur="1" fill="hold">
+                                          <p:stCondLst>
+                                            <p:cond delay="0"/>
+                                          </p:stCondLst>
+                                        </p:cTn>
+                                        <p:tgtEl>
+                                          <p:spTgt spid="3">
+                                            <p:txEl>
+                                              <p:pRg st="10" end="10"/>
+                                            </p:txEl>
+                                          </p:spTgt>
+                                        </p:tgtEl>
+                                        <p:attrNameLst>
+                                          <p:attrName>style.visibility</p:attrName>
+                                        </p:attrNameLst>
+                                      </p:cBhvr>
+                                      <p:to>
+                                        <p:strVal val="visible"/>
+                                      </p:to>
+                                    </p:set>
+                                  </p:childTnLst>
+                                </p:cTn>
+                              </p:par>
+                            </p:childTnLst>
+                          </p:cTn>
+                        </p:par>
+                      </p:childTnLst>
+                    </p:cTn>
+                  </p:par>
+                  <p:par>
+                    <p:cTn id="31" fill="hold">
+                      <p:stCondLst>
+                        <p:cond delay="indefinite"/>
+                      </p:stCondLst>
+                      <p:childTnLst>
+                        <p:par>
+                          <p:cTn id="32" fill="hold">
+                            <p:stCondLst>
+                              <p:cond delay="0"/>
+                            </p:stCondLst>
+                            <p:childTnLst>
+                              <p:par>
+                                <p:cTn id="33" presetID="18" presetClass="emph" presetSubtype="0" fill="hold" nodeType="clickEffect">
+                                  <p:stCondLst>
+                                    <p:cond delay="0"/>
+                                  </p:stCondLst>
+                                  <p:iterate type="lt">
+                                    <p:tmPct val="4000"/>
+                                  </p:iterate>
+                                  <p:childTnLst>
+                                    <p:set>
+                                      <p:cBhvr override="childStyle">
+                                        <p:cTn id="34" dur="500" fill="hold"/>
+                                        <p:tgtEl>
+                                          <p:spTgt spid="3">
+                                            <p:txEl>
+                                              <p:pRg st="4" end="4"/>
+                                            </p:txEl>
+                                          </p:spTgt>
+                                        </p:tgtEl>
+                                        <p:attrNameLst>
+                                          <p:attrName>style.textDecorationUnderline</p:attrName>
+                                        </p:attrNameLst>
+                                      </p:cBhvr>
+                                      <p:to>
+                                        <p:strVal val="true"/>
+                                      </p:to>
+                                    </p:set>
+                                  </p:childTnLst>
+                                </p:cTn>
+                              </p:par>
+                            </p:childTnLst>
+                          </p:cTn>
+                        </p:par>
+                      </p:childTnLst>
+                    </p:cTn>
+                  </p:par>
+                </p:childTnLst>
+              </p:cTn>
+              <p:prevCondLst>
+                <p:cond evt="onPrev" delay="0">
+                  <p:tgtEl>
+                    <p:sldTgt/>
+                  </p:tgtEl>
+                </p:cond>
+              </p:prevCondLst>
+              <p:nextCondLst>
+                <p:cond evt="onNext" delay="0">
+                  <p:tgtEl>
+                    <p:sldTgt/>
+                  </p:tgtEl>
+                </p:cond>
+              </p:nextCondLst>
+            </p:seq>
+          </p:childTnLst>
+        </p:cTn>
+      </p:par>
+    </p:tnLst>
+  </p:timing>
 </p:sld>
 </file>
 
@@ -4447,7 +7160,11 @@
           <a:bodyPr/>
           <a:lstStyle/>
           <a:p>
-            <a:endParaRPr lang="en-US"/>
+            <a:r>
+              <a:rPr lang="en-US" dirty="0"/>
+              <a:t>Predictions for differences between sexes</a:t>
+            </a:r>
+            <a:endParaRPr lang="en-US" dirty="0"/>
           </a:p>
         </p:txBody>
       </p:sp>
@@ -4553,6 +7270,13 @@
   <p:clrMapOvr>
     <a:masterClrMapping/>
   </p:clrMapOvr>
+  <p:timing>
+    <p:tnLst>
+      <p:par>
+        <p:cTn id="1" dur="indefinite" restart="never" nodeType="tmRoot"/>
+      </p:par>
+    </p:tnLst>
+  </p:timing>
 </p:sld>
 </file>
 
@@ -4589,8 +7313,20 @@
           <a:lstStyle/>
           <a:p>
             <a:r>
-              <a:rPr lang="en-US" dirty="0" smtClean="0"/>
-              <a:t>results</a:t>
+              <a:rPr lang="en-US" dirty="0" err="1" smtClean="0"/>
+              <a:t>BivData</a:t>
+            </a:r>
+            <a:r>
+              <a:rPr lang="en-US" dirty="0" smtClean="0"/>
+              <a:t> </a:t>
+            </a:r>
+            <a:r>
+              <a:rPr lang="en-US" dirty="0"/>
+              <a:t>S</a:t>
+            </a:r>
+            <a:r>
+              <a:rPr lang="en-US" dirty="0" smtClean="0"/>
+              <a:t>ex Specific Results</a:t>
             </a:r>
             <a:endParaRPr lang="en-US" dirty="0"/>
           </a:p>
@@ -4615,7 +7351,7 @@
         </p:spPr>
         <p:txBody>
           <a:bodyPr vert="horz" lIns="91440" tIns="45720" rIns="91440" bIns="45720" rtlCol="0">
-            <a:normAutofit/>
+            <a:normAutofit lnSpcReduction="10000"/>
           </a:bodyPr>
           <a:lstStyle>
             <a:lvl1pPr marL="228600" indent="-228600" algn="l" defTabSz="914400" rtl="0" eaLnBrk="1" latinLnBrk="0" hangingPunct="1">
@@ -4787,7 +7523,26 @@
             </a:pPr>
             <a:r>
               <a:rPr lang="en-US" dirty="0" smtClean="0"/>
-              <a:t>1.</a:t>
+              <a:t>(tests used – the same mixed model)</a:t>
+            </a:r>
+          </a:p>
+          <a:p>
+            <a:pPr marL="0" indent="0">
+              <a:buNone/>
+            </a:pPr>
+            <a:endParaRPr lang="en-US" dirty="0"/>
+          </a:p>
+          <a:p>
+            <a:pPr marL="0" indent="0">
+              <a:buNone/>
+            </a:pPr>
+            <a:r>
+              <a:rPr lang="en-US" dirty="0" smtClean="0"/>
+              <a:t>1</a:t>
+            </a:r>
+            <a:r>
+              <a:rPr lang="en-US" dirty="0" smtClean="0"/>
+              <a:t>.</a:t>
             </a:r>
             <a:r>
               <a:rPr lang="en-US" b="1" i="1" dirty="0" smtClean="0"/>
@@ -4801,7 +7556,11 @@
             </a:pPr>
             <a:r>
               <a:rPr lang="en-US" dirty="0" smtClean="0"/>
-              <a:t>2.. </a:t>
+              <a:t>2</a:t>
+            </a:r>
+            <a:r>
+              <a:rPr lang="en-US" dirty="0" smtClean="0"/>
+              <a:t>. </a:t>
             </a:r>
             <a:r>
               <a:rPr lang="en-US" b="1" i="1" dirty="0" smtClean="0"/>
@@ -4846,7 +7605,7 @@
         </p:blipFill>
         <p:spPr>
           <a:xfrm>
-            <a:off x="6743700" y="1690688"/>
+            <a:off x="6743699" y="2615429"/>
             <a:ext cx="628650" cy="590550"/>
           </a:xfrm>
           <a:prstGeom prst="rect">
@@ -4870,7 +7629,7 @@
         </p:blipFill>
         <p:spPr>
           <a:xfrm>
-            <a:off x="8966688" y="2281238"/>
+            <a:off x="9025324" y="3091543"/>
             <a:ext cx="628650" cy="590550"/>
           </a:xfrm>
           <a:prstGeom prst="rect">
@@ -4894,7 +7653,7 @@
         </p:blipFill>
         <p:spPr>
           <a:xfrm>
-            <a:off x="9901116" y="3067050"/>
+            <a:off x="10151076" y="3835854"/>
             <a:ext cx="926611" cy="704850"/>
           </a:xfrm>
           <a:prstGeom prst="rect">
@@ -4912,6 +7671,171 @@
   <p:clrMapOvr>
     <a:masterClrMapping/>
   </p:clrMapOvr>
+  <p:timing>
+    <p:tnLst>
+      <p:par>
+        <p:cTn id="1" dur="indefinite" restart="never" nodeType="tmRoot">
+          <p:childTnLst>
+            <p:seq concurrent="1" nextAc="seek">
+              <p:cTn id="2" dur="indefinite" nodeType="mainSeq">
+                <p:childTnLst>
+                  <p:par>
+                    <p:cTn id="3" fill="hold">
+                      <p:stCondLst>
+                        <p:cond delay="indefinite"/>
+                      </p:stCondLst>
+                      <p:childTnLst>
+                        <p:par>
+                          <p:cTn id="4" fill="hold">
+                            <p:stCondLst>
+                              <p:cond delay="0"/>
+                            </p:stCondLst>
+                            <p:childTnLst>
+                              <p:par>
+                                <p:cTn id="5" presetID="1" presetClass="entr" presetSubtype="0" fill="hold" nodeType="clickEffect">
+                                  <p:stCondLst>
+                                    <p:cond delay="0"/>
+                                  </p:stCondLst>
+                                  <p:childTnLst>
+                                    <p:set>
+                                      <p:cBhvr>
+                                        <p:cTn id="6" dur="1" fill="hold">
+                                          <p:stCondLst>
+                                            <p:cond delay="0"/>
+                                          </p:stCondLst>
+                                        </p:cTn>
+                                        <p:tgtEl>
+                                          <p:spTgt spid="6"/>
+                                        </p:tgtEl>
+                                        <p:attrNameLst>
+                                          <p:attrName>style.visibility</p:attrName>
+                                        </p:attrNameLst>
+                                      </p:cBhvr>
+                                      <p:to>
+                                        <p:strVal val="visible"/>
+                                      </p:to>
+                                    </p:set>
+                                  </p:childTnLst>
+                                </p:cTn>
+                              </p:par>
+                            </p:childTnLst>
+                          </p:cTn>
+                        </p:par>
+                      </p:childTnLst>
+                    </p:cTn>
+                  </p:par>
+                  <p:par>
+                    <p:cTn id="7" fill="hold">
+                      <p:stCondLst>
+                        <p:cond delay="indefinite"/>
+                      </p:stCondLst>
+                      <p:childTnLst>
+                        <p:par>
+                          <p:cTn id="8" fill="hold">
+                            <p:stCondLst>
+                              <p:cond delay="0"/>
+                            </p:stCondLst>
+                            <p:childTnLst>
+                              <p:par>
+                                <p:cTn id="9" presetID="1" presetClass="entr" presetSubtype="0" fill="hold" nodeType="clickEffect">
+                                  <p:stCondLst>
+                                    <p:cond delay="0"/>
+                                  </p:stCondLst>
+                                  <p:childTnLst>
+                                    <p:set>
+                                      <p:cBhvr>
+                                        <p:cTn id="10" dur="1" fill="hold">
+                                          <p:stCondLst>
+                                            <p:cond delay="0"/>
+                                          </p:stCondLst>
+                                        </p:cTn>
+                                        <p:tgtEl>
+                                          <p:spTgt spid="7"/>
+                                        </p:tgtEl>
+                                        <p:attrNameLst>
+                                          <p:attrName>style.visibility</p:attrName>
+                                        </p:attrNameLst>
+                                      </p:cBhvr>
+                                      <p:to>
+                                        <p:strVal val="visible"/>
+                                      </p:to>
+                                    </p:set>
+                                  </p:childTnLst>
+                                </p:cTn>
+                              </p:par>
+                            </p:childTnLst>
+                          </p:cTn>
+                        </p:par>
+                      </p:childTnLst>
+                    </p:cTn>
+                  </p:par>
+                  <p:par>
+                    <p:cTn id="11" fill="hold">
+                      <p:stCondLst>
+                        <p:cond delay="indefinite"/>
+                      </p:stCondLst>
+                      <p:childTnLst>
+                        <p:par>
+                          <p:cTn id="12" fill="hold">
+                            <p:stCondLst>
+                              <p:cond delay="0"/>
+                            </p:stCondLst>
+                            <p:childTnLst>
+                              <p:par>
+                                <p:cTn id="13" presetID="1" presetClass="entr" presetSubtype="0" fill="hold" nodeType="clickEffect">
+                                  <p:stCondLst>
+                                    <p:cond delay="0"/>
+                                  </p:stCondLst>
+                                  <p:childTnLst>
+                                    <p:set>
+                                      <p:cBhvr>
+                                        <p:cTn id="14" dur="1" fill="hold">
+                                          <p:stCondLst>
+                                            <p:cond delay="0"/>
+                                          </p:stCondLst>
+                                        </p:cTn>
+                                        <p:tgtEl>
+                                          <p:spTgt spid="8"/>
+                                        </p:tgtEl>
+                                        <p:attrNameLst>
+                                          <p:attrName>style.visibility</p:attrName>
+                                        </p:attrNameLst>
+                                      </p:cBhvr>
+                                      <p:to>
+                                        <p:strVal val="visible"/>
+                                      </p:to>
+                                    </p:set>
+                                  </p:childTnLst>
+                                </p:cTn>
+                              </p:par>
+                            </p:childTnLst>
+                          </p:cTn>
+                        </p:par>
+                      </p:childTnLst>
+                    </p:cTn>
+                  </p:par>
+                </p:childTnLst>
+              </p:cTn>
+              <p:prevCondLst>
+                <p:cond evt="onPrev" delay="0">
+                  <p:tgtEl>
+                    <p:sldTgt/>
+                  </p:tgtEl>
+                </p:cond>
+              </p:prevCondLst>
+              <p:nextCondLst>
+                <p:cond evt="onNext" delay="0">
+                  <p:tgtEl>
+                    <p:sldTgt/>
+                  </p:tgtEl>
+                </p:cond>
+              </p:nextCondLst>
+            </p:seq>
+          </p:childTnLst>
+        </p:cTn>
+      </p:par>
+    </p:tnLst>
+  </p:timing>
 </p:sld>
 </file>
 
@@ -4947,6 +7871,10 @@
           <a:bodyPr/>
           <a:lstStyle/>
           <a:p>
+            <a:r>
+              <a:rPr lang="en-US" dirty="0" smtClean="0"/>
+              <a:t>(surprising IFD results)</a:t>
+            </a:r>
             <a:endParaRPr lang="en-US" dirty="0"/>
           </a:p>
         </p:txBody>
@@ -4963,12 +7891,88 @@
         </p:nvSpPr>
         <p:spPr/>
         <p:txBody>
-          <a:bodyPr/>
-          <a:lstStyle/>
-          <a:p>
-            <a:r>
-              <a:rPr lang="en-US" dirty="0" smtClean="0"/>
-              <a:t>(illustrate strange results for sex difference in interference?)</a:t>
+          <a:bodyPr>
+            <a:normAutofit fontScale="92500"/>
+          </a:bodyPr>
+          <a:lstStyle/>
+          <a:p>
+            <a:pPr marL="0" indent="0">
+              <a:buNone/>
+            </a:pPr>
+            <a:r>
+              <a:rPr lang="en-US" dirty="0" smtClean="0"/>
+              <a:t>Review results from de Boer (only sex comparison of both sexes)</a:t>
+            </a:r>
+          </a:p>
+          <a:p>
+            <a:r>
+              <a:rPr lang="en-US" dirty="0" smtClean="0"/>
+              <a:t>(</a:t>
+            </a:r>
+            <a:r>
+              <a:rPr lang="en-US" dirty="0" smtClean="0"/>
+              <a:t>illustrate strange results for sex difference in interference</a:t>
+            </a:r>
+            <a:r>
+              <a:rPr lang="en-US" dirty="0" smtClean="0"/>
+              <a:t>?)n</a:t>
+            </a:r>
+          </a:p>
+          <a:p>
+            <a:r>
+              <a:rPr lang="en-US" dirty="0" smtClean="0"/>
+              <a:t>Strange </a:t>
+            </a:r>
+            <a:r>
+              <a:rPr lang="en-US" dirty="0" err="1" smtClean="0"/>
+              <a:t>coefficicents</a:t>
+            </a:r>
+            <a:r>
+              <a:rPr lang="en-US" dirty="0" smtClean="0"/>
+              <a:t> for the IFD values across sexes</a:t>
+            </a:r>
+          </a:p>
+          <a:p>
+            <a:endParaRPr lang="en-US" dirty="0"/>
+          </a:p>
+          <a:p>
+            <a:pPr marL="0" indent="0">
+              <a:buNone/>
+            </a:pPr>
+            <a:r>
+              <a:rPr lang="en-US" dirty="0" smtClean="0"/>
+              <a:t>over all pattern:</a:t>
+            </a:r>
+          </a:p>
+          <a:p>
+            <a:r>
+              <a:rPr lang="en-US" dirty="0" smtClean="0"/>
+              <a:t>Female IFD are longer, but the lower </a:t>
+            </a:r>
+            <a:r>
+              <a:rPr lang="en-US" dirty="0" err="1" smtClean="0"/>
+              <a:t>nrmIFD</a:t>
+            </a:r>
+            <a:r>
+              <a:rPr lang="en-US" dirty="0" smtClean="0"/>
+              <a:t> in females is driven by enrichment for short </a:t>
+            </a:r>
+            <a:r>
+              <a:rPr lang="en-US" dirty="0" err="1" smtClean="0"/>
+              <a:t>nrmIFD</a:t>
+            </a:r>
+            <a:r>
+              <a:rPr lang="en-US" dirty="0" smtClean="0"/>
+              <a:t> compared to males.</a:t>
+            </a:r>
+          </a:p>
+          <a:p>
+            <a:endParaRPr lang="en-US" dirty="0"/>
+          </a:p>
+          <a:p>
+            <a:r>
+              <a:rPr lang="en-US" dirty="0" smtClean="0"/>
+              <a:t>(can I connect this result to a less regulated meiotic pathway in females?)</a:t>
             </a:r>
             <a:endParaRPr lang="en-US" dirty="0"/>
           </a:p>
@@ -4984,6 +7988,13 @@
   <p:clrMapOvr>
     <a:masterClrMapping/>
   </p:clrMapOvr>
+  <p:timing>
+    <p:tnLst>
+      <p:par>
+        <p:cTn id="1" dur="indefinite" restart="never" nodeType="tmRoot"/>
+      </p:par>
+    </p:tnLst>
+  </p:timing>
 </p:sld>
 </file>
 

</xml_diff>

<commit_message>
summarizing all results, updating saving files
</commit_message>
<xml_diff>
--- a/AP_labMeeting_2.12.20.pptx
+++ b/AP_labMeeting_2.12.20.pptx
@@ -211,7 +211,7 @@
           <a:p>
             <a:fld id="{582DA5D2-0B3C-4799-B633-4F32A722274F}" type="datetimeFigureOut">
               <a:rPr lang="en-US" smtClean="0"/>
-              <a:t>2/3/2020</a:t>
+              <a:t>2/4/2020</a:t>
             </a:fld>
             <a:endParaRPr lang="en-US"/>
           </a:p>
@@ -1654,23 +1654,11 @@
           <a:p>
             <a:r>
               <a:rPr lang="en-US" dirty="0" smtClean="0"/>
-              <a:t>(</a:t>
-            </a:r>
-            <a:r>
-              <a:rPr lang="en-US" dirty="0" smtClean="0"/>
-              <a:t>longer</a:t>
+              <a:t>(longer</a:t>
             </a:r>
             <a:r>
               <a:rPr lang="en-US" baseline="0" dirty="0" smtClean="0"/>
-              <a:t> </a:t>
-            </a:r>
-            <a:r>
-              <a:rPr lang="en-US" baseline="0" dirty="0" smtClean="0"/>
-              <a:t>SC lengths (variance in SC length / I’m not sure this makes sense</a:t>
-            </a:r>
-            <a:r>
-              <a:rPr lang="en-US" baseline="0" dirty="0" smtClean="0"/>
-              <a:t>)</a:t>
+              <a:t> SC lengths (variance in SC length / I’m not sure this makes sense)</a:t>
             </a:r>
             <a:r>
               <a:rPr lang="en-US" dirty="0" smtClean="0"/>
@@ -2816,7 +2804,7 @@
           <a:p>
             <a:fld id="{BA11E091-050C-4DAB-ABC8-34B3B7B173DA}" type="datetimeFigureOut">
               <a:rPr lang="en-US" smtClean="0"/>
-              <a:t>2/3/2020</a:t>
+              <a:t>2/4/2020</a:t>
             </a:fld>
             <a:endParaRPr lang="en-US"/>
           </a:p>
@@ -2986,7 +2974,7 @@
           <a:p>
             <a:fld id="{BA11E091-050C-4DAB-ABC8-34B3B7B173DA}" type="datetimeFigureOut">
               <a:rPr lang="en-US" smtClean="0"/>
-              <a:t>2/3/2020</a:t>
+              <a:t>2/4/2020</a:t>
             </a:fld>
             <a:endParaRPr lang="en-US"/>
           </a:p>
@@ -3166,7 +3154,7 @@
           <a:p>
             <a:fld id="{BA11E091-050C-4DAB-ABC8-34B3B7B173DA}" type="datetimeFigureOut">
               <a:rPr lang="en-US" smtClean="0"/>
-              <a:t>2/3/2020</a:t>
+              <a:t>2/4/2020</a:t>
             </a:fld>
             <a:endParaRPr lang="en-US"/>
           </a:p>
@@ -3336,7 +3324,7 @@
           <a:p>
             <a:fld id="{BA11E091-050C-4DAB-ABC8-34B3B7B173DA}" type="datetimeFigureOut">
               <a:rPr lang="en-US" smtClean="0"/>
-              <a:t>2/3/2020</a:t>
+              <a:t>2/4/2020</a:t>
             </a:fld>
             <a:endParaRPr lang="en-US"/>
           </a:p>
@@ -3582,7 +3570,7 @@
           <a:p>
             <a:fld id="{BA11E091-050C-4DAB-ABC8-34B3B7B173DA}" type="datetimeFigureOut">
               <a:rPr lang="en-US" smtClean="0"/>
-              <a:t>2/3/2020</a:t>
+              <a:t>2/4/2020</a:t>
             </a:fld>
             <a:endParaRPr lang="en-US"/>
           </a:p>
@@ -3814,7 +3802,7 @@
           <a:p>
             <a:fld id="{BA11E091-050C-4DAB-ABC8-34B3B7B173DA}" type="datetimeFigureOut">
               <a:rPr lang="en-US" smtClean="0"/>
-              <a:t>2/3/2020</a:t>
+              <a:t>2/4/2020</a:t>
             </a:fld>
             <a:endParaRPr lang="en-US"/>
           </a:p>
@@ -4181,7 +4169,7 @@
           <a:p>
             <a:fld id="{BA11E091-050C-4DAB-ABC8-34B3B7B173DA}" type="datetimeFigureOut">
               <a:rPr lang="en-US" smtClean="0"/>
-              <a:t>2/3/2020</a:t>
+              <a:t>2/4/2020</a:t>
             </a:fld>
             <a:endParaRPr lang="en-US"/>
           </a:p>
@@ -4299,7 +4287,7 @@
           <a:p>
             <a:fld id="{BA11E091-050C-4DAB-ABC8-34B3B7B173DA}" type="datetimeFigureOut">
               <a:rPr lang="en-US" smtClean="0"/>
-              <a:t>2/3/2020</a:t>
+              <a:t>2/4/2020</a:t>
             </a:fld>
             <a:endParaRPr lang="en-US"/>
           </a:p>
@@ -4394,7 +4382,7 @@
           <a:p>
             <a:fld id="{BA11E091-050C-4DAB-ABC8-34B3B7B173DA}" type="datetimeFigureOut">
               <a:rPr lang="en-US" smtClean="0"/>
-              <a:t>2/3/2020</a:t>
+              <a:t>2/4/2020</a:t>
             </a:fld>
             <a:endParaRPr lang="en-US"/>
           </a:p>
@@ -4671,7 +4659,7 @@
           <a:p>
             <a:fld id="{BA11E091-050C-4DAB-ABC8-34B3B7B173DA}" type="datetimeFigureOut">
               <a:rPr lang="en-US" smtClean="0"/>
-              <a:t>2/3/2020</a:t>
+              <a:t>2/4/2020</a:t>
             </a:fld>
             <a:endParaRPr lang="en-US"/>
           </a:p>
@@ -4924,7 +4912,7 @@
           <a:p>
             <a:fld id="{BA11E091-050C-4DAB-ABC8-34B3B7B173DA}" type="datetimeFigureOut">
               <a:rPr lang="en-US" smtClean="0"/>
-              <a:t>2/3/2020</a:t>
+              <a:t>2/4/2020</a:t>
             </a:fld>
             <a:endParaRPr lang="en-US"/>
           </a:p>
@@ -5137,7 +5125,7 @@
           <a:p>
             <a:fld id="{BA11E091-050C-4DAB-ABC8-34B3B7B173DA}" type="datetimeFigureOut">
               <a:rPr lang="en-US" smtClean="0"/>
-              <a:t>2/3/2020</a:t>
+              <a:t>2/4/2020</a:t>
             </a:fld>
             <a:endParaRPr lang="en-US"/>
           </a:p>
@@ -5580,6 +5568,10 @@
           <a:bodyPr/>
           <a:lstStyle/>
           <a:p>
+            <a:r>
+              <a:rPr lang="en-US" smtClean="0"/>
+              <a:t>12.2.20</a:t>
+            </a:r>
             <a:endParaRPr lang="en-US"/>
           </a:p>
         </p:txBody>
@@ -5671,15 +5663,7 @@
           <a:p>
             <a:r>
               <a:rPr lang="en-US" dirty="0" smtClean="0"/>
-              <a:t>Strange </a:t>
-            </a:r>
-            <a:r>
-              <a:rPr lang="en-US" dirty="0" smtClean="0"/>
-              <a:t>coefficients </a:t>
-            </a:r>
-            <a:r>
-              <a:rPr lang="en-US" dirty="0" smtClean="0"/>
-              <a:t>for the IFD values across sexes</a:t>
+              <a:t>Strange coefficients for the IFD values across sexes</a:t>
             </a:r>
           </a:p>
           <a:p>

</xml_diff>

<commit_message>
added some results for Nrm Foci Pos
</commit_message>
<xml_diff>
--- a/AP_labMeeting_2.12.20.pptx
+++ b/AP_labMeeting_2.12.20.pptx
@@ -5,7 +5,7 @@
     <p:sldMasterId id="2147483648" r:id="rId1"/>
   </p:sldMasterIdLst>
   <p:notesMasterIdLst>
-    <p:notesMasterId r:id="rId20"/>
+    <p:notesMasterId r:id="rId21"/>
   </p:notesMasterIdLst>
   <p:sldIdLst>
     <p:sldId id="256" r:id="rId2"/>
@@ -21,11 +21,12 @@
     <p:sldId id="273" r:id="rId12"/>
     <p:sldId id="274" r:id="rId13"/>
     <p:sldId id="260" r:id="rId14"/>
-    <p:sldId id="272" r:id="rId15"/>
-    <p:sldId id="269" r:id="rId16"/>
-    <p:sldId id="270" r:id="rId17"/>
-    <p:sldId id="266" r:id="rId18"/>
-    <p:sldId id="268" r:id="rId19"/>
+    <p:sldId id="279" r:id="rId15"/>
+    <p:sldId id="272" r:id="rId16"/>
+    <p:sldId id="269" r:id="rId17"/>
+    <p:sldId id="270" r:id="rId18"/>
+    <p:sldId id="266" r:id="rId19"/>
+    <p:sldId id="268" r:id="rId20"/>
   </p:sldIdLst>
   <p:sldSz cx="12192000" cy="6858000"/>
   <p:notesSz cx="6858000" cy="9144000"/>
@@ -214,7 +215,7 @@
           <a:p>
             <a:fld id="{582DA5D2-0B3C-4799-B633-4F32A722274F}" type="datetimeFigureOut">
               <a:rPr lang="en-US" smtClean="0"/>
-              <a:t>2/6/2020</a:t>
+              <a:t>2/7/2020</a:t>
             </a:fld>
             <a:endParaRPr lang="en-US"/>
           </a:p>
@@ -981,648 +982,54 @@
           <a:bodyPr/>
           <a:lstStyle/>
           <a:p>
-            <a:r>
-              <a:rPr lang="en-US" dirty="0" smtClean="0"/>
-              <a:t>Interference / gamma curves are on the top --- don’t think any are female?</a:t>
-            </a:r>
-          </a:p>
-          <a:p>
-            <a:endParaRPr lang="en-US" dirty="0" smtClean="0"/>
-          </a:p>
-          <a:p>
-            <a:r>
-              <a:rPr lang="en-US" dirty="0" smtClean="0"/>
-              <a:t>(Should I try to remake these cumulative foci plots?)  --- smaller</a:t>
-            </a:r>
-            <a:r>
-              <a:rPr lang="en-US" baseline="0" dirty="0" smtClean="0"/>
-              <a:t> square </a:t>
-            </a:r>
-            <a:r>
-              <a:rPr lang="en-US" dirty="0" smtClean="0"/>
-              <a:t>curve plots are there are all</a:t>
+            <a:pPr marL="228600" indent="-228600">
+              <a:buAutoNum type="arabicPeriod"/>
+            </a:pPr>
+            <a:r>
+              <a:rPr lang="en-US" dirty="0" smtClean="0"/>
+              <a:t>WSB has the most</a:t>
             </a:r>
             <a:r>
               <a:rPr lang="en-US" baseline="0" dirty="0" smtClean="0"/>
               <a:t> </a:t>
             </a:r>
             <a:r>
-              <a:rPr lang="en-US" b="1" baseline="0" dirty="0" smtClean="0"/>
-              <a:t>distance to cent</a:t>
-            </a:r>
-            <a:r>
-              <a:rPr lang="en-US" b="0" baseline="0" dirty="0" smtClean="0"/>
-              <a:t> (do these pool foci from the same </a:t>
-            </a:r>
-            <a:r>
-              <a:rPr lang="en-US" b="0" baseline="0" dirty="0" err="1" smtClean="0"/>
-              <a:t>biv</a:t>
-            </a:r>
-            <a:r>
-              <a:rPr lang="en-US" b="0" baseline="0" dirty="0" smtClean="0"/>
-              <a:t>?!)</a:t>
-            </a:r>
-            <a:endParaRPr lang="en-US" b="0" dirty="0" smtClean="0"/>
-          </a:p>
-          <a:p>
+              <a:rPr lang="en-US" baseline="0" dirty="0" err="1" smtClean="0"/>
+              <a:t>telomeric</a:t>
+            </a:r>
+            <a:r>
+              <a:rPr lang="en-US" baseline="0" dirty="0" smtClean="0"/>
+              <a:t> landscape</a:t>
+            </a:r>
+          </a:p>
+          <a:p>
+            <a:pPr marL="228600" indent="-228600">
+              <a:buAutoNum type="arabicPeriod"/>
+            </a:pPr>
+            <a:r>
+              <a:rPr lang="en-US" baseline="0" dirty="0" smtClean="0"/>
+              <a:t>High rec strains</a:t>
+            </a:r>
             <a:endParaRPr lang="en-US" dirty="0" smtClean="0"/>
           </a:p>
           <a:p>
-            <a:r>
-              <a:rPr lang="en-US" sz="1200" b="1" i="0" u="none" strike="noStrike" kern="1200" baseline="0" dirty="0" smtClean="0">
-                <a:solidFill>
-                  <a:schemeClr val="tx1"/>
-                </a:solidFill>
-                <a:latin typeface="+mn-lt"/>
-                <a:ea typeface="+mn-ea"/>
-                <a:cs typeface="+mn-cs"/>
-              </a:rPr>
-              <a:t>Fig. 1. </a:t>
-            </a:r>
-            <a:r>
-              <a:rPr lang="en-US" sz="1200" b="0" i="0" u="none" strike="noStrike" kern="1200" baseline="0" dirty="0" smtClean="0">
-                <a:solidFill>
-                  <a:schemeClr val="tx1"/>
-                </a:solidFill>
-                <a:latin typeface="+mn-lt"/>
-                <a:ea typeface="+mn-ea"/>
-                <a:cs typeface="+mn-cs"/>
-              </a:rPr>
-              <a:t>Analysis of foci along bivalents. (</a:t>
-            </a:r>
-            <a:r>
-              <a:rPr lang="en-US" sz="1200" b="0" i="1" u="none" strike="noStrike" kern="1200" baseline="0" dirty="0" smtClean="0">
-                <a:solidFill>
-                  <a:schemeClr val="tx1"/>
-                </a:solidFill>
-                <a:latin typeface="+mn-lt"/>
-                <a:ea typeface="+mn-ea"/>
-                <a:cs typeface="+mn-cs"/>
-              </a:rPr>
-              <a:t>A</a:t>
-            </a:r>
-            <a:r>
-              <a:rPr lang="en-US" sz="1200" b="0" i="0" u="none" strike="noStrike" kern="1200" baseline="0" dirty="0" smtClean="0">
-                <a:solidFill>
-                  <a:schemeClr val="tx1"/>
-                </a:solidFill>
-                <a:latin typeface="+mn-lt"/>
-                <a:ea typeface="+mn-ea"/>
-                <a:cs typeface="+mn-cs"/>
-              </a:rPr>
-              <a:t>) Shape of gamma distributions for</a:t>
-            </a:r>
-          </a:p>
-          <a:p>
-            <a:r>
-              <a:rPr lang="en-US" sz="1200" b="0" i="0" u="none" strike="noStrike" kern="1200" baseline="0" dirty="0" smtClean="0">
-                <a:solidFill>
-                  <a:schemeClr val="tx1"/>
-                </a:solidFill>
-                <a:latin typeface="+mn-lt"/>
-                <a:ea typeface="+mn-ea"/>
-                <a:cs typeface="+mn-cs"/>
-              </a:rPr>
-              <a:t>different  values. The average </a:t>
-            </a:r>
-            <a:r>
-              <a:rPr lang="en-US" sz="1200" b="0" i="0" u="none" strike="noStrike" kern="1200" baseline="0" dirty="0" err="1" smtClean="0">
-                <a:solidFill>
-                  <a:schemeClr val="tx1"/>
-                </a:solidFill>
-                <a:latin typeface="+mn-lt"/>
-                <a:ea typeface="+mn-ea"/>
-                <a:cs typeface="+mn-cs"/>
-              </a:rPr>
-              <a:t>interfocus</a:t>
-            </a:r>
-            <a:r>
-              <a:rPr lang="en-US" sz="1200" b="0" i="0" u="none" strike="noStrike" kern="1200" baseline="0" dirty="0" smtClean="0">
-                <a:solidFill>
-                  <a:schemeClr val="tx1"/>
-                </a:solidFill>
-                <a:latin typeface="+mn-lt"/>
-                <a:ea typeface="+mn-ea"/>
-                <a:cs typeface="+mn-cs"/>
-              </a:rPr>
-              <a:t> distance equals 10 for all distributions</a:t>
-            </a:r>
-          </a:p>
-          <a:p>
-            <a:r>
-              <a:rPr lang="en-US" sz="1200" b="0" i="0" u="none" strike="noStrike" kern="1200" baseline="0" dirty="0" smtClean="0">
-                <a:solidFill>
-                  <a:schemeClr val="tx1"/>
-                </a:solidFill>
-                <a:latin typeface="+mn-lt"/>
-                <a:ea typeface="+mn-ea"/>
-                <a:cs typeface="+mn-cs"/>
-              </a:rPr>
-              <a:t>shown. As  increases, the very short and very long distances become</a:t>
-            </a:r>
-          </a:p>
-          <a:p>
-            <a:r>
-              <a:rPr lang="en-US" sz="1200" b="0" i="0" u="none" strike="noStrike" kern="1200" baseline="0" dirty="0" smtClean="0">
-                <a:solidFill>
-                  <a:schemeClr val="tx1"/>
-                </a:solidFill>
-                <a:latin typeface="+mn-lt"/>
-                <a:ea typeface="+mn-ea"/>
-                <a:cs typeface="+mn-cs"/>
-              </a:rPr>
-              <a:t>sparser, and the distributions become narrower and more symmetrical. (</a:t>
-            </a:r>
-            <a:r>
-              <a:rPr lang="en-US" sz="1200" b="0" i="1" u="none" strike="noStrike" kern="1200" baseline="0" dirty="0" smtClean="0">
-                <a:solidFill>
-                  <a:schemeClr val="tx1"/>
-                </a:solidFill>
-                <a:latin typeface="+mn-lt"/>
-                <a:ea typeface="+mn-ea"/>
-                <a:cs typeface="+mn-cs"/>
-              </a:rPr>
-              <a:t>B</a:t>
-            </a:r>
-            <a:r>
-              <a:rPr lang="en-US" sz="1200" b="0" i="0" u="none" strike="noStrike" kern="1200" baseline="0" dirty="0" smtClean="0">
-                <a:solidFill>
-                  <a:schemeClr val="tx1"/>
-                </a:solidFill>
-                <a:latin typeface="+mn-lt"/>
-                <a:ea typeface="+mn-ea"/>
-                <a:cs typeface="+mn-cs"/>
-              </a:rPr>
-              <a:t>–</a:t>
-            </a:r>
-            <a:r>
-              <a:rPr lang="en-US" sz="1200" b="0" i="1" u="none" strike="noStrike" kern="1200" baseline="0" dirty="0" smtClean="0">
-                <a:solidFill>
-                  <a:schemeClr val="tx1"/>
-                </a:solidFill>
-                <a:latin typeface="+mn-lt"/>
-                <a:ea typeface="+mn-ea"/>
-                <a:cs typeface="+mn-cs"/>
-              </a:rPr>
-              <a:t>D</a:t>
-            </a:r>
-            <a:r>
-              <a:rPr lang="en-US" sz="1200" b="0" i="0" u="none" strike="noStrike" kern="1200" baseline="0" dirty="0" smtClean="0">
-                <a:solidFill>
-                  <a:schemeClr val="tx1"/>
-                </a:solidFill>
-                <a:latin typeface="+mn-lt"/>
-                <a:ea typeface="+mn-ea"/>
-                <a:cs typeface="+mn-cs"/>
-              </a:rPr>
-              <a:t>)</a:t>
-            </a:r>
-          </a:p>
-          <a:p>
-            <a:r>
-              <a:rPr lang="en-US" sz="1200" b="0" i="0" u="none" strike="noStrike" kern="1200" baseline="0" dirty="0" smtClean="0">
-                <a:solidFill>
-                  <a:schemeClr val="tx1"/>
-                </a:solidFill>
-                <a:latin typeface="+mn-lt"/>
-                <a:ea typeface="+mn-ea"/>
-                <a:cs typeface="+mn-cs"/>
-              </a:rPr>
-              <a:t>Examples of histograms of observed </a:t>
-            </a:r>
-            <a:r>
-              <a:rPr lang="en-US" sz="1200" b="0" i="0" u="none" strike="noStrike" kern="1200" baseline="0" dirty="0" err="1" smtClean="0">
-                <a:solidFill>
-                  <a:schemeClr val="tx1"/>
-                </a:solidFill>
-                <a:latin typeface="+mn-lt"/>
-                <a:ea typeface="+mn-ea"/>
-                <a:cs typeface="+mn-cs"/>
-              </a:rPr>
-              <a:t>interfocus</a:t>
-            </a:r>
-            <a:r>
-              <a:rPr lang="en-US" sz="1200" b="0" i="0" u="none" strike="noStrike" kern="1200" baseline="0" dirty="0" smtClean="0">
-                <a:solidFill>
-                  <a:schemeClr val="tx1"/>
-                </a:solidFill>
-                <a:latin typeface="+mn-lt"/>
-                <a:ea typeface="+mn-ea"/>
-                <a:cs typeface="+mn-cs"/>
-              </a:rPr>
-              <a:t> distances in spermatocytes</a:t>
-            </a:r>
-          </a:p>
-          <a:p>
-            <a:r>
-              <a:rPr lang="en-US" sz="1200" b="0" i="0" u="none" strike="noStrike" kern="1200" baseline="0" dirty="0" smtClean="0">
-                <a:solidFill>
-                  <a:schemeClr val="tx1"/>
-                </a:solidFill>
-                <a:latin typeface="+mn-lt"/>
-                <a:ea typeface="+mn-ea"/>
-                <a:cs typeface="+mn-cs"/>
-              </a:rPr>
-              <a:t>(black bars), the best fit of the observed distances to the gamma distribution  (red curves), the  value for which the best fit was obtained (ˆ ), and the</a:t>
-            </a:r>
-          </a:p>
-          <a:p>
-            <a:r>
-              <a:rPr lang="en-US" sz="1200" b="0" i="0" u="none" strike="noStrike" kern="1200" baseline="0" dirty="0" smtClean="0">
-                <a:solidFill>
-                  <a:schemeClr val="tx1"/>
-                </a:solidFill>
-                <a:latin typeface="+mn-lt"/>
-                <a:ea typeface="+mn-ea"/>
-                <a:cs typeface="+mn-cs"/>
-              </a:rPr>
-              <a:t>distributions expected if there were no interference (i.e., 1; blue curves).</a:t>
-            </a:r>
-          </a:p>
-          <a:p>
-            <a:r>
-              <a:rPr lang="en-US" sz="1200" b="0" i="0" u="none" strike="noStrike" kern="1200" baseline="0" dirty="0" smtClean="0">
-                <a:solidFill>
-                  <a:schemeClr val="tx1"/>
-                </a:solidFill>
-                <a:latin typeface="+mn-lt"/>
-                <a:ea typeface="+mn-ea"/>
-                <a:cs typeface="+mn-cs"/>
-              </a:rPr>
-              <a:t>The observed </a:t>
-            </a:r>
-            <a:r>
-              <a:rPr lang="en-US" sz="1200" b="0" i="0" u="none" strike="noStrike" kern="1200" baseline="0" dirty="0" err="1" smtClean="0">
-                <a:solidFill>
-                  <a:schemeClr val="tx1"/>
-                </a:solidFill>
-                <a:latin typeface="+mn-lt"/>
-                <a:ea typeface="+mn-ea"/>
-                <a:cs typeface="+mn-cs"/>
-              </a:rPr>
-              <a:t>interfocus</a:t>
-            </a:r>
-            <a:r>
-              <a:rPr lang="en-US" sz="1200" b="0" i="0" u="none" strike="noStrike" kern="1200" baseline="0" dirty="0" smtClean="0">
-                <a:solidFill>
-                  <a:schemeClr val="tx1"/>
-                </a:solidFill>
-                <a:latin typeface="+mn-lt"/>
-                <a:ea typeface="+mn-ea"/>
-                <a:cs typeface="+mn-cs"/>
-              </a:rPr>
-              <a:t> distances were binned for representation only; the</a:t>
-            </a:r>
-          </a:p>
-          <a:p>
-            <a:r>
-              <a:rPr lang="en-US" sz="1200" b="0" i="0" u="none" strike="noStrike" kern="1200" baseline="0" dirty="0" smtClean="0">
-                <a:solidFill>
-                  <a:schemeClr val="tx1"/>
-                </a:solidFill>
-                <a:latin typeface="+mn-lt"/>
-                <a:ea typeface="+mn-ea"/>
-                <a:cs typeface="+mn-cs"/>
-              </a:rPr>
-              <a:t>best fits to the gamma distribution are based on the exact, </a:t>
-            </a:r>
-            <a:r>
-              <a:rPr lang="en-US" sz="1200" b="0" i="0" u="none" strike="noStrike" kern="1200" baseline="0" dirty="0" err="1" smtClean="0">
-                <a:solidFill>
-                  <a:schemeClr val="tx1"/>
-                </a:solidFill>
-                <a:latin typeface="+mn-lt"/>
-                <a:ea typeface="+mn-ea"/>
-                <a:cs typeface="+mn-cs"/>
-              </a:rPr>
-              <a:t>unbinned</a:t>
-            </a:r>
-            <a:r>
-              <a:rPr lang="en-US" sz="1200" b="0" i="0" u="none" strike="noStrike" kern="1200" baseline="0" dirty="0" smtClean="0">
-                <a:solidFill>
-                  <a:schemeClr val="tx1"/>
-                </a:solidFill>
-                <a:latin typeface="+mn-lt"/>
-                <a:ea typeface="+mn-ea"/>
-                <a:cs typeface="+mn-cs"/>
-              </a:rPr>
-              <a:t> distances.</a:t>
-            </a:r>
-          </a:p>
-          <a:p>
-            <a:r>
-              <a:rPr lang="en-US" sz="1200" b="0" i="0" u="none" strike="noStrike" kern="1200" baseline="0" dirty="0" smtClean="0">
-                <a:solidFill>
-                  <a:schemeClr val="tx1"/>
-                </a:solidFill>
-                <a:latin typeface="+mn-lt"/>
-                <a:ea typeface="+mn-ea"/>
-                <a:cs typeface="+mn-cs"/>
-              </a:rPr>
-              <a:t>Figs. 5 and 6 show histograms of all data sets. </a:t>
-            </a:r>
-            <a:r>
-              <a:rPr lang="en-US" sz="1200" b="1" i="0" u="none" strike="noStrike" kern="1200" baseline="0" dirty="0" smtClean="0">
-                <a:solidFill>
-                  <a:schemeClr val="tx1"/>
-                </a:solidFill>
-                <a:latin typeface="+mn-lt"/>
-                <a:ea typeface="+mn-ea"/>
-                <a:cs typeface="+mn-cs"/>
-              </a:rPr>
-              <a:t>(</a:t>
-            </a:r>
-            <a:r>
-              <a:rPr lang="en-US" sz="1200" b="1" i="1" u="none" strike="noStrike" kern="1200" baseline="0" dirty="0" smtClean="0">
-                <a:solidFill>
-                  <a:schemeClr val="tx1"/>
-                </a:solidFill>
-                <a:latin typeface="+mn-lt"/>
-                <a:ea typeface="+mn-ea"/>
-                <a:cs typeface="+mn-cs"/>
-              </a:rPr>
-              <a:t>E</a:t>
-            </a:r>
-            <a:r>
-              <a:rPr lang="en-US" sz="1200" b="1" i="0" u="none" strike="noStrike" kern="1200" baseline="0" dirty="0" smtClean="0">
-                <a:solidFill>
-                  <a:schemeClr val="tx1"/>
-                </a:solidFill>
-                <a:latin typeface="+mn-lt"/>
-                <a:ea typeface="+mn-ea"/>
-                <a:cs typeface="+mn-cs"/>
-              </a:rPr>
-              <a:t>–</a:t>
-            </a:r>
-            <a:r>
-              <a:rPr lang="en-US" sz="1200" b="1" i="1" u="none" strike="noStrike" kern="1200" baseline="0" dirty="0" smtClean="0">
-                <a:solidFill>
-                  <a:schemeClr val="tx1"/>
-                </a:solidFill>
-                <a:latin typeface="+mn-lt"/>
-                <a:ea typeface="+mn-ea"/>
-                <a:cs typeface="+mn-cs"/>
-              </a:rPr>
-              <a:t>G</a:t>
-            </a:r>
-            <a:r>
-              <a:rPr lang="en-US" sz="1200" b="1" i="0" u="none" strike="noStrike" kern="1200" baseline="0" dirty="0" smtClean="0">
-                <a:solidFill>
-                  <a:schemeClr val="tx1"/>
-                </a:solidFill>
-                <a:latin typeface="+mn-lt"/>
-                <a:ea typeface="+mn-ea"/>
-                <a:cs typeface="+mn-cs"/>
-              </a:rPr>
-              <a:t>) Distribution of foci</a:t>
-            </a:r>
-          </a:p>
-          <a:p>
-            <a:r>
-              <a:rPr lang="en-US" sz="1200" b="1" i="0" u="none" strike="noStrike" kern="1200" baseline="0" dirty="0" smtClean="0">
-                <a:solidFill>
-                  <a:schemeClr val="tx1"/>
-                </a:solidFill>
-                <a:latin typeface="+mn-lt"/>
-                <a:ea typeface="+mn-ea"/>
-                <a:cs typeface="+mn-cs"/>
-              </a:rPr>
-              <a:t>along bivalents</a:t>
-            </a:r>
-            <a:r>
-              <a:rPr lang="en-US" sz="1200" b="0" i="0" u="none" strike="noStrike" kern="1200" baseline="0" dirty="0" smtClean="0">
-                <a:solidFill>
-                  <a:schemeClr val="tx1"/>
-                </a:solidFill>
-                <a:latin typeface="+mn-lt"/>
-                <a:ea typeface="+mn-ea"/>
-                <a:cs typeface="+mn-cs"/>
-              </a:rPr>
-              <a:t>. Shown are the cumulative frequencies of foci as a function of</a:t>
-            </a:r>
-          </a:p>
-          <a:p>
-            <a:r>
-              <a:rPr lang="en-US" sz="1200" b="0" i="0" u="none" strike="noStrike" kern="1200" baseline="0" dirty="0" smtClean="0">
-                <a:solidFill>
-                  <a:schemeClr val="tx1"/>
-                </a:solidFill>
-                <a:latin typeface="+mn-lt"/>
-                <a:ea typeface="+mn-ea"/>
-                <a:cs typeface="+mn-cs"/>
-              </a:rPr>
-              <a:t>the distance to the </a:t>
-            </a:r>
-            <a:r>
-              <a:rPr lang="en-US" sz="1200" b="0" i="0" u="none" strike="noStrike" kern="1200" baseline="0" dirty="0" err="1" smtClean="0">
-                <a:solidFill>
-                  <a:schemeClr val="tx1"/>
-                </a:solidFill>
-                <a:latin typeface="+mn-lt"/>
-                <a:ea typeface="+mn-ea"/>
-                <a:cs typeface="+mn-cs"/>
-              </a:rPr>
-              <a:t>centromeric</a:t>
-            </a:r>
-            <a:r>
-              <a:rPr lang="en-US" sz="1200" b="0" i="0" u="none" strike="noStrike" kern="1200" baseline="0" dirty="0" smtClean="0">
-                <a:solidFill>
-                  <a:schemeClr val="tx1"/>
-                </a:solidFill>
-                <a:latin typeface="+mn-lt"/>
-                <a:ea typeface="+mn-ea"/>
-                <a:cs typeface="+mn-cs"/>
-              </a:rPr>
-              <a:t> end of the </a:t>
-            </a:r>
-            <a:r>
-              <a:rPr lang="en-US" sz="1200" b="1" i="0" u="none" strike="noStrike" kern="1200" baseline="0" dirty="0" smtClean="0">
-                <a:solidFill>
-                  <a:schemeClr val="tx1"/>
-                </a:solidFill>
-                <a:latin typeface="+mn-lt"/>
-                <a:ea typeface="+mn-ea"/>
-                <a:cs typeface="+mn-cs"/>
-              </a:rPr>
-              <a:t>SC (wild type) or AE (</a:t>
-            </a:r>
-            <a:r>
-              <a:rPr lang="en-US" sz="1200" b="1" i="1" u="none" strike="noStrike" kern="1200" baseline="0" dirty="0" smtClean="0">
-                <a:solidFill>
-                  <a:schemeClr val="tx1"/>
-                </a:solidFill>
-                <a:latin typeface="+mn-lt"/>
-                <a:ea typeface="+mn-ea"/>
-                <a:cs typeface="+mn-cs"/>
-              </a:rPr>
-              <a:t>Sycp1</a:t>
-            </a:r>
-            <a:r>
-              <a:rPr lang="en-US" sz="1200" b="1" i="0" u="none" strike="noStrike" kern="1200" baseline="0" dirty="0" smtClean="0">
-                <a:solidFill>
-                  <a:schemeClr val="tx1"/>
-                </a:solidFill>
-                <a:latin typeface="+mn-lt"/>
-                <a:ea typeface="+mn-ea"/>
-                <a:cs typeface="+mn-cs"/>
-              </a:rPr>
-              <a:t>/). </a:t>
-            </a:r>
-            <a:r>
-              <a:rPr lang="en-US" sz="1200" b="0" i="0" u="none" strike="noStrike" kern="1200" baseline="0" dirty="0" smtClean="0">
-                <a:solidFill>
-                  <a:schemeClr val="tx1"/>
-                </a:solidFill>
-                <a:latin typeface="+mn-lt"/>
-                <a:ea typeface="+mn-ea"/>
-                <a:cs typeface="+mn-cs"/>
-              </a:rPr>
-              <a:t>The</a:t>
-            </a:r>
-          </a:p>
-          <a:p>
-            <a:r>
-              <a:rPr lang="en-US" sz="1200" b="0" i="0" u="none" strike="noStrike" kern="1200" baseline="0" dirty="0" smtClean="0">
-                <a:solidFill>
-                  <a:schemeClr val="tx1"/>
-                </a:solidFill>
-                <a:latin typeface="+mn-lt"/>
-                <a:ea typeface="+mn-ea"/>
-                <a:cs typeface="+mn-cs"/>
-              </a:rPr>
-              <a:t>distances are expressed as percentage of the length of the SC AE on which the</a:t>
-            </a:r>
-          </a:p>
-          <a:p>
-            <a:r>
-              <a:rPr lang="en-US" sz="1200" b="0" i="0" u="none" strike="noStrike" kern="1200" baseline="0" dirty="0" smtClean="0">
-                <a:solidFill>
-                  <a:schemeClr val="tx1"/>
-                </a:solidFill>
-                <a:latin typeface="+mn-lt"/>
-                <a:ea typeface="+mn-ea"/>
-                <a:cs typeface="+mn-cs"/>
-              </a:rPr>
-              <a:t>focus was located. </a:t>
-            </a:r>
-            <a:r>
-              <a:rPr lang="en-US" sz="1200" b="1" i="0" u="none" strike="noStrike" kern="1200" baseline="0" dirty="0" smtClean="0">
-                <a:solidFill>
-                  <a:schemeClr val="tx1"/>
-                </a:solidFill>
-                <a:latin typeface="+mn-lt"/>
-                <a:ea typeface="+mn-ea"/>
-                <a:cs typeface="+mn-cs"/>
-              </a:rPr>
-              <a:t>The numbers of foci on which the curves are based are</a:t>
-            </a:r>
-          </a:p>
-          <a:p>
-            <a:r>
-              <a:rPr lang="en-US" sz="1200" b="1" i="0" u="none" strike="noStrike" kern="1200" baseline="0" dirty="0" smtClean="0">
-                <a:solidFill>
-                  <a:schemeClr val="tx1"/>
-                </a:solidFill>
-                <a:latin typeface="+mn-lt"/>
-                <a:ea typeface="+mn-ea"/>
-                <a:cs typeface="+mn-cs"/>
-              </a:rPr>
-              <a:t>shown in the upper left corners, and the chromosome numbers are shown in</a:t>
-            </a:r>
-          </a:p>
-          <a:p>
-            <a:r>
-              <a:rPr lang="en-US" sz="1200" b="1" i="0" u="none" strike="noStrike" kern="1200" baseline="0" dirty="0" smtClean="0">
-                <a:solidFill>
-                  <a:schemeClr val="tx1"/>
-                </a:solidFill>
-                <a:latin typeface="+mn-lt"/>
-                <a:ea typeface="+mn-ea"/>
-                <a:cs typeface="+mn-cs"/>
-              </a:rPr>
-              <a:t>the lower right corners of the graphs</a:t>
-            </a:r>
-            <a:r>
-              <a:rPr lang="en-US" sz="1200" b="0" i="0" u="none" strike="noStrike" kern="1200" baseline="0" dirty="0" smtClean="0">
-                <a:solidFill>
-                  <a:schemeClr val="tx1"/>
-                </a:solidFill>
-                <a:latin typeface="+mn-lt"/>
-                <a:ea typeface="+mn-ea"/>
-                <a:cs typeface="+mn-cs"/>
-              </a:rPr>
-              <a:t>. A uniform distribution of foci would</a:t>
-            </a:r>
-          </a:p>
-          <a:p>
-            <a:r>
-              <a:rPr lang="en-US" sz="1200" b="0" i="0" u="none" strike="noStrike" kern="1200" baseline="0" dirty="0" smtClean="0">
-                <a:solidFill>
-                  <a:schemeClr val="tx1"/>
-                </a:solidFill>
-                <a:latin typeface="+mn-lt"/>
-                <a:ea typeface="+mn-ea"/>
-                <a:cs typeface="+mn-cs"/>
-              </a:rPr>
-              <a:t>yield a straight line from the lower left to the upper right corner of the graph.</a:t>
-            </a:r>
-          </a:p>
-          <a:p>
-            <a:r>
-              <a:rPr lang="en-US" sz="1200" b="0" i="0" u="none" strike="noStrike" kern="1200" baseline="0" dirty="0" smtClean="0">
-                <a:solidFill>
-                  <a:schemeClr val="tx1"/>
-                </a:solidFill>
-                <a:latin typeface="+mn-lt"/>
-                <a:ea typeface="+mn-ea"/>
-                <a:cs typeface="+mn-cs"/>
-              </a:rPr>
-              <a:t>M, male; F, female; </a:t>
-            </a:r>
-            <a:r>
-              <a:rPr lang="en-US" sz="1200" b="0" i="0" u="none" strike="noStrike" kern="1200" baseline="0" dirty="0" err="1" smtClean="0">
-                <a:solidFill>
-                  <a:schemeClr val="tx1"/>
-                </a:solidFill>
-                <a:latin typeface="+mn-lt"/>
-                <a:ea typeface="+mn-ea"/>
-                <a:cs typeface="+mn-cs"/>
-              </a:rPr>
-              <a:t>Wt</a:t>
-            </a:r>
-            <a:r>
-              <a:rPr lang="en-US" sz="1200" b="0" i="0" u="none" strike="noStrike" kern="1200" baseline="0" dirty="0" smtClean="0">
-                <a:solidFill>
-                  <a:schemeClr val="tx1"/>
-                </a:solidFill>
-                <a:latin typeface="+mn-lt"/>
-                <a:ea typeface="+mn-ea"/>
-                <a:cs typeface="+mn-cs"/>
-              </a:rPr>
-              <a:t>, wild type; , </a:t>
-            </a:r>
-            <a:r>
-              <a:rPr lang="en-US" sz="1200" b="0" i="1" u="none" strike="noStrike" kern="1200" baseline="0" dirty="0" smtClean="0">
-                <a:solidFill>
-                  <a:schemeClr val="tx1"/>
-                </a:solidFill>
-                <a:latin typeface="+mn-lt"/>
-                <a:ea typeface="+mn-ea"/>
-                <a:cs typeface="+mn-cs"/>
-              </a:rPr>
-              <a:t>Sycp1</a:t>
-            </a:r>
-            <a:r>
-              <a:rPr lang="en-US" sz="1200" b="0" i="0" u="none" strike="noStrike" kern="1200" baseline="0" dirty="0" smtClean="0">
-                <a:solidFill>
-                  <a:schemeClr val="tx1"/>
-                </a:solidFill>
-                <a:latin typeface="+mn-lt"/>
-                <a:ea typeface="+mn-ea"/>
-                <a:cs typeface="+mn-cs"/>
-              </a:rPr>
-              <a:t>/.</a:t>
-            </a:r>
+            <a:endParaRPr lang="en-US" dirty="0" smtClean="0"/>
+          </a:p>
+          <a:p>
+            <a:r>
+              <a:rPr lang="en-US" dirty="0" smtClean="0"/>
+              <a:t>For some reasons the patterns change – maybe the first one included</a:t>
+            </a:r>
+            <a:r>
+              <a:rPr lang="en-US" baseline="0" dirty="0" smtClean="0"/>
+              <a:t> more than 1CO</a:t>
+            </a:r>
+            <a:endParaRPr lang="en-US" dirty="0" smtClean="0"/>
+          </a:p>
+          <a:p>
+            <a:endParaRPr lang="en-US" dirty="0" smtClean="0"/>
+          </a:p>
+          <a:p>
             <a:endParaRPr lang="en-US" dirty="0"/>
           </a:p>
         </p:txBody>
@@ -1653,7 +1060,7 @@
     </p:spTree>
     <p:extLst>
       <p:ext uri="{BB962C8B-B14F-4D97-AF65-F5344CB8AC3E}">
-        <p14:creationId xmlns:p14="http://schemas.microsoft.com/office/powerpoint/2010/main" val="2812527262"/>
+        <p14:creationId xmlns:p14="http://schemas.microsoft.com/office/powerpoint/2010/main" val="3369798618"/>
       </p:ext>
     </p:extLst>
   </p:cSld>
@@ -1709,63 +1116,646 @@
           <a:p>
             <a:r>
               <a:rPr lang="en-US" dirty="0" smtClean="0"/>
+              <a:t>Interference / gamma curves are on the top --- don’t think any are female?</a:t>
+            </a:r>
+          </a:p>
+          <a:p>
+            <a:endParaRPr lang="en-US" dirty="0" smtClean="0"/>
+          </a:p>
+          <a:p>
+            <a:r>
+              <a:rPr lang="en-US" dirty="0" smtClean="0"/>
+              <a:t>(Should I try to remake these cumulative foci plots?)  --- smaller</a:t>
+            </a:r>
+            <a:r>
+              <a:rPr lang="en-US" baseline="0" dirty="0" smtClean="0"/>
+              <a:t> square </a:t>
+            </a:r>
+            <a:r>
+              <a:rPr lang="en-US" dirty="0" smtClean="0"/>
+              <a:t>curve plots are there are all</a:t>
+            </a:r>
+            <a:r>
+              <a:rPr lang="en-US" baseline="0" dirty="0" smtClean="0"/>
+              <a:t> </a:t>
+            </a:r>
+            <a:r>
+              <a:rPr lang="en-US" b="1" baseline="0" dirty="0" smtClean="0"/>
+              <a:t>distance to cent</a:t>
+            </a:r>
+            <a:r>
+              <a:rPr lang="en-US" b="0" baseline="0" dirty="0" smtClean="0"/>
+              <a:t> (do these pool foci from the same </a:t>
+            </a:r>
+            <a:r>
+              <a:rPr lang="en-US" b="0" baseline="0" dirty="0" err="1" smtClean="0"/>
+              <a:t>biv</a:t>
+            </a:r>
+            <a:r>
+              <a:rPr lang="en-US" b="0" baseline="0" dirty="0" smtClean="0"/>
+              <a:t>?!)</a:t>
+            </a:r>
+            <a:endParaRPr lang="en-US" b="0" dirty="0" smtClean="0"/>
+          </a:p>
+          <a:p>
+            <a:endParaRPr lang="en-US" dirty="0" smtClean="0"/>
+          </a:p>
+          <a:p>
+            <a:r>
+              <a:rPr lang="en-US" sz="1200" b="1" i="0" u="none" strike="noStrike" kern="1200" baseline="0" dirty="0" smtClean="0">
+                <a:solidFill>
+                  <a:schemeClr val="tx1"/>
+                </a:solidFill>
+                <a:latin typeface="+mn-lt"/>
+                <a:ea typeface="+mn-ea"/>
+                <a:cs typeface="+mn-cs"/>
+              </a:rPr>
+              <a:t>Fig. 1. </a:t>
+            </a:r>
+            <a:r>
+              <a:rPr lang="en-US" sz="1200" b="0" i="0" u="none" strike="noStrike" kern="1200" baseline="0" dirty="0" smtClean="0">
+                <a:solidFill>
+                  <a:schemeClr val="tx1"/>
+                </a:solidFill>
+                <a:latin typeface="+mn-lt"/>
+                <a:ea typeface="+mn-ea"/>
+                <a:cs typeface="+mn-cs"/>
+              </a:rPr>
+              <a:t>Analysis of foci along bivalents. (</a:t>
+            </a:r>
+            <a:r>
+              <a:rPr lang="en-US" sz="1200" b="0" i="1" u="none" strike="noStrike" kern="1200" baseline="0" dirty="0" smtClean="0">
+                <a:solidFill>
+                  <a:schemeClr val="tx1"/>
+                </a:solidFill>
+                <a:latin typeface="+mn-lt"/>
+                <a:ea typeface="+mn-ea"/>
+                <a:cs typeface="+mn-cs"/>
+              </a:rPr>
+              <a:t>A</a:t>
+            </a:r>
+            <a:r>
+              <a:rPr lang="en-US" sz="1200" b="0" i="0" u="none" strike="noStrike" kern="1200" baseline="0" dirty="0" smtClean="0">
+                <a:solidFill>
+                  <a:schemeClr val="tx1"/>
+                </a:solidFill>
+                <a:latin typeface="+mn-lt"/>
+                <a:ea typeface="+mn-ea"/>
+                <a:cs typeface="+mn-cs"/>
+              </a:rPr>
+              <a:t>) Shape of gamma distributions for</a:t>
+            </a:r>
+          </a:p>
+          <a:p>
+            <a:r>
+              <a:rPr lang="en-US" sz="1200" b="0" i="0" u="none" strike="noStrike" kern="1200" baseline="0" dirty="0" smtClean="0">
+                <a:solidFill>
+                  <a:schemeClr val="tx1"/>
+                </a:solidFill>
+                <a:latin typeface="+mn-lt"/>
+                <a:ea typeface="+mn-ea"/>
+                <a:cs typeface="+mn-cs"/>
+              </a:rPr>
+              <a:t>different  values. The average </a:t>
+            </a:r>
+            <a:r>
+              <a:rPr lang="en-US" sz="1200" b="0" i="0" u="none" strike="noStrike" kern="1200" baseline="0" dirty="0" err="1" smtClean="0">
+                <a:solidFill>
+                  <a:schemeClr val="tx1"/>
+                </a:solidFill>
+                <a:latin typeface="+mn-lt"/>
+                <a:ea typeface="+mn-ea"/>
+                <a:cs typeface="+mn-cs"/>
+              </a:rPr>
+              <a:t>interfocus</a:t>
+            </a:r>
+            <a:r>
+              <a:rPr lang="en-US" sz="1200" b="0" i="0" u="none" strike="noStrike" kern="1200" baseline="0" dirty="0" smtClean="0">
+                <a:solidFill>
+                  <a:schemeClr val="tx1"/>
+                </a:solidFill>
+                <a:latin typeface="+mn-lt"/>
+                <a:ea typeface="+mn-ea"/>
+                <a:cs typeface="+mn-cs"/>
+              </a:rPr>
+              <a:t> distance equals 10 for all distributions</a:t>
+            </a:r>
+          </a:p>
+          <a:p>
+            <a:r>
+              <a:rPr lang="en-US" sz="1200" b="0" i="0" u="none" strike="noStrike" kern="1200" baseline="0" dirty="0" smtClean="0">
+                <a:solidFill>
+                  <a:schemeClr val="tx1"/>
+                </a:solidFill>
+                <a:latin typeface="+mn-lt"/>
+                <a:ea typeface="+mn-ea"/>
+                <a:cs typeface="+mn-cs"/>
+              </a:rPr>
+              <a:t>shown. As  increases, the very short and very long distances become</a:t>
+            </a:r>
+          </a:p>
+          <a:p>
+            <a:r>
+              <a:rPr lang="en-US" sz="1200" b="0" i="0" u="none" strike="noStrike" kern="1200" baseline="0" dirty="0" smtClean="0">
+                <a:solidFill>
+                  <a:schemeClr val="tx1"/>
+                </a:solidFill>
+                <a:latin typeface="+mn-lt"/>
+                <a:ea typeface="+mn-ea"/>
+                <a:cs typeface="+mn-cs"/>
+              </a:rPr>
+              <a:t>sparser, and the distributions become narrower and more symmetrical. (</a:t>
+            </a:r>
+            <a:r>
+              <a:rPr lang="en-US" sz="1200" b="0" i="1" u="none" strike="noStrike" kern="1200" baseline="0" dirty="0" smtClean="0">
+                <a:solidFill>
+                  <a:schemeClr val="tx1"/>
+                </a:solidFill>
+                <a:latin typeface="+mn-lt"/>
+                <a:ea typeface="+mn-ea"/>
+                <a:cs typeface="+mn-cs"/>
+              </a:rPr>
+              <a:t>B</a:t>
+            </a:r>
+            <a:r>
+              <a:rPr lang="en-US" sz="1200" b="0" i="0" u="none" strike="noStrike" kern="1200" baseline="0" dirty="0" smtClean="0">
+                <a:solidFill>
+                  <a:schemeClr val="tx1"/>
+                </a:solidFill>
+                <a:latin typeface="+mn-lt"/>
+                <a:ea typeface="+mn-ea"/>
+                <a:cs typeface="+mn-cs"/>
+              </a:rPr>
+              <a:t>–</a:t>
+            </a:r>
+            <a:r>
+              <a:rPr lang="en-US" sz="1200" b="0" i="1" u="none" strike="noStrike" kern="1200" baseline="0" dirty="0" smtClean="0">
+                <a:solidFill>
+                  <a:schemeClr val="tx1"/>
+                </a:solidFill>
+                <a:latin typeface="+mn-lt"/>
+                <a:ea typeface="+mn-ea"/>
+                <a:cs typeface="+mn-cs"/>
+              </a:rPr>
+              <a:t>D</a:t>
+            </a:r>
+            <a:r>
+              <a:rPr lang="en-US" sz="1200" b="0" i="0" u="none" strike="noStrike" kern="1200" baseline="0" dirty="0" smtClean="0">
+                <a:solidFill>
+                  <a:schemeClr val="tx1"/>
+                </a:solidFill>
+                <a:latin typeface="+mn-lt"/>
+                <a:ea typeface="+mn-ea"/>
+                <a:cs typeface="+mn-cs"/>
+              </a:rPr>
+              <a:t>)</a:t>
+            </a:r>
+          </a:p>
+          <a:p>
+            <a:r>
+              <a:rPr lang="en-US" sz="1200" b="0" i="0" u="none" strike="noStrike" kern="1200" baseline="0" dirty="0" smtClean="0">
+                <a:solidFill>
+                  <a:schemeClr val="tx1"/>
+                </a:solidFill>
+                <a:latin typeface="+mn-lt"/>
+                <a:ea typeface="+mn-ea"/>
+                <a:cs typeface="+mn-cs"/>
+              </a:rPr>
+              <a:t>Examples of histograms of observed </a:t>
+            </a:r>
+            <a:r>
+              <a:rPr lang="en-US" sz="1200" b="0" i="0" u="none" strike="noStrike" kern="1200" baseline="0" dirty="0" err="1" smtClean="0">
+                <a:solidFill>
+                  <a:schemeClr val="tx1"/>
+                </a:solidFill>
+                <a:latin typeface="+mn-lt"/>
+                <a:ea typeface="+mn-ea"/>
+                <a:cs typeface="+mn-cs"/>
+              </a:rPr>
+              <a:t>interfocus</a:t>
+            </a:r>
+            <a:r>
+              <a:rPr lang="en-US" sz="1200" b="0" i="0" u="none" strike="noStrike" kern="1200" baseline="0" dirty="0" smtClean="0">
+                <a:solidFill>
+                  <a:schemeClr val="tx1"/>
+                </a:solidFill>
+                <a:latin typeface="+mn-lt"/>
+                <a:ea typeface="+mn-ea"/>
+                <a:cs typeface="+mn-cs"/>
+              </a:rPr>
+              <a:t> distances in spermatocytes</a:t>
+            </a:r>
+          </a:p>
+          <a:p>
+            <a:r>
+              <a:rPr lang="en-US" sz="1200" b="0" i="0" u="none" strike="noStrike" kern="1200" baseline="0" dirty="0" smtClean="0">
+                <a:solidFill>
+                  <a:schemeClr val="tx1"/>
+                </a:solidFill>
+                <a:latin typeface="+mn-lt"/>
+                <a:ea typeface="+mn-ea"/>
+                <a:cs typeface="+mn-cs"/>
+              </a:rPr>
+              <a:t>(black bars), the best fit of the observed distances to the gamma distribution  (red curves), the  value for which the best fit was obtained (ˆ ), and the</a:t>
+            </a:r>
+          </a:p>
+          <a:p>
+            <a:r>
+              <a:rPr lang="en-US" sz="1200" b="0" i="0" u="none" strike="noStrike" kern="1200" baseline="0" dirty="0" smtClean="0">
+                <a:solidFill>
+                  <a:schemeClr val="tx1"/>
+                </a:solidFill>
+                <a:latin typeface="+mn-lt"/>
+                <a:ea typeface="+mn-ea"/>
+                <a:cs typeface="+mn-cs"/>
+              </a:rPr>
+              <a:t>distributions expected if there were no interference (i.e., 1; blue curves).</a:t>
+            </a:r>
+          </a:p>
+          <a:p>
+            <a:r>
+              <a:rPr lang="en-US" sz="1200" b="0" i="0" u="none" strike="noStrike" kern="1200" baseline="0" dirty="0" smtClean="0">
+                <a:solidFill>
+                  <a:schemeClr val="tx1"/>
+                </a:solidFill>
+                <a:latin typeface="+mn-lt"/>
+                <a:ea typeface="+mn-ea"/>
+                <a:cs typeface="+mn-cs"/>
+              </a:rPr>
+              <a:t>The observed </a:t>
+            </a:r>
+            <a:r>
+              <a:rPr lang="en-US" sz="1200" b="0" i="0" u="none" strike="noStrike" kern="1200" baseline="0" dirty="0" err="1" smtClean="0">
+                <a:solidFill>
+                  <a:schemeClr val="tx1"/>
+                </a:solidFill>
+                <a:latin typeface="+mn-lt"/>
+                <a:ea typeface="+mn-ea"/>
+                <a:cs typeface="+mn-cs"/>
+              </a:rPr>
+              <a:t>interfocus</a:t>
+            </a:r>
+            <a:r>
+              <a:rPr lang="en-US" sz="1200" b="0" i="0" u="none" strike="noStrike" kern="1200" baseline="0" dirty="0" smtClean="0">
+                <a:solidFill>
+                  <a:schemeClr val="tx1"/>
+                </a:solidFill>
+                <a:latin typeface="+mn-lt"/>
+                <a:ea typeface="+mn-ea"/>
+                <a:cs typeface="+mn-cs"/>
+              </a:rPr>
+              <a:t> distances were binned for representation only; the</a:t>
+            </a:r>
+          </a:p>
+          <a:p>
+            <a:r>
+              <a:rPr lang="en-US" sz="1200" b="0" i="0" u="none" strike="noStrike" kern="1200" baseline="0" dirty="0" smtClean="0">
+                <a:solidFill>
+                  <a:schemeClr val="tx1"/>
+                </a:solidFill>
+                <a:latin typeface="+mn-lt"/>
+                <a:ea typeface="+mn-ea"/>
+                <a:cs typeface="+mn-cs"/>
+              </a:rPr>
+              <a:t>best fits to the gamma distribution are based on the exact, </a:t>
+            </a:r>
+            <a:r>
+              <a:rPr lang="en-US" sz="1200" b="0" i="0" u="none" strike="noStrike" kern="1200" baseline="0" dirty="0" err="1" smtClean="0">
+                <a:solidFill>
+                  <a:schemeClr val="tx1"/>
+                </a:solidFill>
+                <a:latin typeface="+mn-lt"/>
+                <a:ea typeface="+mn-ea"/>
+                <a:cs typeface="+mn-cs"/>
+              </a:rPr>
+              <a:t>unbinned</a:t>
+            </a:r>
+            <a:r>
+              <a:rPr lang="en-US" sz="1200" b="0" i="0" u="none" strike="noStrike" kern="1200" baseline="0" dirty="0" smtClean="0">
+                <a:solidFill>
+                  <a:schemeClr val="tx1"/>
+                </a:solidFill>
+                <a:latin typeface="+mn-lt"/>
+                <a:ea typeface="+mn-ea"/>
+                <a:cs typeface="+mn-cs"/>
+              </a:rPr>
+              <a:t> distances.</a:t>
+            </a:r>
+          </a:p>
+          <a:p>
+            <a:r>
+              <a:rPr lang="en-US" sz="1200" b="0" i="0" u="none" strike="noStrike" kern="1200" baseline="0" dirty="0" smtClean="0">
+                <a:solidFill>
+                  <a:schemeClr val="tx1"/>
+                </a:solidFill>
+                <a:latin typeface="+mn-lt"/>
+                <a:ea typeface="+mn-ea"/>
+                <a:cs typeface="+mn-cs"/>
+              </a:rPr>
+              <a:t>Figs. 5 and 6 show histograms of all data sets. </a:t>
+            </a:r>
+            <a:r>
+              <a:rPr lang="en-US" sz="1200" b="1" i="0" u="none" strike="noStrike" kern="1200" baseline="0" dirty="0" smtClean="0">
+                <a:solidFill>
+                  <a:schemeClr val="tx1"/>
+                </a:solidFill>
+                <a:latin typeface="+mn-lt"/>
+                <a:ea typeface="+mn-ea"/>
+                <a:cs typeface="+mn-cs"/>
+              </a:rPr>
+              <a:t>(</a:t>
+            </a:r>
+            <a:r>
+              <a:rPr lang="en-US" sz="1200" b="1" i="1" u="none" strike="noStrike" kern="1200" baseline="0" dirty="0" smtClean="0">
+                <a:solidFill>
+                  <a:schemeClr val="tx1"/>
+                </a:solidFill>
+                <a:latin typeface="+mn-lt"/>
+                <a:ea typeface="+mn-ea"/>
+                <a:cs typeface="+mn-cs"/>
+              </a:rPr>
+              <a:t>E</a:t>
+            </a:r>
+            <a:r>
+              <a:rPr lang="en-US" sz="1200" b="1" i="0" u="none" strike="noStrike" kern="1200" baseline="0" dirty="0" smtClean="0">
+                <a:solidFill>
+                  <a:schemeClr val="tx1"/>
+                </a:solidFill>
+                <a:latin typeface="+mn-lt"/>
+                <a:ea typeface="+mn-ea"/>
+                <a:cs typeface="+mn-cs"/>
+              </a:rPr>
+              <a:t>–</a:t>
+            </a:r>
+            <a:r>
+              <a:rPr lang="en-US" sz="1200" b="1" i="1" u="none" strike="noStrike" kern="1200" baseline="0" dirty="0" smtClean="0">
+                <a:solidFill>
+                  <a:schemeClr val="tx1"/>
+                </a:solidFill>
+                <a:latin typeface="+mn-lt"/>
+                <a:ea typeface="+mn-ea"/>
+                <a:cs typeface="+mn-cs"/>
+              </a:rPr>
+              <a:t>G</a:t>
+            </a:r>
+            <a:r>
+              <a:rPr lang="en-US" sz="1200" b="1" i="0" u="none" strike="noStrike" kern="1200" baseline="0" dirty="0" smtClean="0">
+                <a:solidFill>
+                  <a:schemeClr val="tx1"/>
+                </a:solidFill>
+                <a:latin typeface="+mn-lt"/>
+                <a:ea typeface="+mn-ea"/>
+                <a:cs typeface="+mn-cs"/>
+              </a:rPr>
+              <a:t>) Distribution of foci</a:t>
+            </a:r>
+          </a:p>
+          <a:p>
+            <a:r>
+              <a:rPr lang="en-US" sz="1200" b="1" i="0" u="none" strike="noStrike" kern="1200" baseline="0" dirty="0" smtClean="0">
+                <a:solidFill>
+                  <a:schemeClr val="tx1"/>
+                </a:solidFill>
+                <a:latin typeface="+mn-lt"/>
+                <a:ea typeface="+mn-ea"/>
+                <a:cs typeface="+mn-cs"/>
+              </a:rPr>
+              <a:t>along bivalents</a:t>
+            </a:r>
+            <a:r>
+              <a:rPr lang="en-US" sz="1200" b="0" i="0" u="none" strike="noStrike" kern="1200" baseline="0" dirty="0" smtClean="0">
+                <a:solidFill>
+                  <a:schemeClr val="tx1"/>
+                </a:solidFill>
+                <a:latin typeface="+mn-lt"/>
+                <a:ea typeface="+mn-ea"/>
+                <a:cs typeface="+mn-cs"/>
+              </a:rPr>
+              <a:t>. Shown are the cumulative frequencies of foci as a function of</a:t>
+            </a:r>
+          </a:p>
+          <a:p>
+            <a:r>
+              <a:rPr lang="en-US" sz="1200" b="0" i="0" u="none" strike="noStrike" kern="1200" baseline="0" dirty="0" smtClean="0">
+                <a:solidFill>
+                  <a:schemeClr val="tx1"/>
+                </a:solidFill>
+                <a:latin typeface="+mn-lt"/>
+                <a:ea typeface="+mn-ea"/>
+                <a:cs typeface="+mn-cs"/>
+              </a:rPr>
+              <a:t>the distance to the </a:t>
+            </a:r>
+            <a:r>
+              <a:rPr lang="en-US" sz="1200" b="0" i="0" u="none" strike="noStrike" kern="1200" baseline="0" dirty="0" err="1" smtClean="0">
+                <a:solidFill>
+                  <a:schemeClr val="tx1"/>
+                </a:solidFill>
+                <a:latin typeface="+mn-lt"/>
+                <a:ea typeface="+mn-ea"/>
+                <a:cs typeface="+mn-cs"/>
+              </a:rPr>
+              <a:t>centromeric</a:t>
+            </a:r>
+            <a:r>
+              <a:rPr lang="en-US" sz="1200" b="0" i="0" u="none" strike="noStrike" kern="1200" baseline="0" dirty="0" smtClean="0">
+                <a:solidFill>
+                  <a:schemeClr val="tx1"/>
+                </a:solidFill>
+                <a:latin typeface="+mn-lt"/>
+                <a:ea typeface="+mn-ea"/>
+                <a:cs typeface="+mn-cs"/>
+              </a:rPr>
+              <a:t> end of the </a:t>
+            </a:r>
+            <a:r>
+              <a:rPr lang="en-US" sz="1200" b="1" i="0" u="none" strike="noStrike" kern="1200" baseline="0" dirty="0" smtClean="0">
+                <a:solidFill>
+                  <a:schemeClr val="tx1"/>
+                </a:solidFill>
+                <a:latin typeface="+mn-lt"/>
+                <a:ea typeface="+mn-ea"/>
+                <a:cs typeface="+mn-cs"/>
+              </a:rPr>
+              <a:t>SC (wild type) or AE (</a:t>
+            </a:r>
+            <a:r>
+              <a:rPr lang="en-US" sz="1200" b="1" i="1" u="none" strike="noStrike" kern="1200" baseline="0" dirty="0" smtClean="0">
+                <a:solidFill>
+                  <a:schemeClr val="tx1"/>
+                </a:solidFill>
+                <a:latin typeface="+mn-lt"/>
+                <a:ea typeface="+mn-ea"/>
+                <a:cs typeface="+mn-cs"/>
+              </a:rPr>
+              <a:t>Sycp1</a:t>
+            </a:r>
+            <a:r>
+              <a:rPr lang="en-US" sz="1200" b="1" i="0" u="none" strike="noStrike" kern="1200" baseline="0" dirty="0" smtClean="0">
+                <a:solidFill>
+                  <a:schemeClr val="tx1"/>
+                </a:solidFill>
+                <a:latin typeface="+mn-lt"/>
+                <a:ea typeface="+mn-ea"/>
+                <a:cs typeface="+mn-cs"/>
+              </a:rPr>
+              <a:t>/). </a:t>
+            </a:r>
+            <a:r>
+              <a:rPr lang="en-US" sz="1200" b="0" i="0" u="none" strike="noStrike" kern="1200" baseline="0" dirty="0" smtClean="0">
+                <a:solidFill>
+                  <a:schemeClr val="tx1"/>
+                </a:solidFill>
+                <a:latin typeface="+mn-lt"/>
+                <a:ea typeface="+mn-ea"/>
+                <a:cs typeface="+mn-cs"/>
+              </a:rPr>
               <a:t>The</a:t>
             </a:r>
-            <a:r>
-              <a:rPr lang="en-US" baseline="0" dirty="0" smtClean="0"/>
-              <a:t> overall narrative I’m trying to weave – more variance in females</a:t>
-            </a:r>
-          </a:p>
-          <a:p>
-            <a:r>
-              <a:rPr lang="en-US" baseline="0" dirty="0" smtClean="0"/>
-              <a:t>-Between cells (MLH1 counts)</a:t>
-            </a:r>
-          </a:p>
-          <a:p>
-            <a:r>
-              <a:rPr lang="en-US" baseline="0" dirty="0" smtClean="0"/>
-              <a:t>- Uniform spacing (the 1CO position is not regulated)  (F1 variance is probably larger (F1nrm))</a:t>
-            </a:r>
-          </a:p>
-          <a:p>
-            <a:r>
-              <a:rPr lang="en-US" baseline="0" dirty="0" smtClean="0"/>
-              <a:t>- IFD spacing / interference strength</a:t>
-            </a:r>
-          </a:p>
-          <a:p>
-            <a:endParaRPr lang="en-US" dirty="0" smtClean="0"/>
-          </a:p>
-          <a:p>
-            <a:r>
-              <a:rPr lang="en-US" dirty="0" smtClean="0"/>
-              <a:t>- Lack of distinction between</a:t>
-            </a:r>
-            <a:r>
-              <a:rPr lang="en-US" baseline="0" dirty="0" smtClean="0"/>
-              <a:t> 1CO and 2CO lengths</a:t>
-            </a:r>
-            <a:endParaRPr lang="en-US" dirty="0" smtClean="0"/>
-          </a:p>
-          <a:p>
-            <a:endParaRPr lang="en-US" dirty="0" smtClean="0"/>
-          </a:p>
-          <a:p>
-            <a:r>
-              <a:rPr lang="en-US" dirty="0" smtClean="0"/>
-              <a:t>(longer</a:t>
-            </a:r>
-            <a:r>
-              <a:rPr lang="en-US" baseline="0" dirty="0" smtClean="0"/>
-              <a:t> SC lengths (variance in SC length / I’m not sure this makes sense)</a:t>
-            </a:r>
-            <a:r>
-              <a:rPr lang="en-US" dirty="0" smtClean="0"/>
-              <a:t>)</a:t>
-            </a:r>
-          </a:p>
-          <a:p>
+          </a:p>
+          <a:p>
+            <a:r>
+              <a:rPr lang="en-US" sz="1200" b="0" i="0" u="none" strike="noStrike" kern="1200" baseline="0" dirty="0" smtClean="0">
+                <a:solidFill>
+                  <a:schemeClr val="tx1"/>
+                </a:solidFill>
+                <a:latin typeface="+mn-lt"/>
+                <a:ea typeface="+mn-ea"/>
+                <a:cs typeface="+mn-cs"/>
+              </a:rPr>
+              <a:t>distances are expressed as percentage of the length of the SC AE on which the</a:t>
+            </a:r>
+          </a:p>
+          <a:p>
+            <a:r>
+              <a:rPr lang="en-US" sz="1200" b="0" i="0" u="none" strike="noStrike" kern="1200" baseline="0" dirty="0" smtClean="0">
+                <a:solidFill>
+                  <a:schemeClr val="tx1"/>
+                </a:solidFill>
+                <a:latin typeface="+mn-lt"/>
+                <a:ea typeface="+mn-ea"/>
+                <a:cs typeface="+mn-cs"/>
+              </a:rPr>
+              <a:t>focus was located. </a:t>
+            </a:r>
+            <a:r>
+              <a:rPr lang="en-US" sz="1200" b="1" i="0" u="none" strike="noStrike" kern="1200" baseline="0" dirty="0" smtClean="0">
+                <a:solidFill>
+                  <a:schemeClr val="tx1"/>
+                </a:solidFill>
+                <a:latin typeface="+mn-lt"/>
+                <a:ea typeface="+mn-ea"/>
+                <a:cs typeface="+mn-cs"/>
+              </a:rPr>
+              <a:t>The numbers of foci on which the curves are based are</a:t>
+            </a:r>
+          </a:p>
+          <a:p>
+            <a:r>
+              <a:rPr lang="en-US" sz="1200" b="1" i="0" u="none" strike="noStrike" kern="1200" baseline="0" dirty="0" smtClean="0">
+                <a:solidFill>
+                  <a:schemeClr val="tx1"/>
+                </a:solidFill>
+                <a:latin typeface="+mn-lt"/>
+                <a:ea typeface="+mn-ea"/>
+                <a:cs typeface="+mn-cs"/>
+              </a:rPr>
+              <a:t>shown in the upper left corners, and the chromosome numbers are shown in</a:t>
+            </a:r>
+          </a:p>
+          <a:p>
+            <a:r>
+              <a:rPr lang="en-US" sz="1200" b="1" i="0" u="none" strike="noStrike" kern="1200" baseline="0" dirty="0" smtClean="0">
+                <a:solidFill>
+                  <a:schemeClr val="tx1"/>
+                </a:solidFill>
+                <a:latin typeface="+mn-lt"/>
+                <a:ea typeface="+mn-ea"/>
+                <a:cs typeface="+mn-cs"/>
+              </a:rPr>
+              <a:t>the lower right corners of the graphs</a:t>
+            </a:r>
+            <a:r>
+              <a:rPr lang="en-US" sz="1200" b="0" i="0" u="none" strike="noStrike" kern="1200" baseline="0" dirty="0" smtClean="0">
+                <a:solidFill>
+                  <a:schemeClr val="tx1"/>
+                </a:solidFill>
+                <a:latin typeface="+mn-lt"/>
+                <a:ea typeface="+mn-ea"/>
+                <a:cs typeface="+mn-cs"/>
+              </a:rPr>
+              <a:t>. A uniform distribution of foci would</a:t>
+            </a:r>
+          </a:p>
+          <a:p>
+            <a:r>
+              <a:rPr lang="en-US" sz="1200" b="0" i="0" u="none" strike="noStrike" kern="1200" baseline="0" dirty="0" smtClean="0">
+                <a:solidFill>
+                  <a:schemeClr val="tx1"/>
+                </a:solidFill>
+                <a:latin typeface="+mn-lt"/>
+                <a:ea typeface="+mn-ea"/>
+                <a:cs typeface="+mn-cs"/>
+              </a:rPr>
+              <a:t>yield a straight line from the lower left to the upper right corner of the graph.</a:t>
+            </a:r>
+          </a:p>
+          <a:p>
+            <a:r>
+              <a:rPr lang="en-US" sz="1200" b="0" i="0" u="none" strike="noStrike" kern="1200" baseline="0" dirty="0" smtClean="0">
+                <a:solidFill>
+                  <a:schemeClr val="tx1"/>
+                </a:solidFill>
+                <a:latin typeface="+mn-lt"/>
+                <a:ea typeface="+mn-ea"/>
+                <a:cs typeface="+mn-cs"/>
+              </a:rPr>
+              <a:t>M, male; F, female; </a:t>
+            </a:r>
+            <a:r>
+              <a:rPr lang="en-US" sz="1200" b="0" i="0" u="none" strike="noStrike" kern="1200" baseline="0" dirty="0" err="1" smtClean="0">
+                <a:solidFill>
+                  <a:schemeClr val="tx1"/>
+                </a:solidFill>
+                <a:latin typeface="+mn-lt"/>
+                <a:ea typeface="+mn-ea"/>
+                <a:cs typeface="+mn-cs"/>
+              </a:rPr>
+              <a:t>Wt</a:t>
+            </a:r>
+            <a:r>
+              <a:rPr lang="en-US" sz="1200" b="0" i="0" u="none" strike="noStrike" kern="1200" baseline="0" dirty="0" smtClean="0">
+                <a:solidFill>
+                  <a:schemeClr val="tx1"/>
+                </a:solidFill>
+                <a:latin typeface="+mn-lt"/>
+                <a:ea typeface="+mn-ea"/>
+                <a:cs typeface="+mn-cs"/>
+              </a:rPr>
+              <a:t>, wild type; , </a:t>
+            </a:r>
+            <a:r>
+              <a:rPr lang="en-US" sz="1200" b="0" i="1" u="none" strike="noStrike" kern="1200" baseline="0" dirty="0" smtClean="0">
+                <a:solidFill>
+                  <a:schemeClr val="tx1"/>
+                </a:solidFill>
+                <a:latin typeface="+mn-lt"/>
+                <a:ea typeface="+mn-ea"/>
+                <a:cs typeface="+mn-cs"/>
+              </a:rPr>
+              <a:t>Sycp1</a:t>
+            </a:r>
+            <a:r>
+              <a:rPr lang="en-US" sz="1200" b="0" i="0" u="none" strike="noStrike" kern="1200" baseline="0" dirty="0" smtClean="0">
+                <a:solidFill>
+                  <a:schemeClr val="tx1"/>
+                </a:solidFill>
+                <a:latin typeface="+mn-lt"/>
+                <a:ea typeface="+mn-ea"/>
+                <a:cs typeface="+mn-cs"/>
+              </a:rPr>
+              <a:t>/.</a:t>
+            </a:r>
             <a:endParaRPr lang="en-US" dirty="0"/>
           </a:p>
         </p:txBody>
@@ -1796,7 +1786,7 @@
     </p:spTree>
     <p:extLst>
       <p:ext uri="{BB962C8B-B14F-4D97-AF65-F5344CB8AC3E}">
-        <p14:creationId xmlns:p14="http://schemas.microsoft.com/office/powerpoint/2010/main" val="3243097393"/>
+        <p14:creationId xmlns:p14="http://schemas.microsoft.com/office/powerpoint/2010/main" val="2812527262"/>
       </p:ext>
     </p:extLst>
   </p:cSld>
@@ -1852,79 +1842,63 @@
           <a:p>
             <a:r>
               <a:rPr lang="en-US" dirty="0" smtClean="0"/>
-              <a:t>(motivation)</a:t>
-            </a:r>
-          </a:p>
-          <a:p>
-            <a:r>
-              <a:rPr lang="en-US" dirty="0" smtClean="0"/>
-              <a:t>Given the findings</a:t>
+              <a:t>The</a:t>
             </a:r>
             <a:r>
               <a:rPr lang="en-US" baseline="0" dirty="0" smtClean="0"/>
-              <a:t> with the </a:t>
-            </a:r>
-            <a:r>
-              <a:rPr lang="en-US" baseline="0" dirty="0" err="1" smtClean="0"/>
-              <a:t>gwRR</a:t>
-            </a:r>
+              <a:t> overall narrative I’m trying to weave – more variance in females</a:t>
+            </a:r>
+          </a:p>
+          <a:p>
             <a:r>
               <a:rPr lang="en-US" baseline="0" dirty="0" smtClean="0"/>
-              <a:t> -&gt; </a:t>
-            </a:r>
-            <a:r>
-              <a:rPr lang="en-US" baseline="0" dirty="0" err="1" smtClean="0"/>
-              <a:t>chrm</a:t>
-            </a:r>
+              <a:t>-Between cells (MLH1 counts)</a:t>
+            </a:r>
+          </a:p>
+          <a:p>
             <a:r>
               <a:rPr lang="en-US" baseline="0" dirty="0" smtClean="0"/>
-              <a:t> proportions -&gt; look at single bivalent pattern</a:t>
-            </a:r>
-          </a:p>
-          <a:p>
-            <a:endParaRPr lang="en-US" baseline="0" dirty="0" smtClean="0"/>
+              <a:t>- Uniform spacing (the 1CO position is not regulated)  (F1 variance is probably larger (F1nrm))</a:t>
+            </a:r>
           </a:p>
           <a:p>
             <a:r>
               <a:rPr lang="en-US" baseline="0" dirty="0" smtClean="0"/>
-              <a:t>(chromatin compaction, interference and known sex specific rec landscape features)</a:t>
-            </a:r>
-          </a:p>
-          <a:p>
-            <a:endParaRPr lang="en-US" baseline="0" dirty="0" smtClean="0"/>
-          </a:p>
-          <a:p>
+              <a:t>- IFD spacing / interference strength</a:t>
+            </a:r>
+          </a:p>
+          <a:p>
+            <a:endParaRPr lang="en-US" dirty="0" smtClean="0"/>
+          </a:p>
+          <a:p>
+            <a:r>
+              <a:rPr lang="en-US" dirty="0" smtClean="0"/>
+              <a:t>- Lack of distinction between</a:t>
+            </a:r>
             <a:r>
               <a:rPr lang="en-US" baseline="0" dirty="0" smtClean="0"/>
-              <a:t>(Brief summary for dataset)</a:t>
-            </a:r>
-          </a:p>
-          <a:p>
-            <a:endParaRPr lang="en-US" baseline="0" dirty="0" smtClean="0"/>
-          </a:p>
-          <a:p>
+              <a:t> 1CO and 2CO lengths</a:t>
+            </a:r>
+            <a:endParaRPr lang="en-US" dirty="0" smtClean="0"/>
+          </a:p>
+          <a:p>
+            <a:endParaRPr lang="en-US" dirty="0" smtClean="0"/>
+          </a:p>
+          <a:p>
+            <a:r>
+              <a:rPr lang="en-US" dirty="0" smtClean="0"/>
+              <a:t>(longer</a:t>
+            </a:r>
             <a:r>
               <a:rPr lang="en-US" baseline="0" dirty="0" smtClean="0"/>
-              <a:t>(Focus is on 2 main questions)</a:t>
-            </a:r>
-          </a:p>
-          <a:p>
-            <a:endParaRPr lang="en-US" baseline="0" dirty="0" smtClean="0"/>
-          </a:p>
-          <a:p>
-            <a:r>
-              <a:rPr lang="en-US" baseline="0" dirty="0" smtClean="0"/>
-              <a:t>Animate so that they appear sequentially, then ii) fades</a:t>
-            </a:r>
-          </a:p>
-          <a:p>
-            <a:endParaRPr lang="en-US" baseline="0" dirty="0" smtClean="0"/>
-          </a:p>
-          <a:p>
-            <a:r>
-              <a:rPr lang="en-US" dirty="0" smtClean="0"/>
-              <a:t>Example questions</a:t>
-            </a:r>
+              <a:t> SC lengths (variance in SC length / I’m not sure this makes sense)</a:t>
+            </a:r>
+            <a:r>
+              <a:rPr lang="en-US" dirty="0" smtClean="0"/>
+              <a:t>)</a:t>
+            </a:r>
+          </a:p>
+          <a:p>
             <a:endParaRPr lang="en-US" dirty="0"/>
           </a:p>
         </p:txBody>
@@ -1955,7 +1929,7 @@
     </p:spTree>
     <p:extLst>
       <p:ext uri="{BB962C8B-B14F-4D97-AF65-F5344CB8AC3E}">
-        <p14:creationId xmlns:p14="http://schemas.microsoft.com/office/powerpoint/2010/main" val="3575860465"/>
+        <p14:creationId xmlns:p14="http://schemas.microsoft.com/office/powerpoint/2010/main" val="3243097393"/>
       </p:ext>
     </p:extLst>
   </p:cSld>
@@ -2011,50 +1985,33 @@
           <a:p>
             <a:r>
               <a:rPr lang="en-US" dirty="0" smtClean="0"/>
-              <a:t>1 way </a:t>
-            </a:r>
-            <a:r>
-              <a:rPr lang="en-US" dirty="0" err="1" smtClean="0"/>
-              <a:t>Anova</a:t>
-            </a:r>
-            <a:r>
-              <a:rPr lang="en-US" dirty="0" smtClean="0"/>
-              <a:t> – at least 1 of the group is different</a:t>
-            </a:r>
-          </a:p>
-          <a:p>
-            <a:r>
-              <a:rPr lang="en-US" dirty="0" smtClean="0"/>
-              <a:t>2. Pairwise </a:t>
-            </a:r>
-            <a:r>
-              <a:rPr lang="en-US" dirty="0" err="1" smtClean="0"/>
-              <a:t>t.tests</a:t>
-            </a:r>
-            <a:r>
-              <a:rPr lang="en-US" dirty="0" smtClean="0"/>
-              <a:t>, (maybe</a:t>
+              <a:t>(motivation)</a:t>
+            </a:r>
+          </a:p>
+          <a:p>
+            <a:r>
+              <a:rPr lang="en-US" dirty="0" smtClean="0"/>
+              <a:t>Given the findings</a:t>
             </a:r>
             <a:r>
               <a:rPr lang="en-US" baseline="0" dirty="0" smtClean="0"/>
-              <a:t> I was using the wrong correction)</a:t>
-            </a:r>
-            <a:endParaRPr lang="en-US" dirty="0" smtClean="0"/>
-          </a:p>
-          <a:p>
-            <a:endParaRPr lang="en-US" dirty="0" smtClean="0"/>
-          </a:p>
-          <a:p>
-            <a:endParaRPr lang="en-US" dirty="0" smtClean="0"/>
-          </a:p>
-          <a:p>
-            <a:r>
-              <a:rPr lang="en-US" dirty="0" smtClean="0"/>
-              <a:t>What</a:t>
+              <a:t> with the </a:t>
+            </a:r>
+            <a:r>
+              <a:rPr lang="en-US" baseline="0" dirty="0" err="1" smtClean="0"/>
+              <a:t>gwRR</a:t>
             </a:r>
             <a:r>
               <a:rPr lang="en-US" baseline="0" dirty="0" smtClean="0"/>
-              <a:t> would the point be to run these models? </a:t>
+              <a:t> -&gt; </a:t>
+            </a:r>
+            <a:r>
+              <a:rPr lang="en-US" baseline="0" dirty="0" err="1" smtClean="0"/>
+              <a:t>chrm</a:t>
+            </a:r>
+            <a:r>
+              <a:rPr lang="en-US" baseline="0" dirty="0" smtClean="0"/>
+              <a:t> proportions -&gt; look at single bivalent pattern</a:t>
             </a:r>
           </a:p>
           <a:p>
@@ -2063,21 +2020,43 @@
           <a:p>
             <a:r>
               <a:rPr lang="en-US" baseline="0" dirty="0" smtClean="0"/>
-              <a:t>Distinguish the higher than ‘low’ (Dom) level strains</a:t>
-            </a:r>
-          </a:p>
-          <a:p>
-            <a:r>
-              <a:rPr lang="en-US" dirty="0" smtClean="0"/>
-              <a:t>Allows</a:t>
-            </a:r>
+              <a:t>(chromatin compaction, interference and known sex specific rec landscape features)</a:t>
+            </a:r>
+          </a:p>
+          <a:p>
+            <a:endParaRPr lang="en-US" baseline="0" dirty="0" smtClean="0"/>
+          </a:p>
+          <a:p>
             <a:r>
               <a:rPr lang="en-US" baseline="0" dirty="0" smtClean="0"/>
-              <a:t> to add in additional strains not used for sexual </a:t>
-            </a:r>
-            <a:r>
-              <a:rPr lang="en-US" baseline="0" dirty="0" err="1" smtClean="0"/>
-              <a:t>differnces</a:t>
+              <a:t>(Brief summary for dataset)</a:t>
+            </a:r>
+          </a:p>
+          <a:p>
+            <a:endParaRPr lang="en-US" baseline="0" dirty="0" smtClean="0"/>
+          </a:p>
+          <a:p>
+            <a:r>
+              <a:rPr lang="en-US" baseline="0" dirty="0" smtClean="0"/>
+              <a:t>(Focus is on 2 main questions)</a:t>
+            </a:r>
+          </a:p>
+          <a:p>
+            <a:endParaRPr lang="en-US" baseline="0" dirty="0" smtClean="0"/>
+          </a:p>
+          <a:p>
+            <a:r>
+              <a:rPr lang="en-US" baseline="0" dirty="0" smtClean="0"/>
+              <a:t>Animate so that they appear sequentially, then ii) fades</a:t>
+            </a:r>
+          </a:p>
+          <a:p>
+            <a:endParaRPr lang="en-US" baseline="0" dirty="0" smtClean="0"/>
+          </a:p>
+          <a:p>
+            <a:r>
+              <a:rPr lang="en-US" dirty="0" smtClean="0"/>
+              <a:t>Example questions</a:t>
             </a:r>
             <a:endParaRPr lang="en-US" dirty="0"/>
           </a:p>
@@ -2101,6 +2080,160 @@
             <a:fld id="{2788907E-C72E-4D7B-B8CA-F158589AC799}" type="slidenum">
               <a:rPr lang="en-US" smtClean="0"/>
               <a:t>17</a:t>
+            </a:fld>
+            <a:endParaRPr lang="en-US"/>
+          </a:p>
+        </p:txBody>
+      </p:sp>
+    </p:spTree>
+    <p:extLst>
+      <p:ext uri="{BB962C8B-B14F-4D97-AF65-F5344CB8AC3E}">
+        <p14:creationId xmlns:p14="http://schemas.microsoft.com/office/powerpoint/2010/main" val="3575860465"/>
+      </p:ext>
+    </p:extLst>
+  </p:cSld>
+  <p:clrMapOvr>
+    <a:masterClrMapping/>
+  </p:clrMapOvr>
+</p:notes>
+</file>
+
+<file path=ppt/notesSlides/notesSlide16.xml><?xml version="1.0" encoding="utf-8"?>
+<p:notes xmlns:a="http://schemas.openxmlformats.org/drawingml/2006/main" xmlns:r="http://schemas.openxmlformats.org/officeDocument/2006/relationships" xmlns:p="http://schemas.openxmlformats.org/presentationml/2006/main">
+  <p:cSld>
+    <p:spTree>
+      <p:nvGrpSpPr>
+        <p:cNvPr id="1" name=""/>
+        <p:cNvGrpSpPr/>
+        <p:nvPr/>
+      </p:nvGrpSpPr>
+      <p:grpSpPr>
+        <a:xfrm>
+          <a:off x="0" y="0"/>
+          <a:ext cx="0" cy="0"/>
+          <a:chOff x="0" y="0"/>
+          <a:chExt cx="0" cy="0"/>
+        </a:xfrm>
+      </p:grpSpPr>
+      <p:sp>
+        <p:nvSpPr>
+          <p:cNvPr id="2" name="Slide Image Placeholder 1"/>
+          <p:cNvSpPr>
+            <a:spLocks noGrp="1" noRot="1" noChangeAspect="1"/>
+          </p:cNvSpPr>
+          <p:nvPr>
+            <p:ph type="sldImg"/>
+          </p:nvPr>
+        </p:nvSpPr>
+        <p:spPr/>
+      </p:sp>
+      <p:sp>
+        <p:nvSpPr>
+          <p:cNvPr id="3" name="Notes Placeholder 2"/>
+          <p:cNvSpPr>
+            <a:spLocks noGrp="1"/>
+          </p:cNvSpPr>
+          <p:nvPr>
+            <p:ph type="body" idx="1"/>
+          </p:nvPr>
+        </p:nvSpPr>
+        <p:spPr/>
+        <p:txBody>
+          <a:bodyPr/>
+          <a:lstStyle/>
+          <a:p>
+            <a:r>
+              <a:rPr lang="en-US" dirty="0" smtClean="0"/>
+              <a:t>1 way </a:t>
+            </a:r>
+            <a:r>
+              <a:rPr lang="en-US" dirty="0" err="1" smtClean="0"/>
+              <a:t>Anova</a:t>
+            </a:r>
+            <a:r>
+              <a:rPr lang="en-US" dirty="0" smtClean="0"/>
+              <a:t> – at least 1 of the group is different</a:t>
+            </a:r>
+          </a:p>
+          <a:p>
+            <a:r>
+              <a:rPr lang="en-US" dirty="0" smtClean="0"/>
+              <a:t>2. Pairwise </a:t>
+            </a:r>
+            <a:r>
+              <a:rPr lang="en-US" dirty="0" err="1" smtClean="0"/>
+              <a:t>t.tests</a:t>
+            </a:r>
+            <a:r>
+              <a:rPr lang="en-US" dirty="0" smtClean="0"/>
+              <a:t>, (maybe</a:t>
+            </a:r>
+            <a:r>
+              <a:rPr lang="en-US" baseline="0" dirty="0" smtClean="0"/>
+              <a:t> I was using the wrong correction)</a:t>
+            </a:r>
+            <a:endParaRPr lang="en-US" dirty="0" smtClean="0"/>
+          </a:p>
+          <a:p>
+            <a:endParaRPr lang="en-US" dirty="0" smtClean="0"/>
+          </a:p>
+          <a:p>
+            <a:endParaRPr lang="en-US" dirty="0" smtClean="0"/>
+          </a:p>
+          <a:p>
+            <a:r>
+              <a:rPr lang="en-US" dirty="0" smtClean="0"/>
+              <a:t>What</a:t>
+            </a:r>
+            <a:r>
+              <a:rPr lang="en-US" baseline="0" dirty="0" smtClean="0"/>
+              <a:t> would the point be to run these models? </a:t>
+            </a:r>
+          </a:p>
+          <a:p>
+            <a:endParaRPr lang="en-US" baseline="0" dirty="0" smtClean="0"/>
+          </a:p>
+          <a:p>
+            <a:r>
+              <a:rPr lang="en-US" baseline="0" dirty="0" smtClean="0"/>
+              <a:t>Distinguish the higher than ‘low’ (Dom) level strains</a:t>
+            </a:r>
+          </a:p>
+          <a:p>
+            <a:r>
+              <a:rPr lang="en-US" dirty="0" smtClean="0"/>
+              <a:t>Allows</a:t>
+            </a:r>
+            <a:r>
+              <a:rPr lang="en-US" baseline="0" dirty="0" smtClean="0"/>
+              <a:t> to add in additional strains not used for sexual </a:t>
+            </a:r>
+            <a:r>
+              <a:rPr lang="en-US" baseline="0" dirty="0" err="1" smtClean="0"/>
+              <a:t>differnces</a:t>
+            </a:r>
+            <a:endParaRPr lang="en-US" dirty="0"/>
+          </a:p>
+        </p:txBody>
+      </p:sp>
+      <p:sp>
+        <p:nvSpPr>
+          <p:cNvPr id="4" name="Slide Number Placeholder 3"/>
+          <p:cNvSpPr>
+            <a:spLocks noGrp="1"/>
+          </p:cNvSpPr>
+          <p:nvPr>
+            <p:ph type="sldNum" sz="quarter" idx="10"/>
+          </p:nvPr>
+        </p:nvSpPr>
+        <p:spPr/>
+        <p:txBody>
+          <a:bodyPr/>
+          <a:lstStyle/>
+          <a:p>
+            <a:fld id="{2788907E-C72E-4D7B-B8CA-F158589AC799}" type="slidenum">
+              <a:rPr lang="en-US" smtClean="0"/>
+              <a:t>18</a:t>
             </a:fld>
             <a:endParaRPr lang="en-US"/>
           </a:p>
@@ -2754,11 +2887,7 @@
           <a:p>
             <a:r>
               <a:rPr lang="en-US" dirty="0" smtClean="0"/>
-              <a:t>Example </a:t>
-            </a:r>
-            <a:r>
-              <a:rPr lang="en-US" dirty="0" smtClean="0"/>
-              <a:t>questions</a:t>
+              <a:t>Example questions</a:t>
             </a:r>
           </a:p>
           <a:p>
@@ -3151,7 +3280,7 @@
           <a:p>
             <a:fld id="{BA11E091-050C-4DAB-ABC8-34B3B7B173DA}" type="datetimeFigureOut">
               <a:rPr lang="en-US" smtClean="0"/>
-              <a:t>2/6/2020</a:t>
+              <a:t>2/7/2020</a:t>
             </a:fld>
             <a:endParaRPr lang="en-US"/>
           </a:p>
@@ -3321,7 +3450,7 @@
           <a:p>
             <a:fld id="{BA11E091-050C-4DAB-ABC8-34B3B7B173DA}" type="datetimeFigureOut">
               <a:rPr lang="en-US" smtClean="0"/>
-              <a:t>2/6/2020</a:t>
+              <a:t>2/7/2020</a:t>
             </a:fld>
             <a:endParaRPr lang="en-US"/>
           </a:p>
@@ -3501,7 +3630,7 @@
           <a:p>
             <a:fld id="{BA11E091-050C-4DAB-ABC8-34B3B7B173DA}" type="datetimeFigureOut">
               <a:rPr lang="en-US" smtClean="0"/>
-              <a:t>2/6/2020</a:t>
+              <a:t>2/7/2020</a:t>
             </a:fld>
             <a:endParaRPr lang="en-US"/>
           </a:p>
@@ -3671,7 +3800,7 @@
           <a:p>
             <a:fld id="{BA11E091-050C-4DAB-ABC8-34B3B7B173DA}" type="datetimeFigureOut">
               <a:rPr lang="en-US" smtClean="0"/>
-              <a:t>2/6/2020</a:t>
+              <a:t>2/7/2020</a:t>
             </a:fld>
             <a:endParaRPr lang="en-US"/>
           </a:p>
@@ -3917,7 +4046,7 @@
           <a:p>
             <a:fld id="{BA11E091-050C-4DAB-ABC8-34B3B7B173DA}" type="datetimeFigureOut">
               <a:rPr lang="en-US" smtClean="0"/>
-              <a:t>2/6/2020</a:t>
+              <a:t>2/7/2020</a:t>
             </a:fld>
             <a:endParaRPr lang="en-US"/>
           </a:p>
@@ -4149,7 +4278,7 @@
           <a:p>
             <a:fld id="{BA11E091-050C-4DAB-ABC8-34B3B7B173DA}" type="datetimeFigureOut">
               <a:rPr lang="en-US" smtClean="0"/>
-              <a:t>2/6/2020</a:t>
+              <a:t>2/7/2020</a:t>
             </a:fld>
             <a:endParaRPr lang="en-US"/>
           </a:p>
@@ -4516,7 +4645,7 @@
           <a:p>
             <a:fld id="{BA11E091-050C-4DAB-ABC8-34B3B7B173DA}" type="datetimeFigureOut">
               <a:rPr lang="en-US" smtClean="0"/>
-              <a:t>2/6/2020</a:t>
+              <a:t>2/7/2020</a:t>
             </a:fld>
             <a:endParaRPr lang="en-US"/>
           </a:p>
@@ -4634,7 +4763,7 @@
           <a:p>
             <a:fld id="{BA11E091-050C-4DAB-ABC8-34B3B7B173DA}" type="datetimeFigureOut">
               <a:rPr lang="en-US" smtClean="0"/>
-              <a:t>2/6/2020</a:t>
+              <a:t>2/7/2020</a:t>
             </a:fld>
             <a:endParaRPr lang="en-US"/>
           </a:p>
@@ -4729,7 +4858,7 @@
           <a:p>
             <a:fld id="{BA11E091-050C-4DAB-ABC8-34B3B7B173DA}" type="datetimeFigureOut">
               <a:rPr lang="en-US" smtClean="0"/>
-              <a:t>2/6/2020</a:t>
+              <a:t>2/7/2020</a:t>
             </a:fld>
             <a:endParaRPr lang="en-US"/>
           </a:p>
@@ -5006,7 +5135,7 @@
           <a:p>
             <a:fld id="{BA11E091-050C-4DAB-ABC8-34B3B7B173DA}" type="datetimeFigureOut">
               <a:rPr lang="en-US" smtClean="0"/>
-              <a:t>2/6/2020</a:t>
+              <a:t>2/7/2020</a:t>
             </a:fld>
             <a:endParaRPr lang="en-US"/>
           </a:p>
@@ -5259,7 +5388,7 @@
           <a:p>
             <a:fld id="{BA11E091-050C-4DAB-ABC8-34B3B7B173DA}" type="datetimeFigureOut">
               <a:rPr lang="en-US" smtClean="0"/>
-              <a:t>2/6/2020</a:t>
+              <a:t>2/7/2020</a:t>
             </a:fld>
             <a:endParaRPr lang="en-US"/>
           </a:p>
@@ -5472,7 +5601,7 @@
           <a:p>
             <a:fld id="{BA11E091-050C-4DAB-ABC8-34B3B7B173DA}" type="datetimeFigureOut">
               <a:rPr lang="en-US" smtClean="0"/>
-              <a:t>2/6/2020</a:t>
+              <a:t>2/7/2020</a:t>
             </a:fld>
             <a:endParaRPr lang="en-US"/>
           </a:p>
@@ -7185,6 +7314,113 @@
           <a:bodyPr/>
           <a:lstStyle/>
           <a:p>
+            <a:endParaRPr lang="en-US" dirty="0"/>
+          </a:p>
+        </p:txBody>
+      </p:sp>
+      <p:pic>
+        <p:nvPicPr>
+          <p:cNvPr id="6" name="Picture 5"/>
+          <p:cNvPicPr>
+            <a:picLocks noChangeAspect="1"/>
+          </p:cNvPicPr>
+          <p:nvPr/>
+        </p:nvPicPr>
+        <p:blipFill>
+          <a:blip r:embed="rId3"/>
+          <a:stretch>
+            <a:fillRect/>
+          </a:stretch>
+        </p:blipFill>
+        <p:spPr>
+          <a:xfrm>
+            <a:off x="1699812" y="811333"/>
+            <a:ext cx="8792374" cy="5767561"/>
+          </a:xfrm>
+          <a:prstGeom prst="rect">
+            <a:avLst/>
+          </a:prstGeom>
+        </p:spPr>
+      </p:pic>
+      <p:sp>
+        <p:nvSpPr>
+          <p:cNvPr id="5" name="TextBox 4"/>
+          <p:cNvSpPr txBox="1"/>
+          <p:nvPr/>
+        </p:nvSpPr>
+        <p:spPr>
+          <a:xfrm>
+            <a:off x="838200" y="5370779"/>
+            <a:ext cx="10650071" cy="461665"/>
+          </a:xfrm>
+          <a:prstGeom prst="rect">
+            <a:avLst/>
+          </a:prstGeom>
+          <a:solidFill>
+            <a:schemeClr val="bg1"/>
+          </a:solidFill>
+          <a:ln>
+            <a:solidFill>
+              <a:schemeClr val="tx1"/>
+            </a:solidFill>
+          </a:ln>
+        </p:spPr>
+        <p:txBody>
+          <a:bodyPr wrap="square" rtlCol="0">
+            <a:spAutoFit/>
+          </a:bodyPr>
+          <a:lstStyle/>
+          <a:p>
+            <a:pPr algn="ctr"/>
+            <a:endParaRPr lang="en-US" sz="2400" dirty="0"/>
+          </a:p>
+        </p:txBody>
+      </p:sp>
+    </p:spTree>
+    <p:extLst>
+      <p:ext uri="{BB962C8B-B14F-4D97-AF65-F5344CB8AC3E}">
+        <p14:creationId xmlns:p14="http://schemas.microsoft.com/office/powerpoint/2010/main" val="137388871"/>
+      </p:ext>
+    </p:extLst>
+  </p:cSld>
+  <p:clrMapOvr>
+    <a:masterClrMapping/>
+  </p:clrMapOvr>
+</p:sld>
+</file>
+
+<file path=ppt/slides/slide15.xml><?xml version="1.0" encoding="utf-8"?>
+<p:sld xmlns:a="http://schemas.openxmlformats.org/drawingml/2006/main" xmlns:r="http://schemas.openxmlformats.org/officeDocument/2006/relationships" xmlns:p="http://schemas.openxmlformats.org/presentationml/2006/main">
+  <p:cSld>
+    <p:spTree>
+      <p:nvGrpSpPr>
+        <p:cNvPr id="1" name=""/>
+        <p:cNvGrpSpPr/>
+        <p:nvPr/>
+      </p:nvGrpSpPr>
+      <p:grpSpPr>
+        <a:xfrm>
+          <a:off x="0" y="0"/>
+          <a:ext cx="0" cy="0"/>
+          <a:chOff x="0" y="0"/>
+          <a:chExt cx="0" cy="0"/>
+        </a:xfrm>
+      </p:grpSpPr>
+      <p:sp>
+        <p:nvSpPr>
+          <p:cNvPr id="2" name="Title 1"/>
+          <p:cNvSpPr>
+            <a:spLocks noGrp="1"/>
+          </p:cNvSpPr>
+          <p:nvPr>
+            <p:ph type="title"/>
+          </p:nvPr>
+        </p:nvSpPr>
+        <p:spPr/>
+        <p:txBody>
+          <a:bodyPr/>
+          <a:lstStyle/>
+          <a:p>
             <a:r>
               <a:rPr lang="en-US" dirty="0" err="1" smtClean="0"/>
               <a:t>DeBoer</a:t>
@@ -7286,7 +7522,7 @@
 </p:sld>
 </file>
 
-<file path=ppt/slides/slide15.xml><?xml version="1.0" encoding="utf-8"?>
+<file path=ppt/slides/slide16.xml><?xml version="1.0" encoding="utf-8"?>
 <p:sld xmlns:a="http://schemas.openxmlformats.org/drawingml/2006/main" xmlns:r="http://schemas.openxmlformats.org/officeDocument/2006/relationships" xmlns:p="http://schemas.openxmlformats.org/presentationml/2006/main">
   <p:cSld>
     <p:spTree>
@@ -7442,7 +7678,7 @@
 </p:sld>
 </file>
 
-<file path=ppt/slides/slide16.xml><?xml version="1.0" encoding="utf-8"?>
+<file path=ppt/slides/slide17.xml><?xml version="1.0" encoding="utf-8"?>
 <p:sld xmlns:a="http://schemas.openxmlformats.org/drawingml/2006/main" xmlns:r="http://schemas.openxmlformats.org/officeDocument/2006/relationships" xmlns:p="http://schemas.openxmlformats.org/presentationml/2006/main">
   <p:cSld>
     <p:spTree>
@@ -8067,7 +8303,7 @@
 </p:sld>
 </file>
 
-<file path=ppt/slides/slide17.xml><?xml version="1.0" encoding="utf-8"?>
+<file path=ppt/slides/slide18.xml><?xml version="1.0" encoding="utf-8"?>
 <p:sld xmlns:a="http://schemas.openxmlformats.org/drawingml/2006/main" xmlns:r="http://schemas.openxmlformats.org/officeDocument/2006/relationships" xmlns:p="http://schemas.openxmlformats.org/presentationml/2006/main">
   <p:cSld>
     <p:spTree>
@@ -8264,7 +8500,7 @@
 </p:sld>
 </file>
 
-<file path=ppt/slides/slide18.xml><?xml version="1.0" encoding="utf-8"?>
+<file path=ppt/slides/slide19.xml><?xml version="1.0" encoding="utf-8"?>
 <p:sld xmlns:a="http://schemas.openxmlformats.org/drawingml/2006/main" xmlns:r="http://schemas.openxmlformats.org/officeDocument/2006/relationships" xmlns:p="http://schemas.openxmlformats.org/presentationml/2006/main">
   <p:cSld>
     <p:spTree>
@@ -9349,11 +9585,7 @@
             </a:pPr>
             <a:r>
               <a:rPr lang="en-US" dirty="0" smtClean="0"/>
-              <a:t>G, PWD, SKIVE have sex specifi</a:t>
-            </a:r>
-            <a:r>
-              <a:rPr lang="en-US" dirty="0" smtClean="0"/>
-              <a:t>c pattern (higher than other mice)</a:t>
+              <a:t>G, PWD, SKIVE have sex specific pattern (higher than other mice)</a:t>
             </a:r>
             <a:endParaRPr lang="en-US" dirty="0"/>
           </a:p>
@@ -10041,15 +10273,7 @@
           <a:p>
             <a:r>
               <a:rPr lang="en-US" dirty="0" smtClean="0"/>
-              <a:t>Single Bivalent </a:t>
-            </a:r>
-            <a:r>
-              <a:rPr lang="en-US" dirty="0" smtClean="0"/>
-              <a:t>Sex Specific P</a:t>
-            </a:r>
-            <a:r>
-              <a:rPr lang="en-US" dirty="0" smtClean="0"/>
-              <a:t>atterns</a:t>
+              <a:t>Single Bivalent Sex Specific Patterns</a:t>
             </a:r>
             <a:endParaRPr lang="en-US" dirty="0"/>
           </a:p>
@@ -10077,11 +10301,7 @@
             </a:pPr>
             <a:r>
               <a:rPr lang="en-US" dirty="0" smtClean="0"/>
-              <a:t>Driving </a:t>
-            </a:r>
-            <a:r>
-              <a:rPr lang="en-US" dirty="0" smtClean="0"/>
-              <a:t>questions</a:t>
+              <a:t>Driving questions</a:t>
             </a:r>
             <a:endParaRPr lang="en-US" dirty="0"/>
           </a:p>
@@ -10105,15 +10325,7 @@
           <a:p>
             <a:r>
               <a:rPr lang="en-US" dirty="0" smtClean="0"/>
-              <a:t>Q2</a:t>
-            </a:r>
-            <a:r>
-              <a:rPr lang="en-US" dirty="0" smtClean="0"/>
-              <a:t>) </a:t>
-            </a:r>
-            <a:r>
-              <a:rPr lang="en-US" dirty="0" smtClean="0"/>
-              <a:t>What </a:t>
+              <a:t>Q2) What </a:t>
             </a:r>
             <a:r>
               <a:rPr lang="en-US" dirty="0"/>
@@ -10137,11 +10349,7 @@
             </a:r>
             <a:r>
               <a:rPr lang="en-US" dirty="0" smtClean="0"/>
-              <a:t>strain</a:t>
-            </a:r>
-            <a:r>
-              <a:rPr lang="en-US" dirty="0" smtClean="0"/>
-              <a:t>?</a:t>
+              <a:t>strain?</a:t>
             </a:r>
           </a:p>
           <a:p>
@@ -11050,7 +11258,6 @@
               <a:rPr lang="en-US" dirty="0" smtClean="0"/>
               <a:t>sex + (1|strain)</a:t>
             </a:r>
-            <a:endParaRPr lang="en-US" dirty="0" smtClean="0"/>
           </a:p>
           <a:p>
             <a:pPr marL="0" indent="0">

</xml_diff>

<commit_message>
added junk to this file
</commit_message>
<xml_diff>
--- a/AP_labMeeting_2.12.20.pptx
+++ b/AP_labMeeting_2.12.20.pptx
@@ -5,7 +5,7 @@
     <p:sldMasterId id="2147483648" r:id="rId1"/>
   </p:sldMasterIdLst>
   <p:notesMasterIdLst>
-    <p:notesMasterId r:id="rId21"/>
+    <p:notesMasterId r:id="rId22"/>
   </p:notesMasterIdLst>
   <p:sldIdLst>
     <p:sldId id="256" r:id="rId2"/>
@@ -27,6 +27,7 @@
     <p:sldId id="270" r:id="rId18"/>
     <p:sldId id="266" r:id="rId19"/>
     <p:sldId id="268" r:id="rId20"/>
+    <p:sldId id="280" r:id="rId21"/>
   </p:sldIdLst>
   <p:sldSz cx="12192000" cy="6858000"/>
   <p:notesSz cx="6858000" cy="9144000"/>
@@ -215,7 +216,7 @@
           <a:p>
             <a:fld id="{582DA5D2-0B3C-4799-B633-4F32A722274F}" type="datetimeFigureOut">
               <a:rPr lang="en-US" smtClean="0"/>
-              <a:t>2/7/2020</a:t>
+              <a:t>2/9/2020</a:t>
             </a:fld>
             <a:endParaRPr lang="en-US"/>
           </a:p>
@@ -2252,6 +2253,915 @@
 </p:notes>
 </file>
 
+<file path=ppt/notesSlides/notesSlide17.xml><?xml version="1.0" encoding="utf-8"?>
+<p:notes xmlns:a="http://schemas.openxmlformats.org/drawingml/2006/main" xmlns:r="http://schemas.openxmlformats.org/officeDocument/2006/relationships" xmlns:p="http://schemas.openxmlformats.org/presentationml/2006/main">
+  <p:cSld>
+    <p:spTree>
+      <p:nvGrpSpPr>
+        <p:cNvPr id="1" name=""/>
+        <p:cNvGrpSpPr/>
+        <p:nvPr/>
+      </p:nvGrpSpPr>
+      <p:grpSpPr>
+        <a:xfrm>
+          <a:off x="0" y="0"/>
+          <a:ext cx="0" cy="0"/>
+          <a:chOff x="0" y="0"/>
+          <a:chExt cx="0" cy="0"/>
+        </a:xfrm>
+      </p:grpSpPr>
+      <p:sp>
+        <p:nvSpPr>
+          <p:cNvPr id="2" name="Slide Image Placeholder 1"/>
+          <p:cNvSpPr>
+            <a:spLocks noGrp="1" noRot="1" noChangeAspect="1"/>
+          </p:cNvSpPr>
+          <p:nvPr>
+            <p:ph type="sldImg"/>
+          </p:nvPr>
+        </p:nvSpPr>
+        <p:spPr/>
+      </p:sp>
+      <p:sp>
+        <p:nvSpPr>
+          <p:cNvPr id="3" name="Notes Placeholder 2"/>
+          <p:cNvSpPr>
+            <a:spLocks noGrp="1"/>
+          </p:cNvSpPr>
+          <p:nvPr>
+            <p:ph type="body" idx="1"/>
+          </p:nvPr>
+        </p:nvSpPr>
+        <p:spPr/>
+        <p:txBody>
+          <a:bodyPr/>
+          <a:lstStyle/>
+          <a:p>
+            <a:r>
+              <a:rPr lang="en-US" sz="1200" kern="1200" dirty="0" smtClean="0">
+                <a:solidFill>
+                  <a:schemeClr val="tx1"/>
+                </a:solidFill>
+                <a:effectLst/>
+                <a:latin typeface="+mn-lt"/>
+                <a:ea typeface="+mn-ea"/>
+                <a:cs typeface="+mn-cs"/>
+              </a:rPr>
+              <a:t> </a:t>
+            </a:r>
+          </a:p>
+          <a:p>
+            <a:r>
+              <a:rPr lang="en-US" sz="1200" b="1" kern="1200" dirty="0" smtClean="0">
+                <a:solidFill>
+                  <a:schemeClr val="tx1"/>
+                </a:solidFill>
+                <a:effectLst/>
+                <a:latin typeface="+mn-lt"/>
+                <a:ea typeface="+mn-ea"/>
+                <a:cs typeface="+mn-cs"/>
+              </a:rPr>
+              <a:t>Discussion</a:t>
+            </a:r>
+            <a:endParaRPr lang="en-US" sz="1300" b="1" kern="1200" dirty="0" smtClean="0">
+              <a:solidFill>
+                <a:schemeClr val="tx1"/>
+              </a:solidFill>
+              <a:effectLst/>
+              <a:latin typeface="+mn-lt"/>
+              <a:ea typeface="+mn-ea"/>
+              <a:cs typeface="+mn-cs"/>
+            </a:endParaRPr>
+          </a:p>
+          <a:p>
+            <a:r>
+              <a:rPr lang="en-US" sz="1200" kern="1200" dirty="0" smtClean="0">
+                <a:solidFill>
+                  <a:schemeClr val="tx1"/>
+                </a:solidFill>
+                <a:effectLst/>
+                <a:latin typeface="+mn-lt"/>
+                <a:ea typeface="+mn-ea"/>
+                <a:cs typeface="+mn-cs"/>
+              </a:rPr>
+              <a:t> </a:t>
+            </a:r>
+          </a:p>
+          <a:p>
+            <a:r>
+              <a:rPr lang="en-US" sz="1200" dirty="0" smtClean="0">
+                <a:effectLst/>
+              </a:rPr>
+              <a:t>Table X, Current models and their predictions for the evolution of heterochiasmy</a:t>
+            </a:r>
+            <a:endParaRPr lang="en-US" dirty="0" smtClean="0">
+              <a:effectLst/>
+            </a:endParaRPr>
+          </a:p>
+          <a:p>
+            <a:r>
+              <a:rPr lang="en-US" sz="1200" dirty="0" smtClean="0">
+                <a:effectLst/>
+              </a:rPr>
+              <a:t>Table X, results from proposed predictions</a:t>
+            </a:r>
+            <a:endParaRPr lang="en-US" dirty="0" smtClean="0">
+              <a:effectLst/>
+            </a:endParaRPr>
+          </a:p>
+          <a:p>
+            <a:r>
+              <a:rPr lang="en-US" sz="1200" dirty="0" smtClean="0">
+                <a:effectLst/>
+              </a:rPr>
+              <a:t>(Figure X, cartoon of difference in bivalent on spindle for 1CO and 2COs)</a:t>
+            </a:r>
+            <a:endParaRPr lang="en-US" dirty="0" smtClean="0">
+              <a:effectLst/>
+            </a:endParaRPr>
+          </a:p>
+          <a:p>
+            <a:pPr lvl="0"/>
+            <a:r>
+              <a:rPr lang="en-US" sz="1200" kern="1200" dirty="0" smtClean="0">
+                <a:solidFill>
+                  <a:schemeClr val="tx1"/>
+                </a:solidFill>
+                <a:effectLst/>
+                <a:latin typeface="+mn-lt"/>
+                <a:ea typeface="+mn-ea"/>
+                <a:cs typeface="+mn-cs"/>
+              </a:rPr>
+              <a:t>Review main patterns</a:t>
+            </a:r>
+            <a:endParaRPr lang="en-US" sz="1100" kern="1200" dirty="0" smtClean="0">
+              <a:solidFill>
+                <a:schemeClr val="tx1"/>
+              </a:solidFill>
+              <a:effectLst/>
+              <a:latin typeface="+mn-lt"/>
+              <a:ea typeface="+mn-ea"/>
+              <a:cs typeface="+mn-cs"/>
+            </a:endParaRPr>
+          </a:p>
+          <a:p>
+            <a:pPr lvl="1"/>
+            <a:r>
+              <a:rPr lang="en-US" sz="1200" kern="1200" dirty="0" smtClean="0">
+                <a:solidFill>
+                  <a:schemeClr val="tx1"/>
+                </a:solidFill>
+                <a:effectLst/>
+                <a:latin typeface="+mn-lt"/>
+                <a:ea typeface="+mn-ea"/>
+                <a:cs typeface="+mn-cs"/>
+              </a:rPr>
+              <a:t>Male specific polymorphism for </a:t>
+            </a:r>
+            <a:r>
+              <a:rPr lang="en-US" sz="1200" kern="1200" dirty="0" err="1" smtClean="0">
+                <a:solidFill>
+                  <a:schemeClr val="tx1"/>
+                </a:solidFill>
+                <a:effectLst/>
+                <a:latin typeface="+mn-lt"/>
+                <a:ea typeface="+mn-ea"/>
+                <a:cs typeface="+mn-cs"/>
+              </a:rPr>
+              <a:t>gwRR</a:t>
+            </a:r>
+            <a:r>
+              <a:rPr lang="en-US" sz="1200" kern="1200" dirty="0" smtClean="0">
+                <a:solidFill>
+                  <a:schemeClr val="tx1"/>
+                </a:solidFill>
+                <a:effectLst/>
+                <a:latin typeface="+mn-lt"/>
+                <a:ea typeface="+mn-ea"/>
+                <a:cs typeface="+mn-cs"/>
+              </a:rPr>
+              <a:t> in </a:t>
+            </a:r>
+            <a:r>
+              <a:rPr lang="en-US" sz="1200" kern="1200" dirty="0" err="1" smtClean="0">
+                <a:solidFill>
+                  <a:schemeClr val="tx1"/>
+                </a:solidFill>
+                <a:effectLst/>
+                <a:latin typeface="+mn-lt"/>
+                <a:ea typeface="+mn-ea"/>
+                <a:cs typeface="+mn-cs"/>
+              </a:rPr>
+              <a:t>musculus</a:t>
+            </a:r>
+            <a:r>
+              <a:rPr lang="en-US" sz="1200" kern="1200" dirty="0" smtClean="0">
+                <a:solidFill>
+                  <a:schemeClr val="tx1"/>
+                </a:solidFill>
+                <a:effectLst/>
+                <a:latin typeface="+mn-lt"/>
+                <a:ea typeface="+mn-ea"/>
+                <a:cs typeface="+mn-cs"/>
+              </a:rPr>
+              <a:t> and </a:t>
+            </a:r>
+            <a:r>
+              <a:rPr lang="en-US" sz="1200" kern="1200" dirty="0" err="1" smtClean="0">
+                <a:solidFill>
+                  <a:schemeClr val="tx1"/>
+                </a:solidFill>
+                <a:effectLst/>
+                <a:latin typeface="+mn-lt"/>
+                <a:ea typeface="+mn-ea"/>
+                <a:cs typeface="+mn-cs"/>
+              </a:rPr>
+              <a:t>molossisnus</a:t>
+            </a:r>
+            <a:r>
+              <a:rPr lang="en-US" sz="1200" kern="1200" dirty="0" smtClean="0">
+                <a:solidFill>
+                  <a:schemeClr val="tx1"/>
+                </a:solidFill>
+                <a:effectLst/>
+                <a:latin typeface="+mn-lt"/>
+                <a:ea typeface="+mn-ea"/>
+                <a:cs typeface="+mn-cs"/>
+              </a:rPr>
+              <a:t>, may not be a species wide optimum for </a:t>
+            </a:r>
+            <a:r>
+              <a:rPr lang="en-US" sz="1200" kern="1200" dirty="0" err="1" smtClean="0">
+                <a:solidFill>
+                  <a:schemeClr val="tx1"/>
+                </a:solidFill>
+                <a:effectLst/>
+                <a:latin typeface="+mn-lt"/>
+                <a:ea typeface="+mn-ea"/>
+                <a:cs typeface="+mn-cs"/>
+              </a:rPr>
+              <a:t>gwRR</a:t>
+            </a:r>
+            <a:endParaRPr lang="en-US" sz="1100" kern="1200" dirty="0" smtClean="0">
+              <a:solidFill>
+                <a:schemeClr val="tx1"/>
+              </a:solidFill>
+              <a:effectLst/>
+              <a:latin typeface="+mn-lt"/>
+              <a:ea typeface="+mn-ea"/>
+              <a:cs typeface="+mn-cs"/>
+            </a:endParaRPr>
+          </a:p>
+          <a:p>
+            <a:pPr lvl="1"/>
+            <a:r>
+              <a:rPr lang="en-US" sz="1200" kern="1200" dirty="0" smtClean="0">
+                <a:solidFill>
+                  <a:schemeClr val="tx1"/>
+                </a:solidFill>
+                <a:effectLst/>
+                <a:latin typeface="+mn-lt"/>
+                <a:ea typeface="+mn-ea"/>
+                <a:cs typeface="+mn-cs"/>
+              </a:rPr>
+              <a:t>More variance in females for meiotic features, resulting in greater variation in </a:t>
+            </a:r>
+            <a:r>
+              <a:rPr lang="en-US" sz="1200" kern="1200" dirty="0" err="1" smtClean="0">
+                <a:solidFill>
+                  <a:schemeClr val="tx1"/>
+                </a:solidFill>
+                <a:effectLst/>
+                <a:latin typeface="+mn-lt"/>
+                <a:ea typeface="+mn-ea"/>
+                <a:cs typeface="+mn-cs"/>
+              </a:rPr>
+              <a:t>gwRR</a:t>
+            </a:r>
+            <a:endParaRPr lang="en-US" sz="1100" kern="1200" dirty="0" smtClean="0">
+              <a:solidFill>
+                <a:schemeClr val="tx1"/>
+              </a:solidFill>
+              <a:effectLst/>
+              <a:latin typeface="+mn-lt"/>
+              <a:ea typeface="+mn-ea"/>
+              <a:cs typeface="+mn-cs"/>
+            </a:endParaRPr>
+          </a:p>
+          <a:p>
+            <a:pPr lvl="1"/>
+            <a:r>
+              <a:rPr lang="en-US" sz="1200" kern="1200" dirty="0" smtClean="0">
+                <a:solidFill>
+                  <a:schemeClr val="tx1"/>
+                </a:solidFill>
+                <a:effectLst/>
+                <a:latin typeface="+mn-lt"/>
+                <a:ea typeface="+mn-ea"/>
+                <a:cs typeface="+mn-cs"/>
+              </a:rPr>
+              <a:t>Rapid male specific evolution upstream of CO repair stage</a:t>
+            </a:r>
+            <a:endParaRPr lang="en-US" sz="1100" kern="1200" dirty="0" smtClean="0">
+              <a:solidFill>
+                <a:schemeClr val="tx1"/>
+              </a:solidFill>
+              <a:effectLst/>
+              <a:latin typeface="+mn-lt"/>
+              <a:ea typeface="+mn-ea"/>
+              <a:cs typeface="+mn-cs"/>
+            </a:endParaRPr>
+          </a:p>
+          <a:p>
+            <a:r>
+              <a:rPr lang="en-US" sz="1200" kern="1200" dirty="0" smtClean="0">
+                <a:solidFill>
+                  <a:schemeClr val="tx1"/>
+                </a:solidFill>
+                <a:effectLst/>
+                <a:latin typeface="+mn-lt"/>
+                <a:ea typeface="+mn-ea"/>
+                <a:cs typeface="+mn-cs"/>
+              </a:rPr>
+              <a:t> </a:t>
+            </a:r>
+            <a:endParaRPr lang="en-US" sz="1100" kern="1200" dirty="0" smtClean="0">
+              <a:solidFill>
+                <a:schemeClr val="tx1"/>
+              </a:solidFill>
+              <a:effectLst/>
+              <a:latin typeface="+mn-lt"/>
+              <a:ea typeface="+mn-ea"/>
+              <a:cs typeface="+mn-cs"/>
+            </a:endParaRPr>
+          </a:p>
+          <a:p>
+            <a:pPr lvl="0"/>
+            <a:r>
+              <a:rPr lang="en-US" sz="1200" kern="1200" dirty="0" smtClean="0">
+                <a:solidFill>
+                  <a:schemeClr val="tx1"/>
+                </a:solidFill>
+                <a:effectLst/>
+                <a:latin typeface="+mn-lt"/>
+                <a:ea typeface="+mn-ea"/>
+                <a:cs typeface="+mn-cs"/>
+              </a:rPr>
+              <a:t>SACE predictions and bivalent selection models are not mutually exclusive,</a:t>
+            </a:r>
+            <a:endParaRPr lang="en-US" sz="1100" kern="1200" dirty="0" smtClean="0">
+              <a:solidFill>
+                <a:schemeClr val="tx1"/>
+              </a:solidFill>
+              <a:effectLst/>
+              <a:latin typeface="+mn-lt"/>
+              <a:ea typeface="+mn-ea"/>
+              <a:cs typeface="+mn-cs"/>
+            </a:endParaRPr>
+          </a:p>
+          <a:p>
+            <a:pPr lvl="0"/>
+            <a:r>
+              <a:rPr lang="en-US" sz="1200" kern="1200" dirty="0" smtClean="0">
+                <a:solidFill>
+                  <a:schemeClr val="tx1"/>
+                </a:solidFill>
+                <a:effectLst/>
+                <a:latin typeface="+mn-lt"/>
+                <a:ea typeface="+mn-ea"/>
+                <a:cs typeface="+mn-cs"/>
+              </a:rPr>
+              <a:t>Importance of broad scale patterns for recombination</a:t>
+            </a:r>
+            <a:endParaRPr lang="en-US" sz="1100" kern="1200" dirty="0" smtClean="0">
+              <a:solidFill>
+                <a:schemeClr val="tx1"/>
+              </a:solidFill>
+              <a:effectLst/>
+              <a:latin typeface="+mn-lt"/>
+              <a:ea typeface="+mn-ea"/>
+              <a:cs typeface="+mn-cs"/>
+            </a:endParaRPr>
+          </a:p>
+          <a:p>
+            <a:r>
+              <a:rPr lang="en-US" sz="1200" kern="1200" dirty="0" smtClean="0">
+                <a:solidFill>
+                  <a:schemeClr val="tx1"/>
+                </a:solidFill>
+                <a:effectLst/>
+                <a:latin typeface="+mn-lt"/>
+                <a:ea typeface="+mn-ea"/>
+                <a:cs typeface="+mn-cs"/>
+              </a:rPr>
+              <a:t>(centromere effects for </a:t>
+            </a:r>
+            <a:r>
+              <a:rPr lang="en-US" sz="1200" kern="1200" dirty="0" err="1" smtClean="0">
+                <a:solidFill>
+                  <a:schemeClr val="tx1"/>
+                </a:solidFill>
+                <a:effectLst/>
+                <a:latin typeface="+mn-lt"/>
+                <a:ea typeface="+mn-ea"/>
+                <a:cs typeface="+mn-cs"/>
+              </a:rPr>
+              <a:t>mis</a:t>
+            </a:r>
+            <a:r>
+              <a:rPr lang="en-US" sz="1200" kern="1200" dirty="0" smtClean="0">
+                <a:solidFill>
+                  <a:schemeClr val="tx1"/>
+                </a:solidFill>
+                <a:effectLst/>
+                <a:latin typeface="+mn-lt"/>
+                <a:ea typeface="+mn-ea"/>
+                <a:cs typeface="+mn-cs"/>
+              </a:rPr>
+              <a:t>-segregation rates) - (high rate of </a:t>
+            </a:r>
+            <a:r>
+              <a:rPr lang="en-US" sz="1200" kern="1200" dirty="0" err="1" smtClean="0">
+                <a:solidFill>
+                  <a:schemeClr val="tx1"/>
+                </a:solidFill>
+                <a:effectLst/>
+                <a:latin typeface="+mn-lt"/>
+                <a:ea typeface="+mn-ea"/>
+                <a:cs typeface="+mn-cs"/>
+              </a:rPr>
+              <a:t>robertsonian</a:t>
+            </a:r>
+            <a:r>
+              <a:rPr lang="en-US" sz="1200" kern="1200" dirty="0" smtClean="0">
+                <a:solidFill>
+                  <a:schemeClr val="tx1"/>
+                </a:solidFill>
+                <a:effectLst/>
+                <a:latin typeface="+mn-lt"/>
+                <a:ea typeface="+mn-ea"/>
+                <a:cs typeface="+mn-cs"/>
+              </a:rPr>
+              <a:t> translocation in Dom, and absent in </a:t>
+            </a:r>
+            <a:r>
+              <a:rPr lang="en-US" sz="1200" kern="1200" dirty="0" err="1" smtClean="0">
+                <a:solidFill>
+                  <a:schemeClr val="tx1"/>
+                </a:solidFill>
+                <a:effectLst/>
+                <a:latin typeface="+mn-lt"/>
+                <a:ea typeface="+mn-ea"/>
+                <a:cs typeface="+mn-cs"/>
+              </a:rPr>
+              <a:t>Musc</a:t>
+            </a:r>
+            <a:r>
+              <a:rPr lang="en-US" sz="1200" kern="1200" dirty="0" smtClean="0">
+                <a:solidFill>
+                  <a:schemeClr val="tx1"/>
+                </a:solidFill>
+                <a:effectLst/>
+                <a:latin typeface="+mn-lt"/>
+                <a:ea typeface="+mn-ea"/>
+                <a:cs typeface="+mn-cs"/>
+              </a:rPr>
+              <a:t> – maybe something about centromeres (encourages </a:t>
+            </a:r>
+            <a:r>
+              <a:rPr lang="en-US" sz="1200" kern="1200" dirty="0" err="1" smtClean="0">
+                <a:solidFill>
+                  <a:schemeClr val="tx1"/>
+                </a:solidFill>
+                <a:effectLst/>
+                <a:latin typeface="+mn-lt"/>
+                <a:ea typeface="+mn-ea"/>
+                <a:cs typeface="+mn-cs"/>
+              </a:rPr>
+              <a:t>transloactions</a:t>
+            </a:r>
+            <a:r>
+              <a:rPr lang="en-US" sz="1200" kern="1200" dirty="0" smtClean="0">
+                <a:solidFill>
+                  <a:schemeClr val="tx1"/>
+                </a:solidFill>
+                <a:effectLst/>
+                <a:latin typeface="+mn-lt"/>
+                <a:ea typeface="+mn-ea"/>
+                <a:cs typeface="+mn-cs"/>
+              </a:rPr>
+              <a:t> + suppresses 2CO (rec near centromere) in DOM</a:t>
+            </a:r>
+            <a:endParaRPr lang="en-US" sz="1100" kern="1200" dirty="0" smtClean="0">
+              <a:solidFill>
+                <a:schemeClr val="tx1"/>
+              </a:solidFill>
+              <a:effectLst/>
+              <a:latin typeface="+mn-lt"/>
+              <a:ea typeface="+mn-ea"/>
+              <a:cs typeface="+mn-cs"/>
+            </a:endParaRPr>
+          </a:p>
+          <a:p>
+            <a:r>
+              <a:rPr lang="en-US" sz="1200" kern="1200" dirty="0" smtClean="0">
+                <a:solidFill>
+                  <a:schemeClr val="tx1"/>
+                </a:solidFill>
+                <a:effectLst/>
+                <a:latin typeface="+mn-lt"/>
+                <a:ea typeface="+mn-ea"/>
+                <a:cs typeface="+mn-cs"/>
+              </a:rPr>
+              <a:t>(that has changed in </a:t>
+            </a:r>
+            <a:r>
+              <a:rPr lang="en-US" sz="1200" kern="1200" dirty="0" err="1" smtClean="0">
+                <a:solidFill>
+                  <a:schemeClr val="tx1"/>
+                </a:solidFill>
+                <a:effectLst/>
+                <a:latin typeface="+mn-lt"/>
+                <a:ea typeface="+mn-ea"/>
+                <a:cs typeface="+mn-cs"/>
+              </a:rPr>
+              <a:t>Musc</a:t>
+            </a:r>
+            <a:r>
+              <a:rPr lang="en-US" sz="1200" kern="1200" dirty="0" smtClean="0">
+                <a:solidFill>
+                  <a:schemeClr val="tx1"/>
+                </a:solidFill>
+                <a:effectLst/>
+                <a:latin typeface="+mn-lt"/>
+                <a:ea typeface="+mn-ea"/>
+                <a:cs typeface="+mn-cs"/>
+              </a:rPr>
+              <a:t>, REC near centromere suppresses rates of </a:t>
+            </a:r>
+            <a:r>
+              <a:rPr lang="en-US" sz="1200" kern="1200" dirty="0" err="1" smtClean="0">
+                <a:solidFill>
+                  <a:schemeClr val="tx1"/>
+                </a:solidFill>
+                <a:effectLst/>
+                <a:latin typeface="+mn-lt"/>
+                <a:ea typeface="+mn-ea"/>
+                <a:cs typeface="+mn-cs"/>
+              </a:rPr>
+              <a:t>robertsonian</a:t>
+            </a:r>
+            <a:r>
+              <a:rPr lang="en-US" sz="1200" kern="1200" dirty="0" smtClean="0">
+                <a:solidFill>
+                  <a:schemeClr val="tx1"/>
+                </a:solidFill>
+                <a:effectLst/>
+                <a:latin typeface="+mn-lt"/>
+                <a:ea typeface="+mn-ea"/>
+                <a:cs typeface="+mn-cs"/>
+              </a:rPr>
+              <a:t> translocation)</a:t>
+            </a:r>
+            <a:endParaRPr lang="en-US" sz="1100" kern="1200" dirty="0" smtClean="0">
+              <a:solidFill>
+                <a:schemeClr val="tx1"/>
+              </a:solidFill>
+              <a:effectLst/>
+              <a:latin typeface="+mn-lt"/>
+              <a:ea typeface="+mn-ea"/>
+              <a:cs typeface="+mn-cs"/>
+            </a:endParaRPr>
+          </a:p>
+          <a:p>
+            <a:endParaRPr lang="en-US" sz="1200" b="1" dirty="0" smtClean="0">
+              <a:effectLst/>
+            </a:endParaRPr>
+          </a:p>
+          <a:p>
+            <a:r>
+              <a:rPr lang="en-US" sz="1200" b="1" dirty="0" smtClean="0">
+                <a:effectLst/>
+              </a:rPr>
+              <a:t>Discussion</a:t>
+            </a:r>
+            <a:endParaRPr lang="en-US" dirty="0" smtClean="0">
+              <a:effectLst/>
+            </a:endParaRPr>
+          </a:p>
+          <a:p>
+            <a:r>
+              <a:rPr lang="en-US" sz="1200" dirty="0" smtClean="0">
+                <a:effectLst/>
+              </a:rPr>
+              <a:t>Table X, Current models and their predictions for the evolution of heterochiasmy</a:t>
+            </a:r>
+            <a:endParaRPr lang="en-US" dirty="0" smtClean="0">
+              <a:effectLst/>
+            </a:endParaRPr>
+          </a:p>
+          <a:p>
+            <a:r>
+              <a:rPr lang="en-US" sz="1200" dirty="0" smtClean="0">
+                <a:effectLst/>
+              </a:rPr>
+              <a:t>Table X, results from proposed predictions</a:t>
+            </a:r>
+            <a:endParaRPr lang="en-US" dirty="0" smtClean="0">
+              <a:effectLst/>
+            </a:endParaRPr>
+          </a:p>
+          <a:p>
+            <a:r>
+              <a:rPr lang="en-US" sz="1200" dirty="0" smtClean="0">
+                <a:effectLst/>
+              </a:rPr>
+              <a:t>(Figure X, cartoon of difference in bivalent on spindle for 1CO and 2COs)</a:t>
+            </a:r>
+            <a:endParaRPr lang="en-US" dirty="0" smtClean="0">
+              <a:effectLst/>
+            </a:endParaRPr>
+          </a:p>
+          <a:p>
+            <a:pPr lvl="0"/>
+            <a:r>
+              <a:rPr lang="en-US" sz="1200" kern="1200" dirty="0" smtClean="0">
+                <a:solidFill>
+                  <a:schemeClr val="tx1"/>
+                </a:solidFill>
+                <a:effectLst/>
+                <a:latin typeface="+mn-lt"/>
+                <a:ea typeface="+mn-ea"/>
+                <a:cs typeface="+mn-cs"/>
+              </a:rPr>
+              <a:t>Review main patterns</a:t>
+            </a:r>
+            <a:endParaRPr lang="en-US" sz="1100" kern="1200" dirty="0" smtClean="0">
+              <a:solidFill>
+                <a:schemeClr val="tx1"/>
+              </a:solidFill>
+              <a:effectLst/>
+              <a:latin typeface="+mn-lt"/>
+              <a:ea typeface="+mn-ea"/>
+              <a:cs typeface="+mn-cs"/>
+            </a:endParaRPr>
+          </a:p>
+          <a:p>
+            <a:pPr lvl="1"/>
+            <a:r>
+              <a:rPr lang="en-US" sz="1200" kern="1200" dirty="0" smtClean="0">
+                <a:solidFill>
+                  <a:schemeClr val="tx1"/>
+                </a:solidFill>
+                <a:effectLst/>
+                <a:latin typeface="+mn-lt"/>
+                <a:ea typeface="+mn-ea"/>
+                <a:cs typeface="+mn-cs"/>
+              </a:rPr>
+              <a:t>Male specific polymorphism for </a:t>
+            </a:r>
+            <a:r>
+              <a:rPr lang="en-US" sz="1200" kern="1200" dirty="0" err="1" smtClean="0">
+                <a:solidFill>
+                  <a:schemeClr val="tx1"/>
+                </a:solidFill>
+                <a:effectLst/>
+                <a:latin typeface="+mn-lt"/>
+                <a:ea typeface="+mn-ea"/>
+                <a:cs typeface="+mn-cs"/>
+              </a:rPr>
+              <a:t>gwRR</a:t>
+            </a:r>
+            <a:r>
+              <a:rPr lang="en-US" sz="1200" kern="1200" dirty="0" smtClean="0">
+                <a:solidFill>
+                  <a:schemeClr val="tx1"/>
+                </a:solidFill>
+                <a:effectLst/>
+                <a:latin typeface="+mn-lt"/>
+                <a:ea typeface="+mn-ea"/>
+                <a:cs typeface="+mn-cs"/>
+              </a:rPr>
+              <a:t> in </a:t>
+            </a:r>
+            <a:r>
+              <a:rPr lang="en-US" sz="1200" kern="1200" dirty="0" err="1" smtClean="0">
+                <a:solidFill>
+                  <a:schemeClr val="tx1"/>
+                </a:solidFill>
+                <a:effectLst/>
+                <a:latin typeface="+mn-lt"/>
+                <a:ea typeface="+mn-ea"/>
+                <a:cs typeface="+mn-cs"/>
+              </a:rPr>
+              <a:t>musculus</a:t>
+            </a:r>
+            <a:r>
+              <a:rPr lang="en-US" sz="1200" kern="1200" dirty="0" smtClean="0">
+                <a:solidFill>
+                  <a:schemeClr val="tx1"/>
+                </a:solidFill>
+                <a:effectLst/>
+                <a:latin typeface="+mn-lt"/>
+                <a:ea typeface="+mn-ea"/>
+                <a:cs typeface="+mn-cs"/>
+              </a:rPr>
+              <a:t> and </a:t>
+            </a:r>
+            <a:r>
+              <a:rPr lang="en-US" sz="1200" kern="1200" dirty="0" err="1" smtClean="0">
+                <a:solidFill>
+                  <a:schemeClr val="tx1"/>
+                </a:solidFill>
+                <a:effectLst/>
+                <a:latin typeface="+mn-lt"/>
+                <a:ea typeface="+mn-ea"/>
+                <a:cs typeface="+mn-cs"/>
+              </a:rPr>
+              <a:t>molossisnus</a:t>
+            </a:r>
+            <a:r>
+              <a:rPr lang="en-US" sz="1200" kern="1200" dirty="0" smtClean="0">
+                <a:solidFill>
+                  <a:schemeClr val="tx1"/>
+                </a:solidFill>
+                <a:effectLst/>
+                <a:latin typeface="+mn-lt"/>
+                <a:ea typeface="+mn-ea"/>
+                <a:cs typeface="+mn-cs"/>
+              </a:rPr>
+              <a:t>, may not be a species wide optimum for </a:t>
+            </a:r>
+            <a:r>
+              <a:rPr lang="en-US" sz="1200" kern="1200" dirty="0" err="1" smtClean="0">
+                <a:solidFill>
+                  <a:schemeClr val="tx1"/>
+                </a:solidFill>
+                <a:effectLst/>
+                <a:latin typeface="+mn-lt"/>
+                <a:ea typeface="+mn-ea"/>
+                <a:cs typeface="+mn-cs"/>
+              </a:rPr>
+              <a:t>gwRR</a:t>
+            </a:r>
+            <a:endParaRPr lang="en-US" sz="1100" kern="1200" dirty="0" smtClean="0">
+              <a:solidFill>
+                <a:schemeClr val="tx1"/>
+              </a:solidFill>
+              <a:effectLst/>
+              <a:latin typeface="+mn-lt"/>
+              <a:ea typeface="+mn-ea"/>
+              <a:cs typeface="+mn-cs"/>
+            </a:endParaRPr>
+          </a:p>
+          <a:p>
+            <a:pPr lvl="1"/>
+            <a:r>
+              <a:rPr lang="en-US" sz="1200" kern="1200" dirty="0" smtClean="0">
+                <a:solidFill>
+                  <a:schemeClr val="tx1"/>
+                </a:solidFill>
+                <a:effectLst/>
+                <a:latin typeface="+mn-lt"/>
+                <a:ea typeface="+mn-ea"/>
+                <a:cs typeface="+mn-cs"/>
+              </a:rPr>
+              <a:t>More variance in females for meiotic features, resulting in greater variation in </a:t>
+            </a:r>
+            <a:r>
+              <a:rPr lang="en-US" sz="1200" kern="1200" dirty="0" err="1" smtClean="0">
+                <a:solidFill>
+                  <a:schemeClr val="tx1"/>
+                </a:solidFill>
+                <a:effectLst/>
+                <a:latin typeface="+mn-lt"/>
+                <a:ea typeface="+mn-ea"/>
+                <a:cs typeface="+mn-cs"/>
+              </a:rPr>
+              <a:t>gwRR</a:t>
+            </a:r>
+            <a:endParaRPr lang="en-US" sz="1100" kern="1200" dirty="0" smtClean="0">
+              <a:solidFill>
+                <a:schemeClr val="tx1"/>
+              </a:solidFill>
+              <a:effectLst/>
+              <a:latin typeface="+mn-lt"/>
+              <a:ea typeface="+mn-ea"/>
+              <a:cs typeface="+mn-cs"/>
+            </a:endParaRPr>
+          </a:p>
+          <a:p>
+            <a:r>
+              <a:rPr lang="en-US" sz="1200" kern="1200" dirty="0" smtClean="0">
+                <a:solidFill>
+                  <a:schemeClr val="tx1"/>
+                </a:solidFill>
+                <a:effectLst/>
+                <a:latin typeface="+mn-lt"/>
+                <a:ea typeface="+mn-ea"/>
+                <a:cs typeface="+mn-cs"/>
+              </a:rPr>
+              <a:t> </a:t>
+            </a:r>
+            <a:endParaRPr lang="en-US" sz="1100" kern="1200" dirty="0" smtClean="0">
+              <a:solidFill>
+                <a:schemeClr val="tx1"/>
+              </a:solidFill>
+              <a:effectLst/>
+              <a:latin typeface="+mn-lt"/>
+              <a:ea typeface="+mn-ea"/>
+              <a:cs typeface="+mn-cs"/>
+            </a:endParaRPr>
+          </a:p>
+          <a:p>
+            <a:pPr lvl="0"/>
+            <a:r>
+              <a:rPr lang="en-US" sz="1200" kern="1200" dirty="0" smtClean="0">
+                <a:solidFill>
+                  <a:schemeClr val="tx1"/>
+                </a:solidFill>
+                <a:effectLst/>
+                <a:latin typeface="+mn-lt"/>
+                <a:ea typeface="+mn-ea"/>
+                <a:cs typeface="+mn-cs"/>
+              </a:rPr>
+              <a:t>SACE predictions and bivalent selection models are not mutually exclusive,</a:t>
+            </a:r>
+            <a:endParaRPr lang="en-US" sz="1100" kern="1200" dirty="0" smtClean="0">
+              <a:solidFill>
+                <a:schemeClr val="tx1"/>
+              </a:solidFill>
+              <a:effectLst/>
+              <a:latin typeface="+mn-lt"/>
+              <a:ea typeface="+mn-ea"/>
+              <a:cs typeface="+mn-cs"/>
+            </a:endParaRPr>
+          </a:p>
+          <a:p>
+            <a:pPr lvl="0"/>
+            <a:r>
+              <a:rPr lang="en-US" sz="1200" kern="1200" dirty="0" smtClean="0">
+                <a:solidFill>
+                  <a:schemeClr val="tx1"/>
+                </a:solidFill>
+                <a:effectLst/>
+                <a:latin typeface="+mn-lt"/>
+                <a:ea typeface="+mn-ea"/>
+                <a:cs typeface="+mn-cs"/>
+              </a:rPr>
+              <a:t>Importance of broad scale patterns for recombination</a:t>
+            </a:r>
+            <a:endParaRPr lang="en-US" sz="1100" kern="1200" dirty="0" smtClean="0">
+              <a:solidFill>
+                <a:schemeClr val="tx1"/>
+              </a:solidFill>
+              <a:effectLst/>
+              <a:latin typeface="+mn-lt"/>
+              <a:ea typeface="+mn-ea"/>
+              <a:cs typeface="+mn-cs"/>
+            </a:endParaRPr>
+          </a:p>
+          <a:p>
+            <a:endParaRPr lang="en-US" dirty="0"/>
+          </a:p>
+        </p:txBody>
+      </p:sp>
+      <p:sp>
+        <p:nvSpPr>
+          <p:cNvPr id="4" name="Slide Number Placeholder 3"/>
+          <p:cNvSpPr>
+            <a:spLocks noGrp="1"/>
+          </p:cNvSpPr>
+          <p:nvPr>
+            <p:ph type="sldNum" sz="quarter" idx="10"/>
+          </p:nvPr>
+        </p:nvSpPr>
+        <p:spPr/>
+        <p:txBody>
+          <a:bodyPr/>
+          <a:lstStyle/>
+          <a:p>
+            <a:fld id="{2788907E-C72E-4D7B-B8CA-F158589AC799}" type="slidenum">
+              <a:rPr lang="en-US" smtClean="0"/>
+              <a:t>20</a:t>
+            </a:fld>
+            <a:endParaRPr lang="en-US"/>
+          </a:p>
+        </p:txBody>
+      </p:sp>
+    </p:spTree>
+    <p:extLst>
+      <p:ext uri="{BB962C8B-B14F-4D97-AF65-F5344CB8AC3E}">
+        <p14:creationId xmlns:p14="http://schemas.microsoft.com/office/powerpoint/2010/main" val="1091368869"/>
+      </p:ext>
+    </p:extLst>
+  </p:cSld>
+  <p:clrMapOvr>
+    <a:masterClrMapping/>
+  </p:clrMapOvr>
+</p:notes>
+</file>
+
 <file path=ppt/notesSlides/notesSlide2.xml><?xml version="1.0" encoding="utf-8"?>
 <p:notes xmlns:a="http://schemas.openxmlformats.org/drawingml/2006/main" xmlns:r="http://schemas.openxmlformats.org/officeDocument/2006/relationships" xmlns:p="http://schemas.openxmlformats.org/presentationml/2006/main">
   <p:cSld>
@@ -3280,7 +4190,7 @@
           <a:p>
             <a:fld id="{BA11E091-050C-4DAB-ABC8-34B3B7B173DA}" type="datetimeFigureOut">
               <a:rPr lang="en-US" smtClean="0"/>
-              <a:t>2/7/2020</a:t>
+              <a:t>2/9/2020</a:t>
             </a:fld>
             <a:endParaRPr lang="en-US"/>
           </a:p>
@@ -3450,7 +4360,7 @@
           <a:p>
             <a:fld id="{BA11E091-050C-4DAB-ABC8-34B3B7B173DA}" type="datetimeFigureOut">
               <a:rPr lang="en-US" smtClean="0"/>
-              <a:t>2/7/2020</a:t>
+              <a:t>2/9/2020</a:t>
             </a:fld>
             <a:endParaRPr lang="en-US"/>
           </a:p>
@@ -3630,7 +4540,7 @@
           <a:p>
             <a:fld id="{BA11E091-050C-4DAB-ABC8-34B3B7B173DA}" type="datetimeFigureOut">
               <a:rPr lang="en-US" smtClean="0"/>
-              <a:t>2/7/2020</a:t>
+              <a:t>2/9/2020</a:t>
             </a:fld>
             <a:endParaRPr lang="en-US"/>
           </a:p>
@@ -3800,7 +4710,7 @@
           <a:p>
             <a:fld id="{BA11E091-050C-4DAB-ABC8-34B3B7B173DA}" type="datetimeFigureOut">
               <a:rPr lang="en-US" smtClean="0"/>
-              <a:t>2/7/2020</a:t>
+              <a:t>2/9/2020</a:t>
             </a:fld>
             <a:endParaRPr lang="en-US"/>
           </a:p>
@@ -4046,7 +4956,7 @@
           <a:p>
             <a:fld id="{BA11E091-050C-4DAB-ABC8-34B3B7B173DA}" type="datetimeFigureOut">
               <a:rPr lang="en-US" smtClean="0"/>
-              <a:t>2/7/2020</a:t>
+              <a:t>2/9/2020</a:t>
             </a:fld>
             <a:endParaRPr lang="en-US"/>
           </a:p>
@@ -4278,7 +5188,7 @@
           <a:p>
             <a:fld id="{BA11E091-050C-4DAB-ABC8-34B3B7B173DA}" type="datetimeFigureOut">
               <a:rPr lang="en-US" smtClean="0"/>
-              <a:t>2/7/2020</a:t>
+              <a:t>2/9/2020</a:t>
             </a:fld>
             <a:endParaRPr lang="en-US"/>
           </a:p>
@@ -4645,7 +5555,7 @@
           <a:p>
             <a:fld id="{BA11E091-050C-4DAB-ABC8-34B3B7B173DA}" type="datetimeFigureOut">
               <a:rPr lang="en-US" smtClean="0"/>
-              <a:t>2/7/2020</a:t>
+              <a:t>2/9/2020</a:t>
             </a:fld>
             <a:endParaRPr lang="en-US"/>
           </a:p>
@@ -4763,7 +5673,7 @@
           <a:p>
             <a:fld id="{BA11E091-050C-4DAB-ABC8-34B3B7B173DA}" type="datetimeFigureOut">
               <a:rPr lang="en-US" smtClean="0"/>
-              <a:t>2/7/2020</a:t>
+              <a:t>2/9/2020</a:t>
             </a:fld>
             <a:endParaRPr lang="en-US"/>
           </a:p>
@@ -4858,7 +5768,7 @@
           <a:p>
             <a:fld id="{BA11E091-050C-4DAB-ABC8-34B3B7B173DA}" type="datetimeFigureOut">
               <a:rPr lang="en-US" smtClean="0"/>
-              <a:t>2/7/2020</a:t>
+              <a:t>2/9/2020</a:t>
             </a:fld>
             <a:endParaRPr lang="en-US"/>
           </a:p>
@@ -5135,7 +6045,7 @@
           <a:p>
             <a:fld id="{BA11E091-050C-4DAB-ABC8-34B3B7B173DA}" type="datetimeFigureOut">
               <a:rPr lang="en-US" smtClean="0"/>
-              <a:t>2/7/2020</a:t>
+              <a:t>2/9/2020</a:t>
             </a:fld>
             <a:endParaRPr lang="en-US"/>
           </a:p>
@@ -5388,7 +6298,7 @@
           <a:p>
             <a:fld id="{BA11E091-050C-4DAB-ABC8-34B3B7B173DA}" type="datetimeFigureOut">
               <a:rPr lang="en-US" smtClean="0"/>
-              <a:t>2/7/2020</a:t>
+              <a:t>2/9/2020</a:t>
             </a:fld>
             <a:endParaRPr lang="en-US"/>
           </a:p>
@@ -5601,7 +6511,7 @@
           <a:p>
             <a:fld id="{BA11E091-050C-4DAB-ABC8-34B3B7B173DA}" type="datetimeFigureOut">
               <a:rPr lang="en-US" smtClean="0"/>
-              <a:t>2/7/2020</a:t>
+              <a:t>2/9/2020</a:t>
             </a:fld>
             <a:endParaRPr lang="en-US"/>
           </a:p>
@@ -9302,6 +10212,222 @@
       </p:par>
     </p:tnLst>
   </p:timing>
+</p:sld>
+</file>
+
+<file path=ppt/slides/slide20.xml><?xml version="1.0" encoding="utf-8"?>
+<p:sld xmlns:a="http://schemas.openxmlformats.org/drawingml/2006/main" xmlns:r="http://schemas.openxmlformats.org/officeDocument/2006/relationships" xmlns:p="http://schemas.openxmlformats.org/presentationml/2006/main">
+  <p:cSld>
+    <p:spTree>
+      <p:nvGrpSpPr>
+        <p:cNvPr id="1" name=""/>
+        <p:cNvGrpSpPr/>
+        <p:nvPr/>
+      </p:nvGrpSpPr>
+      <p:grpSpPr>
+        <a:xfrm>
+          <a:off x="0" y="0"/>
+          <a:ext cx="0" cy="0"/>
+          <a:chOff x="0" y="0"/>
+          <a:chExt cx="0" cy="0"/>
+        </a:xfrm>
+      </p:grpSpPr>
+      <p:sp>
+        <p:nvSpPr>
+          <p:cNvPr id="2" name="Title 1"/>
+          <p:cNvSpPr>
+            <a:spLocks noGrp="1"/>
+          </p:cNvSpPr>
+          <p:nvPr>
+            <p:ph type="title"/>
+          </p:nvPr>
+        </p:nvSpPr>
+        <p:spPr/>
+        <p:txBody>
+          <a:bodyPr/>
+          <a:lstStyle/>
+          <a:p>
+            <a:endParaRPr lang="en-US"/>
+          </a:p>
+        </p:txBody>
+      </p:sp>
+      <p:sp>
+        <p:nvSpPr>
+          <p:cNvPr id="3" name="Content Placeholder 2"/>
+          <p:cNvSpPr>
+            <a:spLocks noGrp="1"/>
+          </p:cNvSpPr>
+          <p:nvPr>
+            <p:ph idx="1"/>
+          </p:nvPr>
+        </p:nvSpPr>
+        <p:spPr/>
+        <p:txBody>
+          <a:bodyPr>
+            <a:normAutofit fontScale="62500" lnSpcReduction="20000"/>
+          </a:bodyPr>
+          <a:lstStyle/>
+          <a:p>
+            <a:r>
+              <a:rPr lang="en-US" dirty="0"/>
+              <a:t>-lme4 (use RLTR exact() for testing random effects --- what are the random effects in these models?</a:t>
+            </a:r>
+          </a:p>
+          <a:p>
+            <a:r>
+              <a:rPr lang="en-US" dirty="0"/>
+              <a:t>-ANOVA? (one way </a:t>
+            </a:r>
+            <a:r>
+              <a:rPr lang="en-US" dirty="0" err="1"/>
+              <a:t>anova</a:t>
+            </a:r>
+            <a:r>
+              <a:rPr lang="en-US" dirty="0"/>
+              <a:t> – 1 factor in this group is different from the others</a:t>
+            </a:r>
+          </a:p>
+          <a:p>
+            <a:r>
+              <a:rPr lang="en-US" dirty="0"/>
+              <a:t>fit &lt;- </a:t>
+            </a:r>
+            <a:r>
+              <a:rPr lang="en-US" dirty="0" err="1"/>
+              <a:t>aov</a:t>
+            </a:r>
+            <a:r>
+              <a:rPr lang="en-US" dirty="0"/>
+              <a:t>(y ~ A, data=</a:t>
+            </a:r>
+            <a:r>
+              <a:rPr lang="en-US" dirty="0" err="1"/>
+              <a:t>mydataframe</a:t>
+            </a:r>
+            <a:r>
+              <a:rPr lang="en-US" dirty="0"/>
+              <a:t>)</a:t>
+            </a:r>
+            <a:endParaRPr lang="en-US" dirty="0"/>
+          </a:p>
+          <a:p>
+            <a:r>
+              <a:rPr lang="en-US" b="1" dirty="0"/>
+              <a:t>ANOVA test hypotheses</a:t>
+            </a:r>
+            <a:r>
+              <a:rPr lang="en-US" dirty="0"/>
+              <a:t>:</a:t>
+            </a:r>
+          </a:p>
+          <a:p>
+            <a:pPr lvl="0"/>
+            <a:r>
+              <a:rPr lang="en-US" dirty="0"/>
+              <a:t>Null hypothesis: the means of the different groups are the same</a:t>
+            </a:r>
+          </a:p>
+          <a:p>
+            <a:pPr lvl="0"/>
+            <a:r>
+              <a:rPr lang="en-US" dirty="0"/>
+              <a:t>Alternative hypothesis: At least one sample mean is not equal to the others.</a:t>
+            </a:r>
+          </a:p>
+          <a:p>
+            <a:r>
+              <a:rPr lang="en-US" u="sng" dirty="0">
+                <a:hlinkClick r:id="rId3"/>
+              </a:rPr>
+              <a:t>http://www.sthda.com/english/wiki/one-way-anova-test-in-r</a:t>
+            </a:r>
+            <a:endParaRPr lang="en-US" dirty="0"/>
+          </a:p>
+          <a:p>
+            <a:pPr lvl="0"/>
+            <a:r>
+              <a:rPr lang="en-US" b="1" dirty="0"/>
+              <a:t>Non-sig </a:t>
+            </a:r>
+            <a:r>
+              <a:rPr lang="en-US" b="1" dirty="0" err="1"/>
+              <a:t>anova</a:t>
+            </a:r>
+            <a:endParaRPr lang="en-US" dirty="0"/>
+          </a:p>
+          <a:p>
+            <a:pPr lvl="0"/>
+            <a:r>
+              <a:rPr lang="en-US" b="1" dirty="0"/>
+              <a:t>Sig </a:t>
+            </a:r>
+            <a:r>
+              <a:rPr lang="en-US" b="1" dirty="0" err="1"/>
+              <a:t>anova</a:t>
+            </a:r>
+            <a:endParaRPr lang="en-US" dirty="0"/>
+          </a:p>
+          <a:p>
+            <a:pPr lvl="0"/>
+            <a:r>
+              <a:rPr lang="en-US" b="1" dirty="0"/>
+              <a:t>Sig </a:t>
+            </a:r>
+            <a:r>
+              <a:rPr lang="en-US" b="1" dirty="0" err="1"/>
+              <a:t>anova</a:t>
+            </a:r>
+            <a:endParaRPr lang="en-US" dirty="0"/>
+          </a:p>
+          <a:p>
+            <a:r>
+              <a:rPr lang="en-US" dirty="0"/>
+              <a:t> </a:t>
+            </a:r>
+          </a:p>
+          <a:p>
+            <a:r>
+              <a:rPr lang="en-US" b="1" dirty="0"/>
+              <a:t>Pairwise </a:t>
+            </a:r>
+            <a:r>
+              <a:rPr lang="en-US" b="1" dirty="0" err="1"/>
+              <a:t>t.test</a:t>
+            </a:r>
+            <a:r>
+              <a:rPr lang="en-US" b="1" dirty="0"/>
+              <a:t> results for the 3 </a:t>
+            </a:r>
+            <a:r>
+              <a:rPr lang="en-US" b="1" dirty="0" err="1"/>
+              <a:t>subsp</a:t>
+            </a:r>
+            <a:endParaRPr lang="en-US" dirty="0"/>
+          </a:p>
+          <a:p>
+            <a:r>
+              <a:rPr lang="en-US" dirty="0"/>
+              <a:t> </a:t>
+            </a:r>
+          </a:p>
+          <a:p>
+            <a:endParaRPr lang="en-US" dirty="0" smtClean="0"/>
+          </a:p>
+          <a:p>
+            <a:endParaRPr lang="en-US" dirty="0"/>
+          </a:p>
+        </p:txBody>
+      </p:sp>
+    </p:spTree>
+    <p:extLst>
+      <p:ext uri="{BB962C8B-B14F-4D97-AF65-F5344CB8AC3E}">
+        <p14:creationId xmlns:p14="http://schemas.microsoft.com/office/powerpoint/2010/main" val="2578452167"/>
+      </p:ext>
+    </p:extLst>
+  </p:cSld>
+  <p:clrMapOvr>
+    <a:masterClrMapping/>
+  </p:clrMapOvr>
 </p:sld>
 </file>
 

</xml_diff>